<commit_message>
Intro and Solution is done.
</commit_message>
<xml_diff>
--- a/Poster/Poster.pptx
+++ b/Poster/Poster.pptx
@@ -107,6 +107,11 @@
       </a:defRPr>
     </a:lvl9pPr>
   </p:defaultTextStyle>
+  <p:extLst>
+    <p:ext uri="{EFAFB233-063F-42B5-8137-9DF3F51BA10A}">
+      <p15:sldGuideLst xmlns:p15="http://schemas.microsoft.com/office/powerpoint/2012/main"/>
+    </p:ext>
+  </p:extLst>
 </p:presentation>
 </file>
 
@@ -196,7 +201,7 @@
           <a:p>
             <a:fld id="{B86BC033-6438-4B0A-82FC-802490CCF637}" type="datetimeFigureOut">
               <a:rPr lang="en-ZA" smtClean="0"/>
-              <a:t>2017-11-10</a:t>
+              <a:t>2017-11-11</a:t>
             </a:fld>
             <a:endParaRPr lang="en-ZA"/>
           </a:p>
@@ -464,6 +469,90 @@
 </p:notesMaster>
 </file>
 
+<file path=ppt/notesSlides/notesSlide1.xml><?xml version="1.0" encoding="utf-8"?>
+<p:notes xmlns:a="http://schemas.openxmlformats.org/drawingml/2006/main" xmlns:r="http://schemas.openxmlformats.org/officeDocument/2006/relationships" xmlns:p="http://schemas.openxmlformats.org/presentationml/2006/main">
+  <p:cSld>
+    <p:spTree>
+      <p:nvGrpSpPr>
+        <p:cNvPr id="1" name=""/>
+        <p:cNvGrpSpPr/>
+        <p:nvPr/>
+      </p:nvGrpSpPr>
+      <p:grpSpPr>
+        <a:xfrm>
+          <a:off x="0" y="0"/>
+          <a:ext cx="0" cy="0"/>
+          <a:chOff x="0" y="0"/>
+          <a:chExt cx="0" cy="0"/>
+        </a:xfrm>
+      </p:grpSpPr>
+      <p:sp>
+        <p:nvSpPr>
+          <p:cNvPr id="2" name="Slide Image Placeholder 1"/>
+          <p:cNvSpPr>
+            <a:spLocks noGrp="1" noRot="1" noChangeAspect="1"/>
+          </p:cNvSpPr>
+          <p:nvPr>
+            <p:ph type="sldImg"/>
+          </p:nvPr>
+        </p:nvSpPr>
+        <p:spPr/>
+      </p:sp>
+      <p:sp>
+        <p:nvSpPr>
+          <p:cNvPr id="3" name="Notes Placeholder 2"/>
+          <p:cNvSpPr>
+            <a:spLocks noGrp="1"/>
+          </p:cNvSpPr>
+          <p:nvPr>
+            <p:ph type="body" idx="1"/>
+          </p:nvPr>
+        </p:nvSpPr>
+        <p:spPr/>
+        <p:txBody>
+          <a:bodyPr/>
+          <a:lstStyle/>
+          <a:p>
+            <a:endParaRPr lang="en-ZA" dirty="0"/>
+          </a:p>
+        </p:txBody>
+      </p:sp>
+      <p:sp>
+        <p:nvSpPr>
+          <p:cNvPr id="4" name="Slide Number Placeholder 3"/>
+          <p:cNvSpPr>
+            <a:spLocks noGrp="1"/>
+          </p:cNvSpPr>
+          <p:nvPr>
+            <p:ph type="sldNum" sz="quarter" idx="10"/>
+          </p:nvPr>
+        </p:nvSpPr>
+        <p:spPr/>
+        <p:txBody>
+          <a:bodyPr/>
+          <a:lstStyle/>
+          <a:p>
+            <a:fld id="{A62E3CB1-EC44-4B0B-BC2F-DA81DD1DB672}" type="slidenum">
+              <a:rPr lang="en-ZA" smtClean="0"/>
+              <a:t>1</a:t>
+            </a:fld>
+            <a:endParaRPr lang="en-ZA"/>
+          </a:p>
+        </p:txBody>
+      </p:sp>
+    </p:spTree>
+    <p:extLst>
+      <p:ext uri="{BB962C8B-B14F-4D97-AF65-F5344CB8AC3E}">
+        <p14:creationId xmlns:p14="http://schemas.microsoft.com/office/powerpoint/2010/main" val="238872734"/>
+      </p:ext>
+    </p:extLst>
+  </p:cSld>
+  <p:clrMapOvr>
+    <a:masterClrMapping/>
+  </p:clrMapOvr>
+</p:notes>
+</file>
+
 <file path=ppt/slideLayouts/slideLayout1.xml><?xml version="1.0" encoding="utf-8"?>
 <p:sldLayout xmlns:a="http://schemas.openxmlformats.org/drawingml/2006/main" xmlns:r="http://schemas.openxmlformats.org/officeDocument/2006/relationships" xmlns:p="http://schemas.openxmlformats.org/presentationml/2006/main" type="title" preserve="1">
   <p:cSld name="Title Slide">
@@ -595,7 +684,7 @@
           <a:p>
             <a:fld id="{51832D96-9D06-475B-8F7A-8034629CEECD}" type="datetimeFigureOut">
               <a:rPr lang="en-ZA" smtClean="0"/>
-              <a:t>2017-11-10</a:t>
+              <a:t>2017-11-11</a:t>
             </a:fld>
             <a:endParaRPr lang="en-ZA"/>
           </a:p>
@@ -765,7 +854,7 @@
           <a:p>
             <a:fld id="{51832D96-9D06-475B-8F7A-8034629CEECD}" type="datetimeFigureOut">
               <a:rPr lang="en-ZA" smtClean="0"/>
-              <a:t>2017-11-10</a:t>
+              <a:t>2017-11-11</a:t>
             </a:fld>
             <a:endParaRPr lang="en-ZA"/>
           </a:p>
@@ -945,7 +1034,7 @@
           <a:p>
             <a:fld id="{51832D96-9D06-475B-8F7A-8034629CEECD}" type="datetimeFigureOut">
               <a:rPr lang="en-ZA" smtClean="0"/>
-              <a:t>2017-11-10</a:t>
+              <a:t>2017-11-11</a:t>
             </a:fld>
             <a:endParaRPr lang="en-ZA"/>
           </a:p>
@@ -1115,7 +1204,7 @@
           <a:p>
             <a:fld id="{51832D96-9D06-475B-8F7A-8034629CEECD}" type="datetimeFigureOut">
               <a:rPr lang="en-ZA" smtClean="0"/>
-              <a:t>2017-11-10</a:t>
+              <a:t>2017-11-11</a:t>
             </a:fld>
             <a:endParaRPr lang="en-ZA"/>
           </a:p>
@@ -1359,7 +1448,7 @@
           <a:p>
             <a:fld id="{51832D96-9D06-475B-8F7A-8034629CEECD}" type="datetimeFigureOut">
               <a:rPr lang="en-ZA" smtClean="0"/>
-              <a:t>2017-11-10</a:t>
+              <a:t>2017-11-11</a:t>
             </a:fld>
             <a:endParaRPr lang="en-ZA"/>
           </a:p>
@@ -1591,7 +1680,7 @@
           <a:p>
             <a:fld id="{51832D96-9D06-475B-8F7A-8034629CEECD}" type="datetimeFigureOut">
               <a:rPr lang="en-ZA" smtClean="0"/>
-              <a:t>2017-11-10</a:t>
+              <a:t>2017-11-11</a:t>
             </a:fld>
             <a:endParaRPr lang="en-ZA"/>
           </a:p>
@@ -1958,7 +2047,7 @@
           <a:p>
             <a:fld id="{51832D96-9D06-475B-8F7A-8034629CEECD}" type="datetimeFigureOut">
               <a:rPr lang="en-ZA" smtClean="0"/>
-              <a:t>2017-11-10</a:t>
+              <a:t>2017-11-11</a:t>
             </a:fld>
             <a:endParaRPr lang="en-ZA"/>
           </a:p>
@@ -2076,7 +2165,7 @@
           <a:p>
             <a:fld id="{51832D96-9D06-475B-8F7A-8034629CEECD}" type="datetimeFigureOut">
               <a:rPr lang="en-ZA" smtClean="0"/>
-              <a:t>2017-11-10</a:t>
+              <a:t>2017-11-11</a:t>
             </a:fld>
             <a:endParaRPr lang="en-ZA"/>
           </a:p>
@@ -2171,7 +2260,7 @@
           <a:p>
             <a:fld id="{51832D96-9D06-475B-8F7A-8034629CEECD}" type="datetimeFigureOut">
               <a:rPr lang="en-ZA" smtClean="0"/>
-              <a:t>2017-11-10</a:t>
+              <a:t>2017-11-11</a:t>
             </a:fld>
             <a:endParaRPr lang="en-ZA"/>
           </a:p>
@@ -2448,7 +2537,7 @@
           <a:p>
             <a:fld id="{51832D96-9D06-475B-8F7A-8034629CEECD}" type="datetimeFigureOut">
               <a:rPr lang="en-ZA" smtClean="0"/>
-              <a:t>2017-11-10</a:t>
+              <a:t>2017-11-11</a:t>
             </a:fld>
             <a:endParaRPr lang="en-ZA"/>
           </a:p>
@@ -2705,7 +2794,7 @@
           <a:p>
             <a:fld id="{51832D96-9D06-475B-8F7A-8034629CEECD}" type="datetimeFigureOut">
               <a:rPr lang="en-ZA" smtClean="0"/>
-              <a:t>2017-11-10</a:t>
+              <a:t>2017-11-11</a:t>
             </a:fld>
             <a:endParaRPr lang="en-ZA"/>
           </a:p>
@@ -2918,7 +3007,7 @@
           <a:p>
             <a:fld id="{51832D96-9D06-475B-8F7A-8034629CEECD}" type="datetimeFigureOut">
               <a:rPr lang="en-ZA" smtClean="0"/>
-              <a:t>2017-11-10</a:t>
+              <a:t>2017-11-11</a:t>
             </a:fld>
             <a:endParaRPr lang="en-ZA"/>
           </a:p>
@@ -3325,10 +3414,10 @@
       </p:grpSpPr>
       <p:sp>
         <p:nvSpPr>
-          <p:cNvPr id="80" name="Rectangle 79">
+          <p:cNvPr id="141" name="Rectangle: Rounded Corners 140">
             <a:extLst>
               <a:ext uri="{FF2B5EF4-FFF2-40B4-BE49-F238E27FC236}">
-                <a16:creationId xmlns:a16="http://schemas.microsoft.com/office/drawing/2014/main" id="{080138C7-9CDA-48CA-BDFC-F4BFABB4DB0F}"/>
+                <a16:creationId xmlns:a16="http://schemas.microsoft.com/office/drawing/2014/main" id="{168464C4-C20A-4751-AAA8-C8AFB3806AD3}"/>
               </a:ext>
             </a:extLst>
           </p:cNvPr>
@@ -3337,57 +3426,8 @@
         </p:nvSpPr>
         <p:spPr>
           <a:xfrm>
-            <a:off x="304800" y="304800"/>
-            <a:ext cx="29413200" cy="2440096"/>
-          </a:xfrm>
-          <a:prstGeom prst="rect">
-            <a:avLst/>
-          </a:prstGeom>
-          <a:ln>
-            <a:solidFill>
-              <a:schemeClr val="tx1"/>
-            </a:solidFill>
-          </a:ln>
-        </p:spPr>
-        <p:style>
-          <a:lnRef idx="2">
-            <a:schemeClr val="accent6"/>
-          </a:lnRef>
-          <a:fillRef idx="1">
-            <a:schemeClr val="lt1"/>
-          </a:fillRef>
-          <a:effectRef idx="0">
-            <a:schemeClr val="accent6"/>
-          </a:effectRef>
-          <a:fontRef idx="minor">
-            <a:schemeClr val="dk1"/>
-          </a:fontRef>
-        </p:style>
-        <p:txBody>
-          <a:bodyPr rtlCol="0" anchor="ctr"/>
-          <a:lstStyle/>
-          <a:p>
-            <a:pPr algn="ctr"/>
-            <a:endParaRPr lang="en-ZA"/>
-          </a:p>
-        </p:txBody>
-      </p:sp>
-      <p:sp>
-        <p:nvSpPr>
-          <p:cNvPr id="28" name="Rectangle: Rounded Corners 27">
-            <a:extLst>
-              <a:ext uri="{FF2B5EF4-FFF2-40B4-BE49-F238E27FC236}">
-                <a16:creationId xmlns:a16="http://schemas.microsoft.com/office/drawing/2014/main" id="{557B439A-3576-4163-9180-8FB7577C1229}"/>
-              </a:ext>
-            </a:extLst>
-          </p:cNvPr>
-          <p:cNvSpPr/>
-          <p:nvPr/>
-        </p:nvSpPr>
-        <p:spPr>
-          <a:xfrm>
-            <a:off x="16535401" y="4290997"/>
-            <a:ext cx="12367855" cy="9067982"/>
+            <a:off x="683618" y="7251101"/>
+            <a:ext cx="8688982" cy="4373672"/>
           </a:xfrm>
           <a:prstGeom prst="roundRect">
             <a:avLst/>
@@ -3417,7 +3457,418 @@
           <a:lstStyle/>
           <a:p>
             <a:pPr algn="ctr"/>
-            <a:endParaRPr lang="en-ZA"/>
+            <a:endParaRPr lang="en-ZA" dirty="0"/>
+          </a:p>
+        </p:txBody>
+      </p:sp>
+      <p:sp>
+        <p:nvSpPr>
+          <p:cNvPr id="140" name="Rectangle: Rounded Corners 139">
+            <a:extLst>
+              <a:ext uri="{FF2B5EF4-FFF2-40B4-BE49-F238E27FC236}">
+                <a16:creationId xmlns:a16="http://schemas.microsoft.com/office/drawing/2014/main" id="{96613D73-458D-4AD1-AE63-9B652D571694}"/>
+              </a:ext>
+            </a:extLst>
+          </p:cNvPr>
+          <p:cNvSpPr/>
+          <p:nvPr/>
+        </p:nvSpPr>
+        <p:spPr>
+          <a:xfrm>
+            <a:off x="541543" y="11921039"/>
+            <a:ext cx="8802764" cy="6925554"/>
+          </a:xfrm>
+          <a:prstGeom prst="roundRect">
+            <a:avLst/>
+          </a:prstGeom>
+          <a:ln>
+            <a:solidFill>
+              <a:schemeClr val="tx1"/>
+            </a:solidFill>
+          </a:ln>
+        </p:spPr>
+        <p:style>
+          <a:lnRef idx="2">
+            <a:schemeClr val="accent6"/>
+          </a:lnRef>
+          <a:fillRef idx="1">
+            <a:schemeClr val="lt1"/>
+          </a:fillRef>
+          <a:effectRef idx="0">
+            <a:schemeClr val="accent6"/>
+          </a:effectRef>
+          <a:fontRef idx="minor">
+            <a:schemeClr val="dk1"/>
+          </a:fontRef>
+        </p:style>
+        <p:txBody>
+          <a:bodyPr rtlCol="0" anchor="ctr"/>
+          <a:lstStyle/>
+          <a:p>
+            <a:pPr algn="ctr"/>
+            <a:endParaRPr lang="en-ZA" dirty="0"/>
+          </a:p>
+        </p:txBody>
+      </p:sp>
+      <p:sp>
+        <p:nvSpPr>
+          <p:cNvPr id="139" name="Rectangle: Rounded Corners 138">
+            <a:extLst>
+              <a:ext uri="{FF2B5EF4-FFF2-40B4-BE49-F238E27FC236}">
+                <a16:creationId xmlns:a16="http://schemas.microsoft.com/office/drawing/2014/main" id="{140AC787-BF31-467C-B1A5-A76E78A9B84F}"/>
+              </a:ext>
+            </a:extLst>
+          </p:cNvPr>
+          <p:cNvSpPr/>
+          <p:nvPr/>
+        </p:nvSpPr>
+        <p:spPr>
+          <a:xfrm>
+            <a:off x="10518808" y="11924497"/>
+            <a:ext cx="9021230" cy="6922096"/>
+          </a:xfrm>
+          <a:prstGeom prst="roundRect">
+            <a:avLst/>
+          </a:prstGeom>
+          <a:ln>
+            <a:solidFill>
+              <a:schemeClr val="tx1"/>
+            </a:solidFill>
+          </a:ln>
+        </p:spPr>
+        <p:style>
+          <a:lnRef idx="2">
+            <a:schemeClr val="accent6"/>
+          </a:lnRef>
+          <a:fillRef idx="1">
+            <a:schemeClr val="lt1"/>
+          </a:fillRef>
+          <a:effectRef idx="0">
+            <a:schemeClr val="accent6"/>
+          </a:effectRef>
+          <a:fontRef idx="minor">
+            <a:schemeClr val="dk1"/>
+          </a:fontRef>
+        </p:style>
+        <p:txBody>
+          <a:bodyPr rtlCol="0" anchor="ctr"/>
+          <a:lstStyle/>
+          <a:p>
+            <a:pPr algn="ctr"/>
+            <a:endParaRPr lang="en-ZA" dirty="0"/>
+          </a:p>
+        </p:txBody>
+      </p:sp>
+      <p:sp>
+        <p:nvSpPr>
+          <p:cNvPr id="138" name="Rectangle: Rounded Corners 137">
+            <a:extLst>
+              <a:ext uri="{FF2B5EF4-FFF2-40B4-BE49-F238E27FC236}">
+                <a16:creationId xmlns:a16="http://schemas.microsoft.com/office/drawing/2014/main" id="{0F3AC4D4-6617-4B8C-AE41-74820568FA41}"/>
+              </a:ext>
+            </a:extLst>
+          </p:cNvPr>
+          <p:cNvSpPr/>
+          <p:nvPr/>
+        </p:nvSpPr>
+        <p:spPr>
+          <a:xfrm>
+            <a:off x="20906771" y="11757101"/>
+            <a:ext cx="8688982" cy="7055323"/>
+          </a:xfrm>
+          <a:prstGeom prst="roundRect">
+            <a:avLst/>
+          </a:prstGeom>
+          <a:ln>
+            <a:solidFill>
+              <a:schemeClr val="tx1"/>
+            </a:solidFill>
+          </a:ln>
+        </p:spPr>
+        <p:style>
+          <a:lnRef idx="2">
+            <a:schemeClr val="accent6"/>
+          </a:lnRef>
+          <a:fillRef idx="1">
+            <a:schemeClr val="lt1"/>
+          </a:fillRef>
+          <a:effectRef idx="0">
+            <a:schemeClr val="accent6"/>
+          </a:effectRef>
+          <a:fontRef idx="minor">
+            <a:schemeClr val="dk1"/>
+          </a:fontRef>
+        </p:style>
+        <p:txBody>
+          <a:bodyPr rtlCol="0" anchor="ctr"/>
+          <a:lstStyle/>
+          <a:p>
+            <a:pPr algn="ctr"/>
+            <a:endParaRPr lang="en-ZA" dirty="0"/>
+          </a:p>
+        </p:txBody>
+      </p:sp>
+      <p:sp>
+        <p:nvSpPr>
+          <p:cNvPr id="137" name="Rectangle: Rounded Corners 136">
+            <a:extLst>
+              <a:ext uri="{FF2B5EF4-FFF2-40B4-BE49-F238E27FC236}">
+                <a16:creationId xmlns:a16="http://schemas.microsoft.com/office/drawing/2014/main" id="{662BC93C-79B1-4155-A4FE-EBE38EF2C8F5}"/>
+              </a:ext>
+            </a:extLst>
+          </p:cNvPr>
+          <p:cNvSpPr/>
+          <p:nvPr/>
+        </p:nvSpPr>
+        <p:spPr>
+          <a:xfrm>
+            <a:off x="20906771" y="7333510"/>
+            <a:ext cx="8688982" cy="4262541"/>
+          </a:xfrm>
+          <a:prstGeom prst="roundRect">
+            <a:avLst/>
+          </a:prstGeom>
+          <a:ln>
+            <a:solidFill>
+              <a:schemeClr val="tx1"/>
+            </a:solidFill>
+          </a:ln>
+        </p:spPr>
+        <p:style>
+          <a:lnRef idx="2">
+            <a:schemeClr val="accent6"/>
+          </a:lnRef>
+          <a:fillRef idx="1">
+            <a:schemeClr val="lt1"/>
+          </a:fillRef>
+          <a:effectRef idx="0">
+            <a:schemeClr val="accent6"/>
+          </a:effectRef>
+          <a:fontRef idx="minor">
+            <a:schemeClr val="dk1"/>
+          </a:fontRef>
+        </p:style>
+        <p:txBody>
+          <a:bodyPr rtlCol="0" anchor="ctr"/>
+          <a:lstStyle/>
+          <a:p>
+            <a:pPr algn="ctr"/>
+            <a:endParaRPr lang="en-ZA" dirty="0"/>
+          </a:p>
+        </p:txBody>
+      </p:sp>
+      <p:sp>
+        <p:nvSpPr>
+          <p:cNvPr id="136" name="Rectangle: Rounded Corners 135">
+            <a:extLst>
+              <a:ext uri="{FF2B5EF4-FFF2-40B4-BE49-F238E27FC236}">
+                <a16:creationId xmlns:a16="http://schemas.microsoft.com/office/drawing/2014/main" id="{B30FDD84-0AA0-4CB2-88F3-2B62E3FEF5F8}"/>
+              </a:ext>
+            </a:extLst>
+          </p:cNvPr>
+          <p:cNvSpPr/>
+          <p:nvPr/>
+        </p:nvSpPr>
+        <p:spPr>
+          <a:xfrm>
+            <a:off x="20872409" y="2709759"/>
+            <a:ext cx="8688982" cy="4262541"/>
+          </a:xfrm>
+          <a:prstGeom prst="roundRect">
+            <a:avLst/>
+          </a:prstGeom>
+          <a:ln>
+            <a:solidFill>
+              <a:schemeClr val="tx1"/>
+            </a:solidFill>
+          </a:ln>
+        </p:spPr>
+        <p:style>
+          <a:lnRef idx="2">
+            <a:schemeClr val="accent6"/>
+          </a:lnRef>
+          <a:fillRef idx="1">
+            <a:schemeClr val="lt1"/>
+          </a:fillRef>
+          <a:effectRef idx="0">
+            <a:schemeClr val="accent6"/>
+          </a:effectRef>
+          <a:fontRef idx="minor">
+            <a:schemeClr val="dk1"/>
+          </a:fontRef>
+        </p:style>
+        <p:txBody>
+          <a:bodyPr rtlCol="0" anchor="ctr"/>
+          <a:lstStyle/>
+          <a:p>
+            <a:pPr algn="ctr"/>
+            <a:endParaRPr lang="en-ZA" dirty="0"/>
+          </a:p>
+        </p:txBody>
+      </p:sp>
+      <p:sp>
+        <p:nvSpPr>
+          <p:cNvPr id="133" name="Rectangle: Rounded Corners 132">
+            <a:extLst>
+              <a:ext uri="{FF2B5EF4-FFF2-40B4-BE49-F238E27FC236}">
+                <a16:creationId xmlns:a16="http://schemas.microsoft.com/office/drawing/2014/main" id="{EBCC7284-CD40-42F6-8769-99ADCA31C5B9}"/>
+              </a:ext>
+            </a:extLst>
+          </p:cNvPr>
+          <p:cNvSpPr/>
+          <p:nvPr/>
+        </p:nvSpPr>
+        <p:spPr>
+          <a:xfrm>
+            <a:off x="10590858" y="2745199"/>
+            <a:ext cx="9021230" cy="8804721"/>
+          </a:xfrm>
+          <a:prstGeom prst="roundRect">
+            <a:avLst/>
+          </a:prstGeom>
+          <a:ln>
+            <a:solidFill>
+              <a:schemeClr val="tx1"/>
+            </a:solidFill>
+          </a:ln>
+        </p:spPr>
+        <p:style>
+          <a:lnRef idx="2">
+            <a:schemeClr val="accent6"/>
+          </a:lnRef>
+          <a:fillRef idx="1">
+            <a:schemeClr val="lt1"/>
+          </a:fillRef>
+          <a:effectRef idx="0">
+            <a:schemeClr val="accent6"/>
+          </a:effectRef>
+          <a:fontRef idx="minor">
+            <a:schemeClr val="dk1"/>
+          </a:fontRef>
+        </p:style>
+        <p:txBody>
+          <a:bodyPr rtlCol="0" anchor="ctr"/>
+          <a:lstStyle/>
+          <a:p>
+            <a:pPr algn="ctr"/>
+            <a:endParaRPr lang="en-ZA" dirty="0"/>
+          </a:p>
+        </p:txBody>
+      </p:sp>
+      <p:sp>
+        <p:nvSpPr>
+          <p:cNvPr id="82" name="Rectangle 1252">
+            <a:extLst>
+              <a:ext uri="{FF2B5EF4-FFF2-40B4-BE49-F238E27FC236}">
+                <a16:creationId xmlns:a16="http://schemas.microsoft.com/office/drawing/2014/main" id="{6B767C4F-373C-4762-A861-258A712383AB}"/>
+              </a:ext>
+            </a:extLst>
+          </p:cNvPr>
+          <p:cNvSpPr>
+            <a:spLocks noChangeArrowheads="1"/>
+          </p:cNvSpPr>
+          <p:nvPr/>
+        </p:nvSpPr>
+        <p:spPr bwMode="auto">
+          <a:xfrm>
+            <a:off x="-1" y="19313954"/>
+            <a:ext cx="30275213" cy="2152799"/>
+          </a:xfrm>
+          <a:prstGeom prst="rect">
+            <a:avLst/>
+          </a:prstGeom>
+          <a:gradFill rotWithShape="1">
+            <a:gsLst>
+              <a:gs pos="0">
+                <a:srgbClr val="9AB1C0"/>
+              </a:gs>
+              <a:gs pos="50000">
+                <a:schemeClr val="bg1"/>
+              </a:gs>
+              <a:gs pos="100000">
+                <a:srgbClr val="9AB1C0"/>
+              </a:gs>
+            </a:gsLst>
+            <a:lin ang="5400000" scaled="1"/>
+          </a:gradFill>
+          <a:ln w="38100" algn="ctr">
+            <a:noFill/>
+            <a:miter lim="800000"/>
+            <a:headEnd/>
+            <a:tailEnd/>
+          </a:ln>
+          <a:effectLst/>
+        </p:spPr>
+        <p:txBody>
+          <a:bodyPr wrap="square" lIns="89182" tIns="44593" rIns="89182" bIns="44593" anchor="ctr">
+            <a:spAutoFit/>
+          </a:bodyPr>
+          <a:lstStyle/>
+          <a:p>
+            <a:pPr eaLnBrk="0" hangingPunct="0">
+              <a:lnSpc>
+                <a:spcPct val="75000"/>
+              </a:lnSpc>
+              <a:spcBef>
+                <a:spcPct val="25000"/>
+              </a:spcBef>
+              <a:spcAft>
+                <a:spcPct val="25000"/>
+              </a:spcAft>
+              <a:defRPr/>
+            </a:pPr>
+            <a:endParaRPr lang="en-US" dirty="0">
+              <a:cs typeface="+mn-cs"/>
+            </a:endParaRPr>
+          </a:p>
+        </p:txBody>
+      </p:sp>
+      <p:sp>
+        <p:nvSpPr>
+          <p:cNvPr id="28" name="Rectangle: Rounded Corners 27">
+            <a:extLst>
+              <a:ext uri="{FF2B5EF4-FFF2-40B4-BE49-F238E27FC236}">
+                <a16:creationId xmlns:a16="http://schemas.microsoft.com/office/drawing/2014/main" id="{557B439A-3576-4163-9180-8FB7577C1229}"/>
+              </a:ext>
+            </a:extLst>
+          </p:cNvPr>
+          <p:cNvSpPr/>
+          <p:nvPr/>
+        </p:nvSpPr>
+        <p:spPr>
+          <a:xfrm>
+            <a:off x="607193" y="2709760"/>
+            <a:ext cx="8688982" cy="4265316"/>
+          </a:xfrm>
+          <a:prstGeom prst="roundRect">
+            <a:avLst/>
+          </a:prstGeom>
+          <a:ln>
+            <a:solidFill>
+              <a:schemeClr val="tx1"/>
+            </a:solidFill>
+          </a:ln>
+        </p:spPr>
+        <p:style>
+          <a:lnRef idx="2">
+            <a:schemeClr val="accent6"/>
+          </a:lnRef>
+          <a:fillRef idx="1">
+            <a:schemeClr val="lt1"/>
+          </a:fillRef>
+          <a:effectRef idx="0">
+            <a:schemeClr val="accent6"/>
+          </a:effectRef>
+          <a:fontRef idx="minor">
+            <a:schemeClr val="dk1"/>
+          </a:fontRef>
+        </p:style>
+        <p:txBody>
+          <a:bodyPr rtlCol="0" anchor="ctr"/>
+          <a:lstStyle/>
+          <a:p>
+            <a:pPr algn="ctr"/>
+            <a:endParaRPr lang="en-ZA" dirty="0"/>
           </a:p>
         </p:txBody>
       </p:sp>
@@ -3435,8 +3886,8 @@
         </p:nvGrpSpPr>
         <p:grpSpPr>
           <a:xfrm>
-            <a:off x="17068783" y="7915238"/>
-            <a:ext cx="11894817" cy="5443741"/>
+            <a:off x="1600200" y="15848452"/>
+            <a:ext cx="6407670" cy="2811573"/>
             <a:chOff x="15555487" y="3261832"/>
             <a:chExt cx="11365968" cy="4529251"/>
           </a:xfrm>
@@ -3495,7 +3946,7 @@
             <p:nvPr/>
           </p:nvPicPr>
           <p:blipFill rotWithShape="1">
-            <a:blip r:embed="rId2" cstate="print">
+            <a:blip r:embed="rId3" cstate="print">
               <a:extLst>
                 <a:ext uri="{28A0092B-C50C-407E-A947-70E740481C1C}">
                   <a14:useLocalDpi xmlns:a14="http://schemas.microsoft.com/office/drawing/2010/main" val="0"/>
@@ -3579,7 +4030,7 @@
                 <a:tabLst/>
               </a:pPr>
               <a:r>
-                <a:rPr kumimoji="0" lang="en-ZA" sz="2400" b="0" i="0" u="none" strike="noStrike" cap="none" normalizeH="0" baseline="0" dirty="0">
+                <a:rPr kumimoji="0" lang="en-ZA" sz="1200" b="0" i="0" u="none" strike="noStrike" cap="none" normalizeH="0" baseline="0" dirty="0">
                   <a:ln>
                     <a:noFill/>
                   </a:ln>
@@ -3658,7 +4109,7 @@
                 <a:tabLst/>
               </a:pPr>
               <a:r>
-                <a:rPr kumimoji="0" lang="en-ZA" sz="2400" b="0" i="0" u="none" strike="noStrike" cap="none" normalizeH="0" baseline="0" dirty="0">
+                <a:rPr kumimoji="0" lang="en-ZA" sz="1200" b="0" i="0" u="none" strike="noStrike" cap="none" normalizeH="0" baseline="0" dirty="0">
                   <a:ln>
                     <a:noFill/>
                   </a:ln>
@@ -3737,7 +4188,7 @@
                 <a:tabLst/>
               </a:pPr>
               <a:r>
-                <a:rPr kumimoji="0" lang="en-ZA" sz="2400" b="0" i="0" u="none" strike="noStrike" cap="none" normalizeH="0" baseline="0" dirty="0">
+                <a:rPr kumimoji="0" lang="en-ZA" sz="1200" b="0" i="0" u="none" strike="noStrike" cap="none" normalizeH="0" baseline="0" dirty="0">
                   <a:ln>
                     <a:noFill/>
                   </a:ln>
@@ -3816,7 +4267,7 @@
                 <a:tabLst/>
               </a:pPr>
               <a:r>
-                <a:rPr kumimoji="0" lang="en-ZA" sz="2400" b="0" i="0" u="none" strike="noStrike" cap="none" normalizeH="0" baseline="0" dirty="0">
+                <a:rPr kumimoji="0" lang="en-ZA" sz="1200" b="0" i="0" u="none" strike="noStrike" cap="none" normalizeH="0" baseline="0" dirty="0">
                   <a:ln>
                     <a:noFill/>
                   </a:ln>
@@ -3895,7 +4346,7 @@
                 <a:tabLst/>
               </a:pPr>
               <a:r>
-                <a:rPr kumimoji="0" lang="en-ZA" sz="2400" b="0" i="0" u="none" strike="noStrike" cap="none" normalizeH="0" baseline="0" dirty="0">
+                <a:rPr kumimoji="0" lang="en-ZA" sz="1200" b="0" i="0" u="none" strike="noStrike" cap="none" normalizeH="0" baseline="0" dirty="0">
                   <a:ln>
                     <a:noFill/>
                   </a:ln>
@@ -3925,7 +4376,7 @@
           <p:spPr>
             <a:xfrm>
               <a:off x="25521920" y="6006347"/>
-              <a:ext cx="1399535" cy="461665"/>
+              <a:ext cx="1399535" cy="446226"/>
             </a:xfrm>
             <a:prstGeom prst="rect">
               <a:avLst/>
@@ -3939,7 +4390,7 @@
             <a:lstStyle/>
             <a:p>
               <a:r>
-                <a:rPr lang="en-ZA" dirty="0">
+                <a:rPr lang="en-ZA" sz="1200" dirty="0">
                   <a:effectLst/>
                 </a:rPr>
                 <a:t>Answers</a:t>
@@ -4080,9 +4531,9 @@
             <p:nvPr/>
           </p:nvCxnSpPr>
           <p:spPr bwMode="auto">
-            <a:xfrm>
-              <a:off x="25328099" y="6329513"/>
-              <a:ext cx="193821" cy="0"/>
+            <a:xfrm flipV="1">
+              <a:off x="25328099" y="6229461"/>
+              <a:ext cx="193820" cy="7720"/>
             </a:xfrm>
             <a:prstGeom prst="straightConnector1">
               <a:avLst/>
@@ -4195,7 +4646,7 @@
             <p:nvPr/>
           </p:nvPicPr>
           <p:blipFill rotWithShape="1">
-            <a:blip r:embed="rId3" cstate="print">
+            <a:blip r:embed="rId4" cstate="print">
               <a:extLst>
                 <a:ext uri="{28A0092B-C50C-407E-A947-70E740481C1C}">
                   <a14:useLocalDpi xmlns:a14="http://schemas.microsoft.com/office/drawing/2010/main" val="0"/>
@@ -4230,7 +4681,7 @@
             <p:nvPr/>
           </p:nvPicPr>
           <p:blipFill>
-            <a:blip r:embed="rId4" cstate="print">
+            <a:blip r:embed="rId5" cstate="print">
               <a:extLst>
                 <a:ext uri="{28A0092B-C50C-407E-A947-70E740481C1C}">
                   <a14:useLocalDpi xmlns:a14="http://schemas.microsoft.com/office/drawing/2010/main" val="0"/>
@@ -4264,7 +4715,7 @@
             <p:nvPr/>
           </p:nvPicPr>
           <p:blipFill rotWithShape="1">
-            <a:blip r:embed="rId5"/>
+            <a:blip r:embed="rId6"/>
             <a:srcRect l="32494" t="46249" r="65162" b="50357"/>
             <a:stretch/>
           </p:blipFill>
@@ -4293,7 +4744,7 @@
             <p:nvPr/>
           </p:nvPicPr>
           <p:blipFill rotWithShape="1">
-            <a:blip r:embed="rId6">
+            <a:blip r:embed="rId7">
               <a:extLst>
                 <a:ext uri="{28A0092B-C50C-407E-A947-70E740481C1C}">
                   <a14:useLocalDpi xmlns:a14="http://schemas.microsoft.com/office/drawing/2010/main" val="0"/>
@@ -4326,7 +4777,7 @@
             <p:nvPr/>
           </p:nvPicPr>
           <p:blipFill rotWithShape="1">
-            <a:blip r:embed="rId5"/>
+            <a:blip r:embed="rId6"/>
             <a:srcRect l="29391" t="46088" r="68218" b="50143"/>
             <a:stretch/>
           </p:blipFill>
@@ -4353,7 +4804,7 @@
             <p:nvPr/>
           </p:nvPicPr>
           <p:blipFill rotWithShape="1">
-            <a:blip r:embed="rId5"/>
+            <a:blip r:embed="rId6"/>
             <a:srcRect l="35064" t="46088" r="61747" b="49155"/>
             <a:stretch/>
           </p:blipFill>
@@ -4382,7 +4833,7 @@
             <p:nvPr/>
           </p:nvPicPr>
           <p:blipFill rotWithShape="1">
-            <a:blip r:embed="rId7">
+            <a:blip r:embed="rId8">
               <a:extLst>
                 <a:ext uri="{28A0092B-C50C-407E-A947-70E740481C1C}">
                   <a14:useLocalDpi xmlns:a14="http://schemas.microsoft.com/office/drawing/2010/main" val="0"/>
@@ -4417,7 +4868,7 @@
             <p:nvPr/>
           </p:nvPicPr>
           <p:blipFill rotWithShape="1">
-            <a:blip r:embed="rId8">
+            <a:blip r:embed="rId9">
               <a:extLst>
                 <a:ext uri="{28A0092B-C50C-407E-A947-70E740481C1C}">
                   <a14:useLocalDpi xmlns:a14="http://schemas.microsoft.com/office/drawing/2010/main" val="0"/>
@@ -4448,1342 +4899,6 @@
           </p:spPr>
         </p:pic>
       </p:grpSp>
-      <p:sp>
-        <p:nvSpPr>
-          <p:cNvPr id="27" name="Title 1">
-            <a:extLst>
-              <a:ext uri="{FF2B5EF4-FFF2-40B4-BE49-F238E27FC236}">
-                <a16:creationId xmlns:a16="http://schemas.microsoft.com/office/drawing/2014/main" id="{219F36A0-D7EF-4EA7-9844-D3C06B542CA8}"/>
-              </a:ext>
-            </a:extLst>
-          </p:cNvPr>
-          <p:cNvSpPr txBox="1">
-            <a:spLocks/>
-          </p:cNvSpPr>
-          <p:nvPr/>
-        </p:nvSpPr>
-        <p:spPr>
-          <a:xfrm>
-            <a:off x="1231254" y="1058320"/>
-            <a:ext cx="28751211" cy="3624241"/>
-          </a:xfrm>
-          <a:prstGeom prst="rect">
-            <a:avLst/>
-          </a:prstGeom>
-        </p:spPr>
-        <p:txBody>
-          <a:bodyPr/>
-          <a:lstStyle>
-            <a:lvl1pPr algn="l" defTabSz="2851191" rtl="0" eaLnBrk="1" latinLnBrk="0" hangingPunct="1">
-              <a:lnSpc>
-                <a:spcPct val="90000"/>
-              </a:lnSpc>
-              <a:spcBef>
-                <a:spcPct val="0"/>
-              </a:spcBef>
-              <a:buNone/>
-              <a:defRPr sz="13720" kern="1200">
-                <a:solidFill>
-                  <a:schemeClr val="tx1"/>
-                </a:solidFill>
-                <a:latin typeface="+mj-lt"/>
-                <a:ea typeface="+mj-ea"/>
-                <a:cs typeface="+mj-cs"/>
-              </a:defRPr>
-            </a:lvl1pPr>
-          </a:lstStyle>
-          <a:p>
-            <a:r>
-              <a:rPr lang="en-ZA" sz="6600" dirty="0"/>
-              <a:t>Automatic Test Grading Using Image Processing and Machine Learning Techniques</a:t>
-            </a:r>
-          </a:p>
-        </p:txBody>
-      </p:sp>
-      <p:sp>
-        <p:nvSpPr>
-          <p:cNvPr id="29" name="TextBox 28">
-            <a:extLst>
-              <a:ext uri="{FF2B5EF4-FFF2-40B4-BE49-F238E27FC236}">
-                <a16:creationId xmlns:a16="http://schemas.microsoft.com/office/drawing/2014/main" id="{49841FC6-FF65-469B-98FE-F4522DE4615E}"/>
-              </a:ext>
-            </a:extLst>
-          </p:cNvPr>
-          <p:cNvSpPr txBox="1"/>
-          <p:nvPr/>
-        </p:nvSpPr>
-        <p:spPr>
-          <a:xfrm>
-            <a:off x="17022346" y="5297565"/>
-            <a:ext cx="10820399" cy="1200329"/>
-          </a:xfrm>
-          <a:prstGeom prst="rect">
-            <a:avLst/>
-          </a:prstGeom>
-          <a:noFill/>
-        </p:spPr>
-        <p:txBody>
-          <a:bodyPr wrap="square" rtlCol="0">
-            <a:spAutoFit/>
-          </a:bodyPr>
-          <a:lstStyle/>
-          <a:p>
-            <a:r>
-              <a:rPr lang="en-ZA" sz="2400" b="1" dirty="0"/>
-              <a:t>System overview</a:t>
-            </a:r>
-          </a:p>
-          <a:p>
-            <a:endParaRPr lang="en-ZA" sz="2400" b="1" dirty="0"/>
-          </a:p>
-          <a:p>
-            <a:r>
-              <a:rPr lang="en-ZA" sz="2400" dirty="0" err="1"/>
-              <a:t>Isentially</a:t>
-            </a:r>
-            <a:r>
-              <a:rPr lang="en-ZA" sz="2400" dirty="0"/>
-              <a:t> the system is tasked </a:t>
-            </a:r>
-            <a:r>
-              <a:rPr lang="en-ZA" sz="2400" dirty="0" err="1"/>
-              <a:t>woth</a:t>
-            </a:r>
-            <a:endParaRPr lang="en-ZA" dirty="0"/>
-          </a:p>
-        </p:txBody>
-      </p:sp>
-      <p:sp>
-        <p:nvSpPr>
-          <p:cNvPr id="30" name="Rectangle: Rounded Corners 29">
-            <a:extLst>
-              <a:ext uri="{FF2B5EF4-FFF2-40B4-BE49-F238E27FC236}">
-                <a16:creationId xmlns:a16="http://schemas.microsoft.com/office/drawing/2014/main" id="{202A199E-A8C0-4D85-A967-2F066B674F8B}"/>
-              </a:ext>
-            </a:extLst>
-          </p:cNvPr>
-          <p:cNvSpPr/>
-          <p:nvPr/>
-        </p:nvSpPr>
-        <p:spPr>
-          <a:xfrm>
-            <a:off x="2391304" y="4012793"/>
-            <a:ext cx="11462122" cy="8625906"/>
-          </a:xfrm>
-          <a:prstGeom prst="roundRect">
-            <a:avLst/>
-          </a:prstGeom>
-          <a:ln>
-            <a:solidFill>
-              <a:schemeClr val="tx1"/>
-            </a:solidFill>
-          </a:ln>
-        </p:spPr>
-        <p:style>
-          <a:lnRef idx="2">
-            <a:schemeClr val="accent6"/>
-          </a:lnRef>
-          <a:fillRef idx="1">
-            <a:schemeClr val="lt1"/>
-          </a:fillRef>
-          <a:effectRef idx="0">
-            <a:schemeClr val="accent6"/>
-          </a:effectRef>
-          <a:fontRef idx="minor">
-            <a:schemeClr val="dk1"/>
-          </a:fontRef>
-        </p:style>
-        <p:txBody>
-          <a:bodyPr rtlCol="0" anchor="ctr"/>
-          <a:lstStyle/>
-          <a:p>
-            <a:pPr algn="ctr"/>
-            <a:endParaRPr lang="en-ZA"/>
-          </a:p>
-        </p:txBody>
-      </p:sp>
-      <p:sp>
-        <p:nvSpPr>
-          <p:cNvPr id="54" name="TextBox 53">
-            <a:extLst>
-              <a:ext uri="{FF2B5EF4-FFF2-40B4-BE49-F238E27FC236}">
-                <a16:creationId xmlns:a16="http://schemas.microsoft.com/office/drawing/2014/main" id="{57EDA641-F39A-4067-8F76-B15FFD387E77}"/>
-              </a:ext>
-            </a:extLst>
-          </p:cNvPr>
-          <p:cNvSpPr txBox="1"/>
-          <p:nvPr/>
-        </p:nvSpPr>
-        <p:spPr>
-          <a:xfrm>
-            <a:off x="3495258" y="5171383"/>
-            <a:ext cx="10027991" cy="1200329"/>
-          </a:xfrm>
-          <a:prstGeom prst="rect">
-            <a:avLst/>
-          </a:prstGeom>
-          <a:noFill/>
-        </p:spPr>
-        <p:txBody>
-          <a:bodyPr wrap="square" rtlCol="0">
-            <a:spAutoFit/>
-          </a:bodyPr>
-          <a:lstStyle/>
-          <a:p>
-            <a:r>
-              <a:rPr lang="en-ZA" sz="2400" b="1" dirty="0"/>
-              <a:t>System overview</a:t>
-            </a:r>
-          </a:p>
-          <a:p>
-            <a:endParaRPr lang="en-ZA" sz="2400" b="1" dirty="0"/>
-          </a:p>
-          <a:p>
-            <a:r>
-              <a:rPr lang="en-ZA" sz="2400" dirty="0" err="1"/>
-              <a:t>Isentially</a:t>
-            </a:r>
-            <a:r>
-              <a:rPr lang="en-ZA" sz="2400" dirty="0"/>
-              <a:t> the system is tasked </a:t>
-            </a:r>
-            <a:r>
-              <a:rPr lang="en-ZA" sz="2400" dirty="0" err="1"/>
-              <a:t>woth</a:t>
-            </a:r>
-            <a:endParaRPr lang="en-ZA" dirty="0"/>
-          </a:p>
-        </p:txBody>
-      </p:sp>
-      <p:sp>
-        <p:nvSpPr>
-          <p:cNvPr id="55" name="Rectangle: Rounded Corners 54">
-            <a:extLst>
-              <a:ext uri="{FF2B5EF4-FFF2-40B4-BE49-F238E27FC236}">
-                <a16:creationId xmlns:a16="http://schemas.microsoft.com/office/drawing/2014/main" id="{1673DA3A-27AD-4814-964D-F948866FE390}"/>
-              </a:ext>
-            </a:extLst>
-          </p:cNvPr>
-          <p:cNvSpPr/>
-          <p:nvPr/>
-        </p:nvSpPr>
-        <p:spPr>
-          <a:xfrm>
-            <a:off x="3513115" y="13627097"/>
-            <a:ext cx="9143820" cy="6711684"/>
-          </a:xfrm>
-          <a:prstGeom prst="roundRect">
-            <a:avLst/>
-          </a:prstGeom>
-          <a:ln>
-            <a:solidFill>
-              <a:schemeClr val="tx1"/>
-            </a:solidFill>
-          </a:ln>
-        </p:spPr>
-        <p:style>
-          <a:lnRef idx="2">
-            <a:schemeClr val="accent6"/>
-          </a:lnRef>
-          <a:fillRef idx="1">
-            <a:schemeClr val="lt1"/>
-          </a:fillRef>
-          <a:effectRef idx="0">
-            <a:schemeClr val="accent6"/>
-          </a:effectRef>
-          <a:fontRef idx="minor">
-            <a:schemeClr val="dk1"/>
-          </a:fontRef>
-        </p:style>
-        <p:txBody>
-          <a:bodyPr rtlCol="0" anchor="ctr"/>
-          <a:lstStyle/>
-          <a:p>
-            <a:pPr algn="ctr"/>
-            <a:endParaRPr lang="en-ZA"/>
-          </a:p>
-        </p:txBody>
-      </p:sp>
-      <p:grpSp>
-        <p:nvGrpSpPr>
-          <p:cNvPr id="56" name="Group 55">
-            <a:extLst>
-              <a:ext uri="{FF2B5EF4-FFF2-40B4-BE49-F238E27FC236}">
-                <a16:creationId xmlns:a16="http://schemas.microsoft.com/office/drawing/2014/main" id="{933F6AFC-B9A7-44E2-A411-D681101C3C71}"/>
-              </a:ext>
-            </a:extLst>
-          </p:cNvPr>
-          <p:cNvGrpSpPr/>
-          <p:nvPr/>
-        </p:nvGrpSpPr>
-        <p:grpSpPr>
-          <a:xfrm>
-            <a:off x="4046496" y="17251338"/>
-            <a:ext cx="8794093" cy="4029195"/>
-            <a:chOff x="15555487" y="3261832"/>
-            <a:chExt cx="11365968" cy="4529251"/>
-          </a:xfrm>
-        </p:grpSpPr>
-        <p:cxnSp>
-          <p:nvCxnSpPr>
-            <p:cNvPr id="57" name="Straight Arrow Connector 56">
-              <a:extLst>
-                <a:ext uri="{FF2B5EF4-FFF2-40B4-BE49-F238E27FC236}">
-                  <a16:creationId xmlns:a16="http://schemas.microsoft.com/office/drawing/2014/main" id="{CE1D4C70-B0ED-4DAC-B89B-F3EAEB00279B}"/>
-                </a:ext>
-              </a:extLst>
-            </p:cNvPr>
-            <p:cNvCxnSpPr>
-              <a:cxnSpLocks/>
-              <a:stCxn id="59" idx="3"/>
-              <a:endCxn id="60" idx="1"/>
-            </p:cNvCxnSpPr>
-            <p:nvPr/>
-          </p:nvCxnSpPr>
-          <p:spPr bwMode="auto">
-            <a:xfrm>
-              <a:off x="19190040" y="5667234"/>
-              <a:ext cx="289797" cy="1018287"/>
-            </a:xfrm>
-            <a:prstGeom prst="straightConnector1">
-              <a:avLst/>
-            </a:prstGeom>
-            <a:solidFill>
-              <a:schemeClr val="accent1"/>
-            </a:solidFill>
-            <a:ln w="12700" cap="sq" cmpd="sng" algn="ctr">
-              <a:solidFill>
-                <a:schemeClr val="tx1"/>
-              </a:solidFill>
-              <a:prstDash val="solid"/>
-              <a:round/>
-              <a:headEnd type="none" w="sm" len="sm"/>
-              <a:tailEnd type="triangle"/>
-            </a:ln>
-            <a:effectLst/>
-          </p:spPr>
-        </p:cxnSp>
-        <p:pic>
-          <p:nvPicPr>
-            <p:cNvPr id="58" name="Content Placeholder 4">
-              <a:extLst>
-                <a:ext uri="{FF2B5EF4-FFF2-40B4-BE49-F238E27FC236}">
-                  <a16:creationId xmlns:a16="http://schemas.microsoft.com/office/drawing/2014/main" id="{ECCEC914-6888-499E-A408-AE112CE7508F}"/>
-                </a:ext>
-              </a:extLst>
-            </p:cNvPr>
-            <p:cNvPicPr>
-              <a:picLocks noChangeAspect="1"/>
-            </p:cNvPicPr>
-            <p:nvPr/>
-          </p:nvPicPr>
-          <p:blipFill rotWithShape="1">
-            <a:blip r:embed="rId2" cstate="print">
-              <a:extLst>
-                <a:ext uri="{28A0092B-C50C-407E-A947-70E740481C1C}">
-                  <a14:useLocalDpi xmlns:a14="http://schemas.microsoft.com/office/drawing/2010/main" val="0"/>
-                </a:ext>
-              </a:extLst>
-            </a:blip>
-            <a:srcRect l="1903" t="2281" b="-991"/>
-            <a:stretch/>
-          </p:blipFill>
-          <p:spPr>
-            <a:xfrm>
-              <a:off x="15555487" y="4383228"/>
-              <a:ext cx="1808880" cy="2568011"/>
-            </a:xfrm>
-            <a:prstGeom prst="rect">
-              <a:avLst/>
-            </a:prstGeom>
-          </p:spPr>
-        </p:pic>
-        <p:sp>
-          <p:nvSpPr>
-            <p:cNvPr id="59" name="Rectangle: Rounded Corners 58">
-              <a:extLst>
-                <a:ext uri="{FF2B5EF4-FFF2-40B4-BE49-F238E27FC236}">
-                  <a16:creationId xmlns:a16="http://schemas.microsoft.com/office/drawing/2014/main" id="{A52E3462-F5B4-4549-9970-99659ED5C58E}"/>
-                </a:ext>
-              </a:extLst>
-            </p:cNvPr>
-            <p:cNvSpPr/>
-            <p:nvPr/>
-          </p:nvSpPr>
-          <p:spPr bwMode="auto">
-            <a:xfrm>
-              <a:off x="17558188" y="5200949"/>
-              <a:ext cx="1631852" cy="932570"/>
-            </a:xfrm>
-            <a:prstGeom prst="roundRect">
-              <a:avLst/>
-            </a:prstGeom>
-            <a:ln>
-              <a:headEnd type="none" w="sm" len="sm"/>
-              <a:tailEnd type="none" w="sm" len="sm"/>
-            </a:ln>
-          </p:spPr>
-          <p:style>
-            <a:lnRef idx="2">
-              <a:schemeClr val="accent1"/>
-            </a:lnRef>
-            <a:fillRef idx="1">
-              <a:schemeClr val="lt1"/>
-            </a:fillRef>
-            <a:effectRef idx="0">
-              <a:schemeClr val="accent1"/>
-            </a:effectRef>
-            <a:fontRef idx="minor">
-              <a:schemeClr val="dk1"/>
-            </a:fontRef>
-          </p:style>
-          <p:txBody>
-            <a:bodyPr vert="horz" wrap="square" lIns="91440" tIns="45720" rIns="91440" bIns="45720" numCol="1" rtlCol="0" anchor="t" anchorCtr="0" compatLnSpc="1">
-              <a:prstTxWarp prst="textNoShape">
-                <a:avLst/>
-              </a:prstTxWarp>
-            </a:bodyPr>
-            <a:lstStyle/>
-            <a:p>
-              <a:pPr marL="0" marR="0" indent="0" algn="l" defTabSz="914400" rtl="0" eaLnBrk="1" fontAlgn="base" latinLnBrk="0" hangingPunct="1">
-                <a:lnSpc>
-                  <a:spcPct val="100000"/>
-                </a:lnSpc>
-                <a:spcBef>
-                  <a:spcPct val="0"/>
-                </a:spcBef>
-                <a:spcAft>
-                  <a:spcPct val="0"/>
-                </a:spcAft>
-                <a:buClrTx/>
-                <a:buSzTx/>
-                <a:buFontTx/>
-                <a:buNone/>
-                <a:tabLst/>
-              </a:pPr>
-              <a:r>
-                <a:rPr kumimoji="0" lang="en-ZA" sz="2400" b="0" i="0" u="none" strike="noStrike" cap="none" normalizeH="0" baseline="0" dirty="0">
-                  <a:ln>
-                    <a:noFill/>
-                  </a:ln>
-                  <a:solidFill>
-                    <a:schemeClr val="tx1"/>
-                  </a:solidFill>
-                  <a:effectLst/>
-                  <a:latin typeface="Times New Roman" pitchFamily="18" charset="0"/>
-                </a:rPr>
-                <a:t>Image Processing</a:t>
-              </a:r>
-            </a:p>
-          </p:txBody>
-        </p:sp>
-        <p:sp>
-          <p:nvSpPr>
-            <p:cNvPr id="60" name="Rectangle: Rounded Corners 59">
-              <a:extLst>
-                <a:ext uri="{FF2B5EF4-FFF2-40B4-BE49-F238E27FC236}">
-                  <a16:creationId xmlns:a16="http://schemas.microsoft.com/office/drawing/2014/main" id="{80B0BFA4-35A7-4EC8-9D00-39EA26E56215}"/>
-                </a:ext>
-              </a:extLst>
-            </p:cNvPr>
-            <p:cNvSpPr/>
-            <p:nvPr/>
-          </p:nvSpPr>
-          <p:spPr bwMode="auto">
-            <a:xfrm>
-              <a:off x="19479837" y="6219236"/>
-              <a:ext cx="1631852" cy="932570"/>
-            </a:xfrm>
-            <a:prstGeom prst="roundRect">
-              <a:avLst/>
-            </a:prstGeom>
-            <a:ln>
-              <a:headEnd type="none" w="sm" len="sm"/>
-              <a:tailEnd type="none" w="sm" len="sm"/>
-            </a:ln>
-          </p:spPr>
-          <p:style>
-            <a:lnRef idx="2">
-              <a:schemeClr val="accent1"/>
-            </a:lnRef>
-            <a:fillRef idx="1">
-              <a:schemeClr val="lt1"/>
-            </a:fillRef>
-            <a:effectRef idx="0">
-              <a:schemeClr val="accent1"/>
-            </a:effectRef>
-            <a:fontRef idx="minor">
-              <a:schemeClr val="dk1"/>
-            </a:fontRef>
-          </p:style>
-          <p:txBody>
-            <a:bodyPr vert="horz" wrap="square" lIns="91440" tIns="45720" rIns="91440" bIns="45720" numCol="1" rtlCol="0" anchor="t" anchorCtr="0" compatLnSpc="1">
-              <a:prstTxWarp prst="textNoShape">
-                <a:avLst/>
-              </a:prstTxWarp>
-            </a:bodyPr>
-            <a:lstStyle/>
-            <a:p>
-              <a:pPr marL="0" marR="0" indent="0" algn="l" defTabSz="914400" rtl="0" eaLnBrk="1" fontAlgn="base" latinLnBrk="0" hangingPunct="1">
-                <a:lnSpc>
-                  <a:spcPct val="100000"/>
-                </a:lnSpc>
-                <a:spcBef>
-                  <a:spcPct val="0"/>
-                </a:spcBef>
-                <a:spcAft>
-                  <a:spcPct val="0"/>
-                </a:spcAft>
-                <a:buClrTx/>
-                <a:buSzTx/>
-                <a:buFontTx/>
-                <a:buNone/>
-                <a:tabLst/>
-              </a:pPr>
-              <a:r>
-                <a:rPr kumimoji="0" lang="en-ZA" sz="2400" b="0" i="0" u="none" strike="noStrike" cap="none" normalizeH="0" baseline="0" dirty="0">
-                  <a:ln>
-                    <a:noFill/>
-                  </a:ln>
-                  <a:solidFill>
-                    <a:schemeClr val="tx1"/>
-                  </a:solidFill>
-                  <a:effectLst/>
-                  <a:latin typeface="Times New Roman" pitchFamily="18" charset="0"/>
-                </a:rPr>
-                <a:t>Bubble evidence</a:t>
-              </a:r>
-            </a:p>
-          </p:txBody>
-        </p:sp>
-        <p:sp>
-          <p:nvSpPr>
-            <p:cNvPr id="61" name="Rectangle: Rounded Corners 60">
-              <a:extLst>
-                <a:ext uri="{FF2B5EF4-FFF2-40B4-BE49-F238E27FC236}">
-                  <a16:creationId xmlns:a16="http://schemas.microsoft.com/office/drawing/2014/main" id="{1127A86D-3232-406A-B661-81A7E0D8F290}"/>
-                </a:ext>
-              </a:extLst>
-            </p:cNvPr>
-            <p:cNvSpPr/>
-            <p:nvPr/>
-          </p:nvSpPr>
-          <p:spPr bwMode="auto">
-            <a:xfrm>
-              <a:off x="19479838" y="5134621"/>
-              <a:ext cx="1631852" cy="932570"/>
-            </a:xfrm>
-            <a:prstGeom prst="roundRect">
-              <a:avLst/>
-            </a:prstGeom>
-            <a:ln>
-              <a:headEnd type="none" w="sm" len="sm"/>
-              <a:tailEnd type="none" w="sm" len="sm"/>
-            </a:ln>
-          </p:spPr>
-          <p:style>
-            <a:lnRef idx="2">
-              <a:schemeClr val="accent1"/>
-            </a:lnRef>
-            <a:fillRef idx="1">
-              <a:schemeClr val="lt1"/>
-            </a:fillRef>
-            <a:effectRef idx="0">
-              <a:schemeClr val="accent1"/>
-            </a:effectRef>
-            <a:fontRef idx="minor">
-              <a:schemeClr val="dk1"/>
-            </a:fontRef>
-          </p:style>
-          <p:txBody>
-            <a:bodyPr vert="horz" wrap="square" lIns="91440" tIns="45720" rIns="91440" bIns="45720" numCol="1" rtlCol="0" anchor="t" anchorCtr="0" compatLnSpc="1">
-              <a:prstTxWarp prst="textNoShape">
-                <a:avLst/>
-              </a:prstTxWarp>
-            </a:bodyPr>
-            <a:lstStyle/>
-            <a:p>
-              <a:pPr marL="0" marR="0" indent="0" algn="l" defTabSz="914400" rtl="0" eaLnBrk="1" fontAlgn="base" latinLnBrk="0" hangingPunct="1">
-                <a:lnSpc>
-                  <a:spcPct val="100000"/>
-                </a:lnSpc>
-                <a:spcBef>
-                  <a:spcPct val="0"/>
-                </a:spcBef>
-                <a:spcAft>
-                  <a:spcPct val="0"/>
-                </a:spcAft>
-                <a:buClrTx/>
-                <a:buSzTx/>
-                <a:buFontTx/>
-                <a:buNone/>
-                <a:tabLst/>
-              </a:pPr>
-              <a:r>
-                <a:rPr kumimoji="0" lang="en-ZA" sz="2400" b="0" i="0" u="none" strike="noStrike" cap="none" normalizeH="0" baseline="0" dirty="0">
-                  <a:ln>
-                    <a:noFill/>
-                  </a:ln>
-                  <a:solidFill>
-                    <a:schemeClr val="tx1"/>
-                  </a:solidFill>
-                  <a:effectLst/>
-                  <a:latin typeface="Times New Roman" pitchFamily="18" charset="0"/>
-                </a:rPr>
-                <a:t>Character evidence</a:t>
-              </a:r>
-            </a:p>
-          </p:txBody>
-        </p:sp>
-        <p:sp>
-          <p:nvSpPr>
-            <p:cNvPr id="62" name="Rectangle: Rounded Corners 61">
-              <a:extLst>
-                <a:ext uri="{FF2B5EF4-FFF2-40B4-BE49-F238E27FC236}">
-                  <a16:creationId xmlns:a16="http://schemas.microsoft.com/office/drawing/2014/main" id="{BAC7C1CB-4437-430B-BCF1-C5AE96202B7E}"/>
-                </a:ext>
-              </a:extLst>
-            </p:cNvPr>
-            <p:cNvSpPr/>
-            <p:nvPr/>
-          </p:nvSpPr>
-          <p:spPr bwMode="auto">
-            <a:xfrm>
-              <a:off x="21305511" y="5134621"/>
-              <a:ext cx="1631852" cy="932570"/>
-            </a:xfrm>
-            <a:prstGeom prst="roundRect">
-              <a:avLst/>
-            </a:prstGeom>
-            <a:ln>
-              <a:headEnd type="none" w="sm" len="sm"/>
-              <a:tailEnd type="none" w="sm" len="sm"/>
-            </a:ln>
-          </p:spPr>
-          <p:style>
-            <a:lnRef idx="2">
-              <a:schemeClr val="accent1"/>
-            </a:lnRef>
-            <a:fillRef idx="1">
-              <a:schemeClr val="lt1"/>
-            </a:fillRef>
-            <a:effectRef idx="0">
-              <a:schemeClr val="accent1"/>
-            </a:effectRef>
-            <a:fontRef idx="minor">
-              <a:schemeClr val="dk1"/>
-            </a:fontRef>
-          </p:style>
-          <p:txBody>
-            <a:bodyPr vert="horz" wrap="square" lIns="91440" tIns="45720" rIns="91440" bIns="45720" numCol="1" rtlCol="0" anchor="t" anchorCtr="0" compatLnSpc="1">
-              <a:prstTxWarp prst="textNoShape">
-                <a:avLst/>
-              </a:prstTxWarp>
-            </a:bodyPr>
-            <a:lstStyle/>
-            <a:p>
-              <a:pPr marL="0" marR="0" indent="0" algn="l" defTabSz="914400" rtl="0" eaLnBrk="1" fontAlgn="base" latinLnBrk="0" hangingPunct="1">
-                <a:lnSpc>
-                  <a:spcPct val="100000"/>
-                </a:lnSpc>
-                <a:spcBef>
-                  <a:spcPct val="0"/>
-                </a:spcBef>
-                <a:spcAft>
-                  <a:spcPct val="0"/>
-                </a:spcAft>
-                <a:buClrTx/>
-                <a:buSzTx/>
-                <a:buFontTx/>
-                <a:buNone/>
-                <a:tabLst/>
-              </a:pPr>
-              <a:r>
-                <a:rPr kumimoji="0" lang="en-ZA" sz="2400" b="0" i="0" u="none" strike="noStrike" cap="none" normalizeH="0" baseline="0" dirty="0">
-                  <a:ln>
-                    <a:noFill/>
-                  </a:ln>
-                  <a:solidFill>
-                    <a:schemeClr val="tx1"/>
-                  </a:solidFill>
-                  <a:effectLst/>
-                  <a:latin typeface="Times New Roman" pitchFamily="18" charset="0"/>
-                </a:rPr>
-                <a:t>Neural Network</a:t>
-              </a:r>
-            </a:p>
-          </p:txBody>
-        </p:sp>
-        <p:sp>
-          <p:nvSpPr>
-            <p:cNvPr id="63" name="Rectangle: Rounded Corners 62">
-              <a:extLst>
-                <a:ext uri="{FF2B5EF4-FFF2-40B4-BE49-F238E27FC236}">
-                  <a16:creationId xmlns:a16="http://schemas.microsoft.com/office/drawing/2014/main" id="{769C206B-BE66-4C85-845F-11BD8F9BBA55}"/>
-                </a:ext>
-              </a:extLst>
-            </p:cNvPr>
-            <p:cNvSpPr/>
-            <p:nvPr/>
-          </p:nvSpPr>
-          <p:spPr bwMode="auto">
-            <a:xfrm>
-              <a:off x="23349535" y="5595334"/>
-              <a:ext cx="1978564" cy="1283691"/>
-            </a:xfrm>
-            <a:prstGeom prst="roundRect">
-              <a:avLst/>
-            </a:prstGeom>
-            <a:ln>
-              <a:headEnd type="none" w="sm" len="sm"/>
-              <a:tailEnd type="none" w="sm" len="sm"/>
-            </a:ln>
-          </p:spPr>
-          <p:style>
-            <a:lnRef idx="2">
-              <a:schemeClr val="accent1"/>
-            </a:lnRef>
-            <a:fillRef idx="1">
-              <a:schemeClr val="lt1"/>
-            </a:fillRef>
-            <a:effectRef idx="0">
-              <a:schemeClr val="accent1"/>
-            </a:effectRef>
-            <a:fontRef idx="minor">
-              <a:schemeClr val="dk1"/>
-            </a:fontRef>
-          </p:style>
-          <p:txBody>
-            <a:bodyPr vert="horz" wrap="square" lIns="91440" tIns="45720" rIns="91440" bIns="45720" numCol="1" rtlCol="0" anchor="t" anchorCtr="0" compatLnSpc="1">
-              <a:prstTxWarp prst="textNoShape">
-                <a:avLst/>
-              </a:prstTxWarp>
-            </a:bodyPr>
-            <a:lstStyle/>
-            <a:p>
-              <a:pPr marL="0" marR="0" indent="0" algn="l" defTabSz="914400" rtl="0" eaLnBrk="1" fontAlgn="base" latinLnBrk="0" hangingPunct="1">
-                <a:lnSpc>
-                  <a:spcPct val="100000"/>
-                </a:lnSpc>
-                <a:spcBef>
-                  <a:spcPct val="0"/>
-                </a:spcBef>
-                <a:spcAft>
-                  <a:spcPct val="0"/>
-                </a:spcAft>
-                <a:buClrTx/>
-                <a:buSzTx/>
-                <a:buFontTx/>
-                <a:buNone/>
-                <a:tabLst/>
-              </a:pPr>
-              <a:r>
-                <a:rPr kumimoji="0" lang="en-ZA" sz="2400" b="0" i="0" u="none" strike="noStrike" cap="none" normalizeH="0" baseline="0" dirty="0">
-                  <a:ln>
-                    <a:noFill/>
-                  </a:ln>
-                  <a:solidFill>
-                    <a:schemeClr val="tx1"/>
-                  </a:solidFill>
-                  <a:effectLst/>
-                  <a:latin typeface="Times New Roman" pitchFamily="18" charset="0"/>
-                </a:rPr>
-                <a:t>Probabilistic graphical models</a:t>
-              </a:r>
-            </a:p>
-          </p:txBody>
-        </p:sp>
-        <p:sp>
-          <p:nvSpPr>
-            <p:cNvPr id="64" name="TextBox 63">
-              <a:extLst>
-                <a:ext uri="{FF2B5EF4-FFF2-40B4-BE49-F238E27FC236}">
-                  <a16:creationId xmlns:a16="http://schemas.microsoft.com/office/drawing/2014/main" id="{76F2C23F-CC7F-46B7-A313-436F2700B2D2}"/>
-                </a:ext>
-              </a:extLst>
-            </p:cNvPr>
-            <p:cNvSpPr txBox="1"/>
-            <p:nvPr/>
-          </p:nvSpPr>
-          <p:spPr>
-            <a:xfrm>
-              <a:off x="25521920" y="6006347"/>
-              <a:ext cx="1399535" cy="461665"/>
-            </a:xfrm>
-            <a:prstGeom prst="rect">
-              <a:avLst/>
-            </a:prstGeom>
-            <a:noFill/>
-          </p:spPr>
-          <p:txBody>
-            <a:bodyPr wrap="square" rtlCol="0">
-              <a:spAutoFit/>
-            </a:bodyPr>
-            <a:lstStyle/>
-            <a:p>
-              <a:r>
-                <a:rPr lang="en-ZA" dirty="0">
-                  <a:effectLst/>
-                </a:rPr>
-                <a:t>Answers</a:t>
-              </a:r>
-            </a:p>
-          </p:txBody>
-        </p:sp>
-        <p:cxnSp>
-          <p:nvCxnSpPr>
-            <p:cNvPr id="65" name="Straight Arrow Connector 64">
-              <a:extLst>
-                <a:ext uri="{FF2B5EF4-FFF2-40B4-BE49-F238E27FC236}">
-                  <a16:creationId xmlns:a16="http://schemas.microsoft.com/office/drawing/2014/main" id="{4A9A94DA-A496-4F8A-BAC2-4410233AB35B}"/>
-                </a:ext>
-              </a:extLst>
-            </p:cNvPr>
-            <p:cNvCxnSpPr>
-              <a:stCxn id="58" idx="3"/>
-              <a:endCxn id="59" idx="1"/>
-            </p:cNvCxnSpPr>
-            <p:nvPr/>
-          </p:nvCxnSpPr>
-          <p:spPr bwMode="auto">
-            <a:xfrm>
-              <a:off x="17364367" y="5667234"/>
-              <a:ext cx="193821" cy="0"/>
-            </a:xfrm>
-            <a:prstGeom prst="straightConnector1">
-              <a:avLst/>
-            </a:prstGeom>
-            <a:solidFill>
-              <a:schemeClr val="accent1"/>
-            </a:solidFill>
-            <a:ln w="12700" cap="sq" cmpd="sng" algn="ctr">
-              <a:solidFill>
-                <a:schemeClr val="tx1"/>
-              </a:solidFill>
-              <a:prstDash val="solid"/>
-              <a:round/>
-              <a:headEnd type="none" w="sm" len="sm"/>
-              <a:tailEnd type="triangle"/>
-            </a:ln>
-            <a:effectLst/>
-          </p:spPr>
-        </p:cxnSp>
-        <p:cxnSp>
-          <p:nvCxnSpPr>
-            <p:cNvPr id="66" name="Straight Arrow Connector 65">
-              <a:extLst>
-                <a:ext uri="{FF2B5EF4-FFF2-40B4-BE49-F238E27FC236}">
-                  <a16:creationId xmlns:a16="http://schemas.microsoft.com/office/drawing/2014/main" id="{005A199A-0939-427D-BB20-DC245548B571}"/>
-                </a:ext>
-              </a:extLst>
-            </p:cNvPr>
-            <p:cNvCxnSpPr>
-              <a:cxnSpLocks/>
-              <a:stCxn id="61" idx="3"/>
-              <a:endCxn id="62" idx="1"/>
-            </p:cNvCxnSpPr>
-            <p:nvPr/>
-          </p:nvCxnSpPr>
-          <p:spPr bwMode="auto">
-            <a:xfrm>
-              <a:off x="21111690" y="5600906"/>
-              <a:ext cx="193821" cy="0"/>
-            </a:xfrm>
-            <a:prstGeom prst="straightConnector1">
-              <a:avLst/>
-            </a:prstGeom>
-            <a:solidFill>
-              <a:schemeClr val="accent1"/>
-            </a:solidFill>
-            <a:ln w="12700" cap="sq" cmpd="sng" algn="ctr">
-              <a:solidFill>
-                <a:schemeClr val="tx1"/>
-              </a:solidFill>
-              <a:prstDash val="solid"/>
-              <a:round/>
-              <a:headEnd type="none" w="sm" len="sm"/>
-              <a:tailEnd type="triangle"/>
-            </a:ln>
-            <a:effectLst/>
-          </p:spPr>
-        </p:cxnSp>
-        <p:cxnSp>
-          <p:nvCxnSpPr>
-            <p:cNvPr id="67" name="Straight Arrow Connector 66">
-              <a:extLst>
-                <a:ext uri="{FF2B5EF4-FFF2-40B4-BE49-F238E27FC236}">
-                  <a16:creationId xmlns:a16="http://schemas.microsoft.com/office/drawing/2014/main" id="{37B26BF7-60E5-49B0-9FBB-AFD770099897}"/>
-                </a:ext>
-              </a:extLst>
-            </p:cNvPr>
-            <p:cNvCxnSpPr>
-              <a:cxnSpLocks/>
-              <a:stCxn id="60" idx="3"/>
-              <a:endCxn id="63" idx="1"/>
-            </p:cNvCxnSpPr>
-            <p:nvPr/>
-          </p:nvCxnSpPr>
-          <p:spPr bwMode="auto">
-            <a:xfrm flipV="1">
-              <a:off x="21111689" y="6237180"/>
-              <a:ext cx="2237846" cy="448341"/>
-            </a:xfrm>
-            <a:prstGeom prst="straightConnector1">
-              <a:avLst/>
-            </a:prstGeom>
-            <a:solidFill>
-              <a:schemeClr val="accent1"/>
-            </a:solidFill>
-            <a:ln w="12700" cap="sq" cmpd="sng" algn="ctr">
-              <a:solidFill>
-                <a:schemeClr val="tx1"/>
-              </a:solidFill>
-              <a:prstDash val="solid"/>
-              <a:round/>
-              <a:headEnd type="none" w="sm" len="sm"/>
-              <a:tailEnd type="triangle"/>
-            </a:ln>
-            <a:effectLst/>
-          </p:spPr>
-        </p:cxnSp>
-        <p:cxnSp>
-          <p:nvCxnSpPr>
-            <p:cNvPr id="68" name="Straight Arrow Connector 67">
-              <a:extLst>
-                <a:ext uri="{FF2B5EF4-FFF2-40B4-BE49-F238E27FC236}">
-                  <a16:creationId xmlns:a16="http://schemas.microsoft.com/office/drawing/2014/main" id="{A7C68880-5EAC-4385-8D1D-4FE5EA7497D5}"/>
-                </a:ext>
-              </a:extLst>
-            </p:cNvPr>
-            <p:cNvCxnSpPr>
-              <a:cxnSpLocks/>
-              <a:stCxn id="63" idx="3"/>
-              <a:endCxn id="64" idx="1"/>
-            </p:cNvCxnSpPr>
-            <p:nvPr/>
-          </p:nvCxnSpPr>
-          <p:spPr bwMode="auto">
-            <a:xfrm>
-              <a:off x="25328099" y="6329513"/>
-              <a:ext cx="193821" cy="0"/>
-            </a:xfrm>
-            <a:prstGeom prst="straightConnector1">
-              <a:avLst/>
-            </a:prstGeom>
-            <a:solidFill>
-              <a:schemeClr val="accent1"/>
-            </a:solidFill>
-            <a:ln w="12700" cap="sq" cmpd="sng" algn="ctr">
-              <a:solidFill>
-                <a:schemeClr val="tx1"/>
-              </a:solidFill>
-              <a:prstDash val="solid"/>
-              <a:round/>
-              <a:headEnd type="none" w="sm" len="sm"/>
-              <a:tailEnd type="triangle"/>
-            </a:ln>
-            <a:effectLst/>
-          </p:spPr>
-        </p:cxnSp>
-        <p:cxnSp>
-          <p:nvCxnSpPr>
-            <p:cNvPr id="69" name="Straight Arrow Connector 68">
-              <a:extLst>
-                <a:ext uri="{FF2B5EF4-FFF2-40B4-BE49-F238E27FC236}">
-                  <a16:creationId xmlns:a16="http://schemas.microsoft.com/office/drawing/2014/main" id="{85BB2B39-B7CD-4D97-B13B-E45043F9EF67}"/>
-                </a:ext>
-              </a:extLst>
-            </p:cNvPr>
-            <p:cNvCxnSpPr>
-              <a:cxnSpLocks/>
-              <a:stCxn id="62" idx="3"/>
-              <a:endCxn id="63" idx="1"/>
-            </p:cNvCxnSpPr>
-            <p:nvPr/>
-          </p:nvCxnSpPr>
-          <p:spPr bwMode="auto">
-            <a:xfrm>
-              <a:off x="22937363" y="5600906"/>
-              <a:ext cx="412172" cy="636274"/>
-            </a:xfrm>
-            <a:prstGeom prst="straightConnector1">
-              <a:avLst/>
-            </a:prstGeom>
-            <a:solidFill>
-              <a:schemeClr val="accent1"/>
-            </a:solidFill>
-            <a:ln w="12700" cap="sq" cmpd="sng" algn="ctr">
-              <a:solidFill>
-                <a:schemeClr val="tx1"/>
-              </a:solidFill>
-              <a:prstDash val="solid"/>
-              <a:round/>
-              <a:headEnd type="none" w="sm" len="sm"/>
-              <a:tailEnd type="triangle"/>
-            </a:ln>
-            <a:effectLst/>
-          </p:spPr>
-        </p:cxnSp>
-        <p:cxnSp>
-          <p:nvCxnSpPr>
-            <p:cNvPr id="70" name="Straight Arrow Connector 69">
-              <a:extLst>
-                <a:ext uri="{FF2B5EF4-FFF2-40B4-BE49-F238E27FC236}">
-                  <a16:creationId xmlns:a16="http://schemas.microsoft.com/office/drawing/2014/main" id="{42D52CE6-19EE-4F17-9AA4-601FF109A8A1}"/>
-                </a:ext>
-              </a:extLst>
-            </p:cNvPr>
-            <p:cNvCxnSpPr>
-              <a:cxnSpLocks/>
-              <a:stCxn id="59" idx="3"/>
-              <a:endCxn id="61" idx="1"/>
-            </p:cNvCxnSpPr>
-            <p:nvPr/>
-          </p:nvCxnSpPr>
-          <p:spPr bwMode="auto">
-            <a:xfrm flipV="1">
-              <a:off x="19190040" y="5600906"/>
-              <a:ext cx="289798" cy="66328"/>
-            </a:xfrm>
-            <a:prstGeom prst="straightConnector1">
-              <a:avLst/>
-            </a:prstGeom>
-            <a:solidFill>
-              <a:schemeClr val="accent1"/>
-            </a:solidFill>
-            <a:ln w="12700" cap="sq" cmpd="sng" algn="ctr">
-              <a:solidFill>
-                <a:schemeClr val="tx1"/>
-              </a:solidFill>
-              <a:prstDash val="solid"/>
-              <a:round/>
-              <a:headEnd type="none" w="sm" len="sm"/>
-              <a:tailEnd type="triangle"/>
-            </a:ln>
-            <a:effectLst/>
-          </p:spPr>
-        </p:cxnSp>
-        <p:pic>
-          <p:nvPicPr>
-            <p:cNvPr id="71" name="Picture 70">
-              <a:extLst>
-                <a:ext uri="{FF2B5EF4-FFF2-40B4-BE49-F238E27FC236}">
-                  <a16:creationId xmlns:a16="http://schemas.microsoft.com/office/drawing/2014/main" id="{E95F0C3D-50CA-41B5-B032-BCBCD5718184}"/>
-                </a:ext>
-              </a:extLst>
-            </p:cNvPr>
-            <p:cNvPicPr>
-              <a:picLocks noChangeAspect="1"/>
-            </p:cNvPicPr>
-            <p:nvPr/>
-          </p:nvPicPr>
-          <p:blipFill rotWithShape="1">
-            <a:blip r:embed="rId3" cstate="print">
-              <a:extLst>
-                <a:ext uri="{28A0092B-C50C-407E-A947-70E740481C1C}">
-                  <a14:useLocalDpi xmlns:a14="http://schemas.microsoft.com/office/drawing/2010/main" val="0"/>
-                </a:ext>
-              </a:extLst>
-            </a:blip>
-            <a:srcRect r="61468"/>
-            <a:stretch/>
-          </p:blipFill>
-          <p:spPr>
-            <a:xfrm>
-              <a:off x="19688105" y="3769531"/>
-              <a:ext cx="1228795" cy="1227394"/>
-            </a:xfrm>
-            <a:prstGeom prst="rect">
-              <a:avLst/>
-            </a:prstGeom>
-          </p:spPr>
-        </p:pic>
-        <p:pic>
-          <p:nvPicPr>
-            <p:cNvPr id="72" name="Picture 71">
-              <a:extLst>
-                <a:ext uri="{FF2B5EF4-FFF2-40B4-BE49-F238E27FC236}">
-                  <a16:creationId xmlns:a16="http://schemas.microsoft.com/office/drawing/2014/main" id="{0B90D16E-D5A0-415A-BAA3-C346852EF78B}"/>
-                </a:ext>
-              </a:extLst>
-            </p:cNvPr>
-            <p:cNvPicPr>
-              <a:picLocks noChangeAspect="1"/>
-            </p:cNvPicPr>
-            <p:nvPr/>
-          </p:nvPicPr>
-          <p:blipFill>
-            <a:blip r:embed="rId4" cstate="print">
-              <a:extLst>
-                <a:ext uri="{28A0092B-C50C-407E-A947-70E740481C1C}">
-                  <a14:useLocalDpi xmlns:a14="http://schemas.microsoft.com/office/drawing/2010/main" val="0"/>
-                </a:ext>
-              </a:extLst>
-            </a:blip>
-            <a:stretch>
-              <a:fillRect/>
-            </a:stretch>
-          </p:blipFill>
-          <p:spPr>
-            <a:xfrm>
-              <a:off x="21326914" y="3848381"/>
-              <a:ext cx="1816535" cy="1069693"/>
-            </a:xfrm>
-            <a:prstGeom prst="rect">
-              <a:avLst/>
-            </a:prstGeom>
-          </p:spPr>
-        </p:pic>
-        <p:pic>
-          <p:nvPicPr>
-            <p:cNvPr id="73" name="Picture 72">
-              <a:extLst>
-                <a:ext uri="{FF2B5EF4-FFF2-40B4-BE49-F238E27FC236}">
-                  <a16:creationId xmlns:a16="http://schemas.microsoft.com/office/drawing/2014/main" id="{FD824978-0F2A-4070-9ABB-966B3B1C4239}"/>
-                </a:ext>
-              </a:extLst>
-            </p:cNvPr>
-            <p:cNvPicPr/>
-            <p:nvPr/>
-          </p:nvPicPr>
-          <p:blipFill rotWithShape="1">
-            <a:blip r:embed="rId5"/>
-            <a:srcRect l="32494" t="46249" r="65162" b="50357"/>
-            <a:stretch/>
-          </p:blipFill>
-          <p:spPr bwMode="auto">
-            <a:xfrm>
-              <a:off x="20725043" y="7349262"/>
-              <a:ext cx="386646" cy="335750"/>
-            </a:xfrm>
-            <a:prstGeom prst="rect">
-              <a:avLst/>
-            </a:prstGeom>
-          </p:spPr>
-        </p:pic>
-        <p:pic>
-          <p:nvPicPr>
-            <p:cNvPr id="74" name="Picture 73">
-              <a:extLst>
-                <a:ext uri="{FF2B5EF4-FFF2-40B4-BE49-F238E27FC236}">
-                  <a16:creationId xmlns:a16="http://schemas.microsoft.com/office/drawing/2014/main" id="{36B06932-C9C5-434B-903B-9599B8A6391F}"/>
-                </a:ext>
-              </a:extLst>
-            </p:cNvPr>
-            <p:cNvPicPr>
-              <a:picLocks noChangeAspect="1"/>
-            </p:cNvPicPr>
-            <p:nvPr/>
-          </p:nvPicPr>
-          <p:blipFill rotWithShape="1">
-            <a:blip r:embed="rId6">
-              <a:extLst>
-                <a:ext uri="{28A0092B-C50C-407E-A947-70E740481C1C}">
-                  <a14:useLocalDpi xmlns:a14="http://schemas.microsoft.com/office/drawing/2010/main" val="0"/>
-                </a:ext>
-              </a:extLst>
-            </a:blip>
-            <a:srcRect l="27943" t="80954" r="69615" b="17556"/>
-            <a:stretch/>
-          </p:blipFill>
-          <p:spPr>
-            <a:xfrm>
-              <a:off x="20225914" y="7380291"/>
-              <a:ext cx="393915" cy="362147"/>
-            </a:xfrm>
-            <a:prstGeom prst="rect">
-              <a:avLst/>
-            </a:prstGeom>
-          </p:spPr>
-        </p:pic>
-        <p:pic>
-          <p:nvPicPr>
-            <p:cNvPr id="75" name="Picture 74">
-              <a:extLst>
-                <a:ext uri="{FF2B5EF4-FFF2-40B4-BE49-F238E27FC236}">
-                  <a16:creationId xmlns:a16="http://schemas.microsoft.com/office/drawing/2014/main" id="{517F5C87-7CE9-4835-8477-937E01B98124}"/>
-                </a:ext>
-              </a:extLst>
-            </p:cNvPr>
-            <p:cNvPicPr/>
-            <p:nvPr/>
-          </p:nvPicPr>
-          <p:blipFill rotWithShape="1">
-            <a:blip r:embed="rId5"/>
-            <a:srcRect l="29391" t="46088" r="68218" b="50143"/>
-            <a:stretch/>
-          </p:blipFill>
-          <p:spPr bwMode="auto">
-            <a:xfrm>
-              <a:off x="19310062" y="7349262"/>
-              <a:ext cx="394271" cy="360507"/>
-            </a:xfrm>
-            <a:prstGeom prst="rect">
-              <a:avLst/>
-            </a:prstGeom>
-          </p:spPr>
-        </p:pic>
-        <p:pic>
-          <p:nvPicPr>
-            <p:cNvPr id="76" name="Picture 75">
-              <a:extLst>
-                <a:ext uri="{FF2B5EF4-FFF2-40B4-BE49-F238E27FC236}">
-                  <a16:creationId xmlns:a16="http://schemas.microsoft.com/office/drawing/2014/main" id="{86E53AA8-775F-43B4-8282-BA09C8246C59}"/>
-                </a:ext>
-              </a:extLst>
-            </p:cNvPr>
-            <p:cNvPicPr/>
-            <p:nvPr/>
-          </p:nvPicPr>
-          <p:blipFill rotWithShape="1">
-            <a:blip r:embed="rId5"/>
-            <a:srcRect l="35064" t="46088" r="61747" b="49155"/>
-            <a:stretch/>
-          </p:blipFill>
-          <p:spPr bwMode="auto">
-            <a:xfrm>
-              <a:off x="19745440" y="7336088"/>
-              <a:ext cx="525959" cy="454995"/>
-            </a:xfrm>
-            <a:prstGeom prst="rect">
-              <a:avLst/>
-            </a:prstGeom>
-          </p:spPr>
-        </p:pic>
-        <p:pic>
-          <p:nvPicPr>
-            <p:cNvPr id="77" name="Picture 76">
-              <a:extLst>
-                <a:ext uri="{FF2B5EF4-FFF2-40B4-BE49-F238E27FC236}">
-                  <a16:creationId xmlns:a16="http://schemas.microsoft.com/office/drawing/2014/main" id="{63BEF5A1-00B5-4CB3-B683-2B160AB188FB}"/>
-                </a:ext>
-              </a:extLst>
-            </p:cNvPr>
-            <p:cNvPicPr>
-              <a:picLocks noChangeAspect="1"/>
-            </p:cNvPicPr>
-            <p:nvPr/>
-          </p:nvPicPr>
-          <p:blipFill rotWithShape="1">
-            <a:blip r:embed="rId7">
-              <a:extLst>
-                <a:ext uri="{28A0092B-C50C-407E-A947-70E740481C1C}">
-                  <a14:useLocalDpi xmlns:a14="http://schemas.microsoft.com/office/drawing/2010/main" val="0"/>
-                </a:ext>
-              </a:extLst>
-            </a:blip>
-            <a:srcRect l="59260" t="3129" r="3423" b="69401"/>
-            <a:stretch/>
-          </p:blipFill>
-          <p:spPr>
-            <a:xfrm>
-              <a:off x="17678158" y="3261832"/>
-              <a:ext cx="1499219" cy="1735093"/>
-            </a:xfrm>
-            <a:prstGeom prst="rect">
-              <a:avLst/>
-            </a:prstGeom>
-          </p:spPr>
-        </p:pic>
-        <p:pic>
-          <p:nvPicPr>
-            <p:cNvPr id="78" name="Picture 2" descr="https://qph.ec.quoracdn.net/main-qimg-f5b43e499fe2ae72249bbb9469d4661e">
-              <a:extLst>
-                <a:ext uri="{FF2B5EF4-FFF2-40B4-BE49-F238E27FC236}">
-                  <a16:creationId xmlns:a16="http://schemas.microsoft.com/office/drawing/2014/main" id="{F50EFD94-F978-4609-8DCE-0783EB0AC8A0}"/>
-                </a:ext>
-              </a:extLst>
-            </p:cNvPr>
-            <p:cNvPicPr>
-              <a:picLocks noChangeAspect="1" noChangeArrowheads="1"/>
-            </p:cNvPicPr>
-            <p:nvPr/>
-          </p:nvPicPr>
-          <p:blipFill rotWithShape="1">
-            <a:blip r:embed="rId8">
-              <a:extLst>
-                <a:ext uri="{28A0092B-C50C-407E-A947-70E740481C1C}">
-                  <a14:useLocalDpi xmlns:a14="http://schemas.microsoft.com/office/drawing/2010/main" val="0"/>
-                </a:ext>
-              </a:extLst>
-            </a:blip>
-            <a:srcRect l="4526"/>
-            <a:stretch/>
-          </p:blipFill>
-          <p:spPr bwMode="auto">
-            <a:xfrm>
-              <a:off x="23143449" y="3603379"/>
-              <a:ext cx="2547628" cy="1462791"/>
-            </a:xfrm>
-            <a:prstGeom prst="rect">
-              <a:avLst/>
-            </a:prstGeom>
-            <a:noFill/>
-            <a:extLst>
-              <a:ext uri="{909E8E84-426E-40DD-AFC4-6F175D3DCCD1}">
-                <a14:hiddenFill xmlns:a14="http://schemas.microsoft.com/office/drawing/2010/main">
-                  <a:solidFill>
-                    <a:srgbClr val="FFFFFF"/>
-                  </a:solidFill>
-                </a14:hiddenFill>
-              </a:ext>
-            </a:extLst>
-          </p:spPr>
-        </p:pic>
-      </p:grpSp>
-      <p:sp>
-        <p:nvSpPr>
-          <p:cNvPr id="79" name="TextBox 78">
-            <a:extLst>
-              <a:ext uri="{FF2B5EF4-FFF2-40B4-BE49-F238E27FC236}">
-                <a16:creationId xmlns:a16="http://schemas.microsoft.com/office/drawing/2014/main" id="{55266AC3-A8BB-4877-9373-4F933D313328}"/>
-              </a:ext>
-            </a:extLst>
-          </p:cNvPr>
-          <p:cNvSpPr txBox="1"/>
-          <p:nvPr/>
-        </p:nvSpPr>
-        <p:spPr>
-          <a:xfrm>
-            <a:off x="4194859" y="14639832"/>
-            <a:ext cx="7999753" cy="1200329"/>
-          </a:xfrm>
-          <a:prstGeom prst="rect">
-            <a:avLst/>
-          </a:prstGeom>
-          <a:noFill/>
-        </p:spPr>
-        <p:txBody>
-          <a:bodyPr wrap="square" rtlCol="0">
-            <a:spAutoFit/>
-          </a:bodyPr>
-          <a:lstStyle/>
-          <a:p>
-            <a:r>
-              <a:rPr lang="en-ZA" sz="2400" b="1" dirty="0"/>
-              <a:t>System overview</a:t>
-            </a:r>
-          </a:p>
-          <a:p>
-            <a:endParaRPr lang="en-ZA" sz="2400" b="1" dirty="0"/>
-          </a:p>
-          <a:p>
-            <a:r>
-              <a:rPr lang="en-ZA" sz="2400" dirty="0" err="1"/>
-              <a:t>Isentially</a:t>
-            </a:r>
-            <a:r>
-              <a:rPr lang="en-ZA" sz="2400" dirty="0"/>
-              <a:t> the system is tasked </a:t>
-            </a:r>
-            <a:r>
-              <a:rPr lang="en-ZA" sz="2400" dirty="0" err="1"/>
-              <a:t>woth</a:t>
-            </a:r>
-            <a:endParaRPr lang="en-ZA" dirty="0"/>
-          </a:p>
-        </p:txBody>
-      </p:sp>
       <p:pic>
         <p:nvPicPr>
           <p:cNvPr id="83" name="Picture 82">
@@ -5799,7 +4914,7 @@
           <p:nvPr/>
         </p:nvPicPr>
         <p:blipFill>
-          <a:blip r:embed="rId9">
+          <a:blip r:embed="rId10">
             <a:extLst>
               <a:ext uri="{28A0092B-C50C-407E-A947-70E740481C1C}">
                 <a14:useLocalDpi xmlns:a14="http://schemas.microsoft.com/office/drawing/2010/main" val="0"/>
@@ -5812,8 +4927,1996 @@
         </p:blipFill>
         <p:spPr>
           <a:xfrm>
-            <a:off x="600318" y="1110212"/>
+            <a:off x="28799964" y="19951441"/>
             <a:ext cx="630936" cy="877824"/>
+          </a:xfrm>
+          <a:prstGeom prst="rect">
+            <a:avLst/>
+          </a:prstGeom>
+        </p:spPr>
+      </p:pic>
+      <p:sp>
+        <p:nvSpPr>
+          <p:cNvPr id="81" name="Rectangle 1252">
+            <a:extLst>
+              <a:ext uri="{FF2B5EF4-FFF2-40B4-BE49-F238E27FC236}">
+                <a16:creationId xmlns:a16="http://schemas.microsoft.com/office/drawing/2014/main" id="{FBADC031-15BD-405D-B033-F744E802508B}"/>
+              </a:ext>
+            </a:extLst>
+          </p:cNvPr>
+          <p:cNvSpPr>
+            <a:spLocks noChangeArrowheads="1"/>
+          </p:cNvSpPr>
+          <p:nvPr/>
+        </p:nvSpPr>
+        <p:spPr bwMode="auto">
+          <a:xfrm>
+            <a:off x="1" y="1"/>
+            <a:ext cx="30275212" cy="2433734"/>
+          </a:xfrm>
+          <a:prstGeom prst="rect">
+            <a:avLst/>
+          </a:prstGeom>
+          <a:gradFill rotWithShape="1">
+            <a:gsLst>
+              <a:gs pos="0">
+                <a:srgbClr val="9AB1C0"/>
+              </a:gs>
+              <a:gs pos="50000">
+                <a:schemeClr val="bg1"/>
+              </a:gs>
+              <a:gs pos="100000">
+                <a:srgbClr val="9AB1C0"/>
+              </a:gs>
+            </a:gsLst>
+            <a:lin ang="5400000" scaled="1"/>
+          </a:gradFill>
+          <a:ln w="38100" algn="ctr">
+            <a:noFill/>
+            <a:miter lim="800000"/>
+            <a:headEnd/>
+            <a:tailEnd/>
+          </a:ln>
+          <a:effectLst/>
+        </p:spPr>
+        <p:txBody>
+          <a:bodyPr wrap="square" lIns="89182" tIns="44593" rIns="89182" bIns="44593" anchor="ctr">
+            <a:spAutoFit/>
+          </a:bodyPr>
+          <a:lstStyle/>
+          <a:p>
+            <a:pPr eaLnBrk="0" hangingPunct="0">
+              <a:lnSpc>
+                <a:spcPct val="75000"/>
+              </a:lnSpc>
+              <a:spcBef>
+                <a:spcPct val="25000"/>
+              </a:spcBef>
+              <a:spcAft>
+                <a:spcPct val="25000"/>
+              </a:spcAft>
+              <a:defRPr/>
+            </a:pPr>
+            <a:endParaRPr lang="en-US" dirty="0">
+              <a:cs typeface="+mn-cs"/>
+            </a:endParaRPr>
+          </a:p>
+        </p:txBody>
+      </p:sp>
+      <p:sp>
+        <p:nvSpPr>
+          <p:cNvPr id="84" name="Text Box 2103">
+            <a:extLst>
+              <a:ext uri="{FF2B5EF4-FFF2-40B4-BE49-F238E27FC236}">
+                <a16:creationId xmlns:a16="http://schemas.microsoft.com/office/drawing/2014/main" id="{03A58755-6745-4335-A16A-44682A33BC06}"/>
+              </a:ext>
+            </a:extLst>
+          </p:cNvPr>
+          <p:cNvSpPr txBox="1">
+            <a:spLocks noChangeArrowheads="1"/>
+          </p:cNvSpPr>
+          <p:nvPr/>
+        </p:nvSpPr>
+        <p:spPr bwMode="auto">
+          <a:xfrm>
+            <a:off x="5158315" y="361454"/>
+            <a:ext cx="19507200" cy="1477103"/>
+          </a:xfrm>
+          <a:prstGeom prst="rect">
+            <a:avLst/>
+          </a:prstGeom>
+          <a:noFill/>
+          <a:ln>
+            <a:noFill/>
+          </a:ln>
+          <a:extLst>
+            <a:ext uri="{909E8E84-426E-40DD-AFC4-6F175D3DCCD1}">
+              <a14:hiddenFill xmlns:a14="http://schemas.microsoft.com/office/drawing/2010/main">
+                <a:solidFill>
+                  <a:srgbClr val="FFFFFF"/>
+                </a:solidFill>
+              </a14:hiddenFill>
+            </a:ext>
+            <a:ext uri="{91240B29-F687-4F45-9708-019B960494DF}">
+              <a14:hiddenLine xmlns:a14="http://schemas.microsoft.com/office/drawing/2010/main" w="38100" algn="ctr">
+                <a:solidFill>
+                  <a:srgbClr val="000000"/>
+                </a:solidFill>
+                <a:miter lim="800000"/>
+                <a:headEnd/>
+                <a:tailEnd/>
+              </a14:hiddenLine>
+            </a:ext>
+          </a:extLst>
+        </p:spPr>
+        <p:txBody>
+          <a:bodyPr wrap="square" lIns="89182" tIns="44593" rIns="89182" bIns="44593">
+            <a:spAutoFit/>
+          </a:bodyPr>
+          <a:lstStyle>
+            <a:lvl1pPr eaLnBrk="0" hangingPunct="0">
+              <a:defRPr sz="900" i="1">
+                <a:solidFill>
+                  <a:schemeClr val="tx1"/>
+                </a:solidFill>
+                <a:latin typeface="Arial" charset="0"/>
+                <a:cs typeface="Arial" charset="0"/>
+              </a:defRPr>
+            </a:lvl1pPr>
+            <a:lvl2pPr marL="742950" indent="-285750" eaLnBrk="0" hangingPunct="0">
+              <a:defRPr sz="900" i="1">
+                <a:solidFill>
+                  <a:schemeClr val="tx1"/>
+                </a:solidFill>
+                <a:latin typeface="Arial" charset="0"/>
+                <a:cs typeface="Arial" charset="0"/>
+              </a:defRPr>
+            </a:lvl2pPr>
+            <a:lvl3pPr marL="1143000" indent="-228600" eaLnBrk="0" hangingPunct="0">
+              <a:defRPr sz="900" i="1">
+                <a:solidFill>
+                  <a:schemeClr val="tx1"/>
+                </a:solidFill>
+                <a:latin typeface="Arial" charset="0"/>
+                <a:cs typeface="Arial" charset="0"/>
+              </a:defRPr>
+            </a:lvl3pPr>
+            <a:lvl4pPr marL="1600200" indent="-228600" eaLnBrk="0" hangingPunct="0">
+              <a:defRPr sz="900" i="1">
+                <a:solidFill>
+                  <a:schemeClr val="tx1"/>
+                </a:solidFill>
+                <a:latin typeface="Arial" charset="0"/>
+                <a:cs typeface="Arial" charset="0"/>
+              </a:defRPr>
+            </a:lvl4pPr>
+            <a:lvl5pPr marL="2057400" indent="-228600" eaLnBrk="0" hangingPunct="0">
+              <a:defRPr sz="900" i="1">
+                <a:solidFill>
+                  <a:schemeClr val="tx1"/>
+                </a:solidFill>
+                <a:latin typeface="Arial" charset="0"/>
+                <a:cs typeface="Arial" charset="0"/>
+              </a:defRPr>
+            </a:lvl5pPr>
+            <a:lvl6pPr marL="2514600" indent="-228600" eaLnBrk="0" fontAlgn="base" hangingPunct="0">
+              <a:spcBef>
+                <a:spcPct val="0"/>
+              </a:spcBef>
+              <a:spcAft>
+                <a:spcPct val="0"/>
+              </a:spcAft>
+              <a:defRPr sz="900" i="1">
+                <a:solidFill>
+                  <a:schemeClr val="tx1"/>
+                </a:solidFill>
+                <a:latin typeface="Arial" charset="0"/>
+                <a:cs typeface="Arial" charset="0"/>
+              </a:defRPr>
+            </a:lvl6pPr>
+            <a:lvl7pPr marL="2971800" indent="-228600" eaLnBrk="0" fontAlgn="base" hangingPunct="0">
+              <a:spcBef>
+                <a:spcPct val="0"/>
+              </a:spcBef>
+              <a:spcAft>
+                <a:spcPct val="0"/>
+              </a:spcAft>
+              <a:defRPr sz="900" i="1">
+                <a:solidFill>
+                  <a:schemeClr val="tx1"/>
+                </a:solidFill>
+                <a:latin typeface="Arial" charset="0"/>
+                <a:cs typeface="Arial" charset="0"/>
+              </a:defRPr>
+            </a:lvl7pPr>
+            <a:lvl8pPr marL="3429000" indent="-228600" eaLnBrk="0" fontAlgn="base" hangingPunct="0">
+              <a:spcBef>
+                <a:spcPct val="0"/>
+              </a:spcBef>
+              <a:spcAft>
+                <a:spcPct val="0"/>
+              </a:spcAft>
+              <a:defRPr sz="900" i="1">
+                <a:solidFill>
+                  <a:schemeClr val="tx1"/>
+                </a:solidFill>
+                <a:latin typeface="Arial" charset="0"/>
+                <a:cs typeface="Arial" charset="0"/>
+              </a:defRPr>
+            </a:lvl8pPr>
+            <a:lvl9pPr marL="3886200" indent="-228600" eaLnBrk="0" fontAlgn="base" hangingPunct="0">
+              <a:spcBef>
+                <a:spcPct val="0"/>
+              </a:spcBef>
+              <a:spcAft>
+                <a:spcPct val="0"/>
+              </a:spcAft>
+              <a:defRPr sz="900" i="1">
+                <a:solidFill>
+                  <a:schemeClr val="tx1"/>
+                </a:solidFill>
+                <a:latin typeface="Arial" charset="0"/>
+                <a:cs typeface="Arial" charset="0"/>
+              </a:defRPr>
+            </a:lvl9pPr>
+          </a:lstStyle>
+          <a:p>
+            <a:pPr algn="ctr">
+              <a:lnSpc>
+                <a:spcPct val="75000"/>
+              </a:lnSpc>
+              <a:spcBef>
+                <a:spcPct val="25000"/>
+              </a:spcBef>
+            </a:pPr>
+            <a:r>
+              <a:rPr lang="en-ZA" sz="6000" b="1" i="0" dirty="0"/>
+              <a:t>Automatic Test Grading Using Image Processing and Machine Learning Techniques</a:t>
+            </a:r>
+          </a:p>
+        </p:txBody>
+      </p:sp>
+      <p:pic>
+        <p:nvPicPr>
+          <p:cNvPr id="87" name="Picture 2048" descr="USlogo">
+            <a:extLst>
+              <a:ext uri="{FF2B5EF4-FFF2-40B4-BE49-F238E27FC236}">
+                <a16:creationId xmlns:a16="http://schemas.microsoft.com/office/drawing/2014/main" id="{4C9BEB60-D9AA-4184-883B-18A3710FF1C5}"/>
+              </a:ext>
+            </a:extLst>
+          </p:cNvPr>
+          <p:cNvPicPr>
+            <a:picLocks noChangeAspect="1" noChangeArrowheads="1"/>
+          </p:cNvPicPr>
+          <p:nvPr/>
+        </p:nvPicPr>
+        <p:blipFill rotWithShape="1">
+          <a:blip r:embed="rId11">
+            <a:extLst>
+              <a:ext uri="{28A0092B-C50C-407E-A947-70E740481C1C}">
+                <a14:useLocalDpi xmlns:a14="http://schemas.microsoft.com/office/drawing/2010/main" val="0"/>
+              </a:ext>
+            </a:extLst>
+          </a:blip>
+          <a:srcRect r="68386" b="978"/>
+          <a:stretch/>
+        </p:blipFill>
+        <p:spPr bwMode="auto">
+          <a:xfrm>
+            <a:off x="683618" y="274194"/>
+            <a:ext cx="1734478" cy="1692180"/>
+          </a:xfrm>
+          <a:prstGeom prst="rect">
+            <a:avLst/>
+          </a:prstGeom>
+          <a:noFill/>
+          <a:ln>
+            <a:noFill/>
+          </a:ln>
+          <a:extLst>
+            <a:ext uri="{909E8E84-426E-40DD-AFC4-6F175D3DCCD1}">
+              <a14:hiddenFill xmlns:a14="http://schemas.microsoft.com/office/drawing/2010/main">
+                <a:solidFill>
+                  <a:srgbClr val="FFFFFF"/>
+                </a:solidFill>
+              </a14:hiddenFill>
+            </a:ext>
+            <a:ext uri="{91240B29-F687-4F45-9708-019B960494DF}">
+              <a14:hiddenLine xmlns:a14="http://schemas.microsoft.com/office/drawing/2010/main" w="9525">
+                <a:solidFill>
+                  <a:srgbClr val="000000"/>
+                </a:solidFill>
+                <a:miter lim="800000"/>
+                <a:headEnd/>
+                <a:tailEnd/>
+              </a14:hiddenLine>
+            </a:ext>
+          </a:extLst>
+        </p:spPr>
+      </p:pic>
+      <p:pic>
+        <p:nvPicPr>
+          <p:cNvPr id="3" name="Picture 2">
+            <a:extLst>
+              <a:ext uri="{FF2B5EF4-FFF2-40B4-BE49-F238E27FC236}">
+                <a16:creationId xmlns:a16="http://schemas.microsoft.com/office/drawing/2014/main" id="{E5649686-DA24-4216-9FDB-B6D0892E0574}"/>
+              </a:ext>
+            </a:extLst>
+          </p:cNvPr>
+          <p:cNvPicPr>
+            <a:picLocks noChangeAspect="1"/>
+          </p:cNvPicPr>
+          <p:nvPr/>
+        </p:nvPicPr>
+        <p:blipFill>
+          <a:blip r:embed="rId12">
+            <a:extLst>
+              <a:ext uri="{28A0092B-C50C-407E-A947-70E740481C1C}">
+                <a14:useLocalDpi xmlns:a14="http://schemas.microsoft.com/office/drawing/2010/main" val="0"/>
+              </a:ext>
+            </a:extLst>
+          </a:blip>
+          <a:stretch>
+            <a:fillRect/>
+          </a:stretch>
+        </p:blipFill>
+        <p:spPr>
+          <a:xfrm>
+            <a:off x="27953874" y="352129"/>
+            <a:ext cx="1692181" cy="1692181"/>
+          </a:xfrm>
+          <a:prstGeom prst="rect">
+            <a:avLst/>
+          </a:prstGeom>
+        </p:spPr>
+      </p:pic>
+      <p:sp>
+        <p:nvSpPr>
+          <p:cNvPr id="32" name="TextBox 31">
+            <a:extLst>
+              <a:ext uri="{FF2B5EF4-FFF2-40B4-BE49-F238E27FC236}">
+                <a16:creationId xmlns:a16="http://schemas.microsoft.com/office/drawing/2014/main" id="{DCA8B5CA-CB14-4F1D-9828-C6A5DB181AC2}"/>
+              </a:ext>
+            </a:extLst>
+          </p:cNvPr>
+          <p:cNvSpPr txBox="1"/>
+          <p:nvPr/>
+        </p:nvSpPr>
+        <p:spPr>
+          <a:xfrm>
+            <a:off x="1023526" y="4610416"/>
+            <a:ext cx="7960061" cy="2031325"/>
+          </a:xfrm>
+          <a:prstGeom prst="rect">
+            <a:avLst/>
+          </a:prstGeom>
+          <a:noFill/>
+        </p:spPr>
+        <p:txBody>
+          <a:bodyPr wrap="square" rtlCol="0">
+            <a:spAutoFit/>
+          </a:bodyPr>
+          <a:lstStyle/>
+          <a:p>
+            <a:r>
+              <a:rPr lang="en-ZA" dirty="0"/>
+              <a:t>In recent years the Applied Mathematics department of Stellenbosch notice a drop in teaching assistant’s accuracy in grading students’ tutorial tests. The department has decided to automate this process of grading tests. The department wants Optical Marker Recognition software to graded tests written on a special template automatically. This reduces the time to mark tutorial tests, while still allowing for a high accuracy in grading tests.</a:t>
+            </a:r>
+          </a:p>
+          <a:p>
+            <a:endParaRPr lang="en-ZA" dirty="0"/>
+          </a:p>
+        </p:txBody>
+      </p:sp>
+      <p:grpSp>
+        <p:nvGrpSpPr>
+          <p:cNvPr id="95" name="Group 1455">
+            <a:extLst>
+              <a:ext uri="{FF2B5EF4-FFF2-40B4-BE49-F238E27FC236}">
+                <a16:creationId xmlns:a16="http://schemas.microsoft.com/office/drawing/2014/main" id="{F875F81F-CCF3-4FC3-A3DD-838E3870114E}"/>
+              </a:ext>
+            </a:extLst>
+          </p:cNvPr>
+          <p:cNvGrpSpPr>
+            <a:grpSpLocks/>
+          </p:cNvGrpSpPr>
+          <p:nvPr/>
+        </p:nvGrpSpPr>
+        <p:grpSpPr bwMode="auto">
+          <a:xfrm>
+            <a:off x="1019773" y="12580848"/>
+            <a:ext cx="7963814" cy="1001571"/>
+            <a:chOff x="1651" y="20930"/>
+            <a:chExt cx="8128" cy="524"/>
+          </a:xfrm>
+        </p:grpSpPr>
+        <p:sp>
+          <p:nvSpPr>
+            <p:cNvPr id="96" name="Rectangle 1456">
+              <a:extLst>
+                <a:ext uri="{FF2B5EF4-FFF2-40B4-BE49-F238E27FC236}">
+                  <a16:creationId xmlns:a16="http://schemas.microsoft.com/office/drawing/2014/main" id="{C47E6B8E-6B07-43C7-9071-0D960B38DC93}"/>
+                </a:ext>
+              </a:extLst>
+            </p:cNvPr>
+            <p:cNvSpPr>
+              <a:spLocks noChangeArrowheads="1"/>
+            </p:cNvSpPr>
+            <p:nvPr/>
+          </p:nvSpPr>
+          <p:spPr bwMode="auto">
+            <a:xfrm>
+              <a:off x="1651" y="20930"/>
+              <a:ext cx="8128" cy="524"/>
+            </a:xfrm>
+            <a:prstGeom prst="rect">
+              <a:avLst/>
+            </a:prstGeom>
+            <a:solidFill>
+              <a:srgbClr val="BECCD6"/>
+            </a:solidFill>
+            <a:ln>
+              <a:noFill/>
+            </a:ln>
+            <a:extLst>
+              <a:ext uri="{91240B29-F687-4F45-9708-019B960494DF}">
+                <a14:hiddenLine xmlns:a14="http://schemas.microsoft.com/office/drawing/2010/main" w="38100" algn="ctr">
+                  <a:solidFill>
+                    <a:srgbClr val="000000"/>
+                  </a:solidFill>
+                  <a:miter lim="800000"/>
+                  <a:headEnd/>
+                  <a:tailEnd/>
+                </a14:hiddenLine>
+              </a:ext>
+            </a:extLst>
+          </p:spPr>
+          <p:txBody>
+            <a:bodyPr lIns="89182" tIns="44593" rIns="89182" bIns="44593" anchor="ctr">
+              <a:spAutoFit/>
+            </a:bodyPr>
+            <a:lstStyle/>
+            <a:p>
+              <a:pPr eaLnBrk="0" hangingPunct="0">
+                <a:lnSpc>
+                  <a:spcPct val="75000"/>
+                </a:lnSpc>
+                <a:spcBef>
+                  <a:spcPct val="25000"/>
+                </a:spcBef>
+                <a:spcAft>
+                  <a:spcPct val="25000"/>
+                </a:spcAft>
+              </a:pPr>
+              <a:endParaRPr lang="en-US"/>
+            </a:p>
+          </p:txBody>
+        </p:sp>
+        <p:sp>
+          <p:nvSpPr>
+            <p:cNvPr id="97" name="Rectangle 1457">
+              <a:extLst>
+                <a:ext uri="{FF2B5EF4-FFF2-40B4-BE49-F238E27FC236}">
+                  <a16:creationId xmlns:a16="http://schemas.microsoft.com/office/drawing/2014/main" id="{D0D5BEB6-773E-4751-8786-F37377C39CE5}"/>
+                </a:ext>
+              </a:extLst>
+            </p:cNvPr>
+            <p:cNvSpPr>
+              <a:spLocks noChangeArrowheads="1"/>
+            </p:cNvSpPr>
+            <p:nvPr/>
+          </p:nvSpPr>
+          <p:spPr bwMode="auto">
+            <a:xfrm>
+              <a:off x="1739" y="21062"/>
+              <a:ext cx="7550" cy="275"/>
+            </a:xfrm>
+            <a:prstGeom prst="rect">
+              <a:avLst/>
+            </a:prstGeom>
+            <a:solidFill>
+              <a:srgbClr val="BECCD6"/>
+            </a:solidFill>
+            <a:ln>
+              <a:noFill/>
+            </a:ln>
+            <a:extLst>
+              <a:ext uri="{91240B29-F687-4F45-9708-019B960494DF}">
+                <a14:hiddenLine xmlns:a14="http://schemas.microsoft.com/office/drawing/2010/main" w="38100" algn="ctr">
+                  <a:solidFill>
+                    <a:srgbClr val="000000"/>
+                  </a:solidFill>
+                  <a:miter lim="800000"/>
+                  <a:headEnd/>
+                  <a:tailEnd/>
+                </a14:hiddenLine>
+              </a:ext>
+            </a:extLst>
+          </p:spPr>
+          <p:txBody>
+            <a:bodyPr lIns="89182" tIns="44593" rIns="89182" bIns="44593" anchor="ctr">
+              <a:spAutoFit/>
+            </a:bodyPr>
+            <a:lstStyle/>
+            <a:p>
+              <a:pPr defTabSz="987425" eaLnBrk="0" hangingPunct="0">
+                <a:lnSpc>
+                  <a:spcPct val="75000"/>
+                </a:lnSpc>
+                <a:spcBef>
+                  <a:spcPct val="25000"/>
+                </a:spcBef>
+                <a:spcAft>
+                  <a:spcPct val="25000"/>
+                </a:spcAft>
+              </a:pPr>
+              <a:r>
+                <a:rPr lang="en-ZA" sz="3000" b="1" dirty="0">
+                  <a:latin typeface="Times New Roman" pitchFamily="18" charset="0"/>
+                </a:rPr>
+                <a:t>3</a:t>
+              </a:r>
+              <a:r>
+                <a:rPr lang="en-ZA" sz="3000" b="1" i="0" dirty="0">
+                  <a:latin typeface="Times New Roman" pitchFamily="18" charset="0"/>
+                </a:rPr>
+                <a:t>. </a:t>
+              </a:r>
+              <a:r>
+                <a:rPr lang="en-ZA" sz="3000" b="1" dirty="0">
+                  <a:latin typeface="Arial" panose="020B0604020202020204" pitchFamily="34" charset="0"/>
+                  <a:cs typeface="Arial" panose="020B0604020202020204" pitchFamily="34" charset="0"/>
+                </a:rPr>
+                <a:t>System Overview</a:t>
+              </a:r>
+              <a:endParaRPr lang="en-US" sz="3000" b="1" i="0" dirty="0">
+                <a:latin typeface="Arial" panose="020B0604020202020204" pitchFamily="34" charset="0"/>
+                <a:cs typeface="Arial" panose="020B0604020202020204" pitchFamily="34" charset="0"/>
+              </a:endParaRPr>
+            </a:p>
+          </p:txBody>
+        </p:sp>
+      </p:grpSp>
+      <p:sp>
+        <p:nvSpPr>
+          <p:cNvPr id="98" name="TextBox 97">
+            <a:extLst>
+              <a:ext uri="{FF2B5EF4-FFF2-40B4-BE49-F238E27FC236}">
+                <a16:creationId xmlns:a16="http://schemas.microsoft.com/office/drawing/2014/main" id="{67B6A399-DA22-4588-918F-263FA6123DDE}"/>
+              </a:ext>
+            </a:extLst>
+          </p:cNvPr>
+          <p:cNvSpPr txBox="1"/>
+          <p:nvPr/>
+        </p:nvSpPr>
+        <p:spPr>
+          <a:xfrm>
+            <a:off x="989686" y="8991181"/>
+            <a:ext cx="4772115" cy="2031325"/>
+          </a:xfrm>
+          <a:prstGeom prst="rect">
+            <a:avLst/>
+          </a:prstGeom>
+          <a:noFill/>
+        </p:spPr>
+        <p:txBody>
+          <a:bodyPr wrap="square" rtlCol="0">
+            <a:spAutoFit/>
+          </a:bodyPr>
+          <a:lstStyle/>
+          <a:p>
+            <a:r>
+              <a:rPr lang="en-ZA" dirty="0"/>
+              <a:t>The template allows for decimal valued answers. An improvement over current Optical Marker Recognition systems allows for a student to cross out bubbles instead of needing to completely erase it. Further the system also allows for handwritten digits to answer questions.</a:t>
+            </a:r>
+          </a:p>
+          <a:p>
+            <a:pPr marL="285750" indent="-285750">
+              <a:buFont typeface="Arial" panose="020B0604020202020204" pitchFamily="34" charset="0"/>
+              <a:buChar char="•"/>
+            </a:pPr>
+            <a:endParaRPr lang="en-ZA" dirty="0"/>
+          </a:p>
+        </p:txBody>
+      </p:sp>
+      <p:sp>
+        <p:nvSpPr>
+          <p:cNvPr id="99" name="TextBox 98">
+            <a:extLst>
+              <a:ext uri="{FF2B5EF4-FFF2-40B4-BE49-F238E27FC236}">
+                <a16:creationId xmlns:a16="http://schemas.microsoft.com/office/drawing/2014/main" id="{497373CF-777C-43B2-8D49-29DCA6A9957E}"/>
+              </a:ext>
+            </a:extLst>
+          </p:cNvPr>
+          <p:cNvSpPr txBox="1"/>
+          <p:nvPr/>
+        </p:nvSpPr>
+        <p:spPr>
+          <a:xfrm>
+            <a:off x="1057140" y="13830695"/>
+            <a:ext cx="7926447" cy="369332"/>
+          </a:xfrm>
+          <a:prstGeom prst="rect">
+            <a:avLst/>
+          </a:prstGeom>
+          <a:noFill/>
+        </p:spPr>
+        <p:txBody>
+          <a:bodyPr wrap="square" rtlCol="0">
+            <a:spAutoFit/>
+          </a:bodyPr>
+          <a:lstStyle/>
+          <a:p>
+            <a:r>
+              <a:rPr lang="en-ZA" dirty="0" err="1"/>
+              <a:t>aadasdasdasd</a:t>
+            </a:r>
+            <a:endParaRPr lang="en-ZA" dirty="0"/>
+          </a:p>
+        </p:txBody>
+      </p:sp>
+      <p:grpSp>
+        <p:nvGrpSpPr>
+          <p:cNvPr id="109" name="Group 1455">
+            <a:extLst>
+              <a:ext uri="{FF2B5EF4-FFF2-40B4-BE49-F238E27FC236}">
+                <a16:creationId xmlns:a16="http://schemas.microsoft.com/office/drawing/2014/main" id="{EDBEDFB8-5EB2-411A-B98C-E1C76A6AA47C}"/>
+              </a:ext>
+            </a:extLst>
+          </p:cNvPr>
+          <p:cNvGrpSpPr>
+            <a:grpSpLocks/>
+          </p:cNvGrpSpPr>
+          <p:nvPr/>
+        </p:nvGrpSpPr>
+        <p:grpSpPr bwMode="auto">
+          <a:xfrm>
+            <a:off x="1019773" y="3349846"/>
+            <a:ext cx="7963814" cy="1001571"/>
+            <a:chOff x="1651" y="20930"/>
+            <a:chExt cx="8128" cy="524"/>
+          </a:xfrm>
+        </p:grpSpPr>
+        <p:sp>
+          <p:nvSpPr>
+            <p:cNvPr id="110" name="Rectangle 1456">
+              <a:extLst>
+                <a:ext uri="{FF2B5EF4-FFF2-40B4-BE49-F238E27FC236}">
+                  <a16:creationId xmlns:a16="http://schemas.microsoft.com/office/drawing/2014/main" id="{933F5E9C-2E43-4F6D-973A-47B52AE13354}"/>
+                </a:ext>
+              </a:extLst>
+            </p:cNvPr>
+            <p:cNvSpPr>
+              <a:spLocks noChangeArrowheads="1"/>
+            </p:cNvSpPr>
+            <p:nvPr/>
+          </p:nvSpPr>
+          <p:spPr bwMode="auto">
+            <a:xfrm>
+              <a:off x="1651" y="20930"/>
+              <a:ext cx="8128" cy="524"/>
+            </a:xfrm>
+            <a:prstGeom prst="rect">
+              <a:avLst/>
+            </a:prstGeom>
+            <a:solidFill>
+              <a:srgbClr val="BECCD6"/>
+            </a:solidFill>
+            <a:ln>
+              <a:noFill/>
+            </a:ln>
+            <a:extLst>
+              <a:ext uri="{91240B29-F687-4F45-9708-019B960494DF}">
+                <a14:hiddenLine xmlns:a14="http://schemas.microsoft.com/office/drawing/2010/main" w="38100" algn="ctr">
+                  <a:solidFill>
+                    <a:srgbClr val="000000"/>
+                  </a:solidFill>
+                  <a:miter lim="800000"/>
+                  <a:headEnd/>
+                  <a:tailEnd/>
+                </a14:hiddenLine>
+              </a:ext>
+            </a:extLst>
+          </p:spPr>
+          <p:txBody>
+            <a:bodyPr lIns="89182" tIns="44593" rIns="89182" bIns="44593" anchor="ctr">
+              <a:spAutoFit/>
+            </a:bodyPr>
+            <a:lstStyle/>
+            <a:p>
+              <a:pPr eaLnBrk="0" hangingPunct="0">
+                <a:lnSpc>
+                  <a:spcPct val="75000"/>
+                </a:lnSpc>
+                <a:spcBef>
+                  <a:spcPct val="25000"/>
+                </a:spcBef>
+                <a:spcAft>
+                  <a:spcPct val="25000"/>
+                </a:spcAft>
+              </a:pPr>
+              <a:endParaRPr lang="en-US"/>
+            </a:p>
+          </p:txBody>
+        </p:sp>
+        <p:sp>
+          <p:nvSpPr>
+            <p:cNvPr id="111" name="Rectangle 1457">
+              <a:extLst>
+                <a:ext uri="{FF2B5EF4-FFF2-40B4-BE49-F238E27FC236}">
+                  <a16:creationId xmlns:a16="http://schemas.microsoft.com/office/drawing/2014/main" id="{2D5EDD63-FDD5-4A94-8DFA-B581AD313F76}"/>
+                </a:ext>
+              </a:extLst>
+            </p:cNvPr>
+            <p:cNvSpPr>
+              <a:spLocks noChangeArrowheads="1"/>
+            </p:cNvSpPr>
+            <p:nvPr/>
+          </p:nvSpPr>
+          <p:spPr bwMode="auto">
+            <a:xfrm>
+              <a:off x="1739" y="21085"/>
+              <a:ext cx="7550" cy="228"/>
+            </a:xfrm>
+            <a:prstGeom prst="rect">
+              <a:avLst/>
+            </a:prstGeom>
+            <a:solidFill>
+              <a:srgbClr val="BECCD6"/>
+            </a:solidFill>
+            <a:ln>
+              <a:noFill/>
+            </a:ln>
+            <a:extLst>
+              <a:ext uri="{91240B29-F687-4F45-9708-019B960494DF}">
+                <a14:hiddenLine xmlns:a14="http://schemas.microsoft.com/office/drawing/2010/main" w="38100" algn="ctr">
+                  <a:solidFill>
+                    <a:srgbClr val="000000"/>
+                  </a:solidFill>
+                  <a:miter lim="800000"/>
+                  <a:headEnd/>
+                  <a:tailEnd/>
+                </a14:hiddenLine>
+              </a:ext>
+            </a:extLst>
+          </p:spPr>
+          <p:txBody>
+            <a:bodyPr lIns="89182" tIns="44593" rIns="89182" bIns="44593" anchor="ctr">
+              <a:spAutoFit/>
+            </a:bodyPr>
+            <a:lstStyle/>
+            <a:p>
+              <a:pPr defTabSz="987425" eaLnBrk="0" hangingPunct="0">
+                <a:lnSpc>
+                  <a:spcPct val="75000"/>
+                </a:lnSpc>
+                <a:spcBef>
+                  <a:spcPct val="25000"/>
+                </a:spcBef>
+                <a:spcAft>
+                  <a:spcPct val="25000"/>
+                </a:spcAft>
+              </a:pPr>
+              <a:r>
+                <a:rPr lang="en-ZA" sz="3000" b="1" dirty="0">
+                  <a:latin typeface="Times New Roman" pitchFamily="18" charset="0"/>
+                </a:rPr>
+                <a:t>1.</a:t>
+              </a:r>
+              <a:r>
+                <a:rPr lang="en-ZA" sz="3000" b="1" i="0" dirty="0">
+                  <a:latin typeface="Times New Roman" pitchFamily="18" charset="0"/>
+                </a:rPr>
+                <a:t> </a:t>
+              </a:r>
+              <a:r>
+                <a:rPr lang="en-ZA" sz="3000" b="1" i="0" dirty="0">
+                  <a:latin typeface="Arial" panose="020B0604020202020204" pitchFamily="34" charset="0"/>
+                  <a:cs typeface="Arial" panose="020B0604020202020204" pitchFamily="34" charset="0"/>
+                </a:rPr>
+                <a:t>Introduction</a:t>
+              </a:r>
+              <a:endParaRPr lang="en-US" sz="3000" b="1" i="0" dirty="0">
+                <a:latin typeface="Arial" panose="020B0604020202020204" pitchFamily="34" charset="0"/>
+                <a:cs typeface="Arial" panose="020B0604020202020204" pitchFamily="34" charset="0"/>
+              </a:endParaRPr>
+            </a:p>
+          </p:txBody>
+        </p:sp>
+      </p:grpSp>
+      <p:grpSp>
+        <p:nvGrpSpPr>
+          <p:cNvPr id="112" name="Group 1455">
+            <a:extLst>
+              <a:ext uri="{FF2B5EF4-FFF2-40B4-BE49-F238E27FC236}">
+                <a16:creationId xmlns:a16="http://schemas.microsoft.com/office/drawing/2014/main" id="{80B9B110-7B1C-49A5-A34C-EC7036680299}"/>
+              </a:ext>
+            </a:extLst>
+          </p:cNvPr>
+          <p:cNvGrpSpPr>
+            <a:grpSpLocks/>
+          </p:cNvGrpSpPr>
+          <p:nvPr/>
+        </p:nvGrpSpPr>
+        <p:grpSpPr bwMode="auto">
+          <a:xfrm>
+            <a:off x="1019773" y="7772875"/>
+            <a:ext cx="7963814" cy="1001571"/>
+            <a:chOff x="1651" y="20930"/>
+            <a:chExt cx="8128" cy="524"/>
+          </a:xfrm>
+        </p:grpSpPr>
+        <p:sp>
+          <p:nvSpPr>
+            <p:cNvPr id="113" name="Rectangle 1456">
+              <a:extLst>
+                <a:ext uri="{FF2B5EF4-FFF2-40B4-BE49-F238E27FC236}">
+                  <a16:creationId xmlns:a16="http://schemas.microsoft.com/office/drawing/2014/main" id="{C9134E72-62A9-40B7-810C-84BD839136E0}"/>
+                </a:ext>
+              </a:extLst>
+            </p:cNvPr>
+            <p:cNvSpPr>
+              <a:spLocks noChangeArrowheads="1"/>
+            </p:cNvSpPr>
+            <p:nvPr/>
+          </p:nvSpPr>
+          <p:spPr bwMode="auto">
+            <a:xfrm>
+              <a:off x="1651" y="20930"/>
+              <a:ext cx="8128" cy="524"/>
+            </a:xfrm>
+            <a:prstGeom prst="rect">
+              <a:avLst/>
+            </a:prstGeom>
+            <a:solidFill>
+              <a:srgbClr val="BECCD6"/>
+            </a:solidFill>
+            <a:ln>
+              <a:noFill/>
+            </a:ln>
+            <a:extLst>
+              <a:ext uri="{91240B29-F687-4F45-9708-019B960494DF}">
+                <a14:hiddenLine xmlns:a14="http://schemas.microsoft.com/office/drawing/2010/main" w="38100" algn="ctr">
+                  <a:solidFill>
+                    <a:srgbClr val="000000"/>
+                  </a:solidFill>
+                  <a:miter lim="800000"/>
+                  <a:headEnd/>
+                  <a:tailEnd/>
+                </a14:hiddenLine>
+              </a:ext>
+            </a:extLst>
+          </p:spPr>
+          <p:txBody>
+            <a:bodyPr lIns="89182" tIns="44593" rIns="89182" bIns="44593" anchor="ctr">
+              <a:spAutoFit/>
+            </a:bodyPr>
+            <a:lstStyle/>
+            <a:p>
+              <a:pPr eaLnBrk="0" hangingPunct="0">
+                <a:lnSpc>
+                  <a:spcPct val="75000"/>
+                </a:lnSpc>
+                <a:spcBef>
+                  <a:spcPct val="25000"/>
+                </a:spcBef>
+                <a:spcAft>
+                  <a:spcPct val="25000"/>
+                </a:spcAft>
+              </a:pPr>
+              <a:endParaRPr lang="en-US"/>
+            </a:p>
+          </p:txBody>
+        </p:sp>
+        <p:sp>
+          <p:nvSpPr>
+            <p:cNvPr id="114" name="Rectangle 1457">
+              <a:extLst>
+                <a:ext uri="{FF2B5EF4-FFF2-40B4-BE49-F238E27FC236}">
+                  <a16:creationId xmlns:a16="http://schemas.microsoft.com/office/drawing/2014/main" id="{67CB4B34-0FB4-4E35-BB02-EB16E3B2D481}"/>
+                </a:ext>
+              </a:extLst>
+            </p:cNvPr>
+            <p:cNvSpPr>
+              <a:spLocks noChangeArrowheads="1"/>
+            </p:cNvSpPr>
+            <p:nvPr/>
+          </p:nvSpPr>
+          <p:spPr bwMode="auto">
+            <a:xfrm>
+              <a:off x="1739" y="21085"/>
+              <a:ext cx="7550" cy="228"/>
+            </a:xfrm>
+            <a:prstGeom prst="rect">
+              <a:avLst/>
+            </a:prstGeom>
+            <a:solidFill>
+              <a:srgbClr val="BECCD6"/>
+            </a:solidFill>
+            <a:ln>
+              <a:noFill/>
+            </a:ln>
+            <a:extLst>
+              <a:ext uri="{91240B29-F687-4F45-9708-019B960494DF}">
+                <a14:hiddenLine xmlns:a14="http://schemas.microsoft.com/office/drawing/2010/main" w="38100" algn="ctr">
+                  <a:solidFill>
+                    <a:srgbClr val="000000"/>
+                  </a:solidFill>
+                  <a:miter lim="800000"/>
+                  <a:headEnd/>
+                  <a:tailEnd/>
+                </a14:hiddenLine>
+              </a:ext>
+            </a:extLst>
+          </p:spPr>
+          <p:txBody>
+            <a:bodyPr lIns="89182" tIns="44593" rIns="89182" bIns="44593" anchor="ctr">
+              <a:spAutoFit/>
+            </a:bodyPr>
+            <a:lstStyle/>
+            <a:p>
+              <a:pPr defTabSz="987425" eaLnBrk="0" hangingPunct="0">
+                <a:lnSpc>
+                  <a:spcPct val="75000"/>
+                </a:lnSpc>
+                <a:spcBef>
+                  <a:spcPct val="25000"/>
+                </a:spcBef>
+                <a:spcAft>
+                  <a:spcPct val="25000"/>
+                </a:spcAft>
+              </a:pPr>
+              <a:r>
+                <a:rPr lang="en-ZA" sz="3000" b="1" i="0" dirty="0">
+                  <a:latin typeface="Times New Roman" pitchFamily="18" charset="0"/>
+                </a:rPr>
+                <a:t>2. </a:t>
+              </a:r>
+              <a:r>
+                <a:rPr lang="en-ZA" sz="3000" b="1" dirty="0">
+                  <a:latin typeface="Arial" panose="020B0604020202020204" pitchFamily="34" charset="0"/>
+                  <a:cs typeface="Arial" panose="020B0604020202020204" pitchFamily="34" charset="0"/>
+                </a:rPr>
+                <a:t>Solution</a:t>
+              </a:r>
+              <a:endParaRPr lang="en-US" sz="3000" b="1" i="0" dirty="0">
+                <a:latin typeface="Arial" panose="020B0604020202020204" pitchFamily="34" charset="0"/>
+                <a:cs typeface="Arial" panose="020B0604020202020204" pitchFamily="34" charset="0"/>
+              </a:endParaRPr>
+            </a:p>
+          </p:txBody>
+        </p:sp>
+      </p:grpSp>
+      <p:grpSp>
+        <p:nvGrpSpPr>
+          <p:cNvPr id="115" name="Group 1455">
+            <a:extLst>
+              <a:ext uri="{FF2B5EF4-FFF2-40B4-BE49-F238E27FC236}">
+                <a16:creationId xmlns:a16="http://schemas.microsoft.com/office/drawing/2014/main" id="{C43AF8D8-3FE1-483A-82ED-CB80124C0C01}"/>
+              </a:ext>
+            </a:extLst>
+          </p:cNvPr>
+          <p:cNvGrpSpPr>
+            <a:grpSpLocks/>
+          </p:cNvGrpSpPr>
+          <p:nvPr/>
+        </p:nvGrpSpPr>
+        <p:grpSpPr bwMode="auto">
+          <a:xfrm>
+            <a:off x="11150978" y="3265180"/>
+            <a:ext cx="7963814" cy="1001571"/>
+            <a:chOff x="1651" y="20930"/>
+            <a:chExt cx="8128" cy="524"/>
+          </a:xfrm>
+        </p:grpSpPr>
+        <p:sp>
+          <p:nvSpPr>
+            <p:cNvPr id="116" name="Rectangle 1456">
+              <a:extLst>
+                <a:ext uri="{FF2B5EF4-FFF2-40B4-BE49-F238E27FC236}">
+                  <a16:creationId xmlns:a16="http://schemas.microsoft.com/office/drawing/2014/main" id="{BD265579-3936-407E-9553-0493BB0C58A9}"/>
+                </a:ext>
+              </a:extLst>
+            </p:cNvPr>
+            <p:cNvSpPr>
+              <a:spLocks noChangeArrowheads="1"/>
+            </p:cNvSpPr>
+            <p:nvPr/>
+          </p:nvSpPr>
+          <p:spPr bwMode="auto">
+            <a:xfrm>
+              <a:off x="1651" y="20930"/>
+              <a:ext cx="8128" cy="524"/>
+            </a:xfrm>
+            <a:prstGeom prst="rect">
+              <a:avLst/>
+            </a:prstGeom>
+            <a:solidFill>
+              <a:srgbClr val="BECCD6"/>
+            </a:solidFill>
+            <a:ln>
+              <a:noFill/>
+            </a:ln>
+            <a:extLst>
+              <a:ext uri="{91240B29-F687-4F45-9708-019B960494DF}">
+                <a14:hiddenLine xmlns:a14="http://schemas.microsoft.com/office/drawing/2010/main" w="38100" algn="ctr">
+                  <a:solidFill>
+                    <a:srgbClr val="000000"/>
+                  </a:solidFill>
+                  <a:miter lim="800000"/>
+                  <a:headEnd/>
+                  <a:tailEnd/>
+                </a14:hiddenLine>
+              </a:ext>
+            </a:extLst>
+          </p:spPr>
+          <p:txBody>
+            <a:bodyPr lIns="89182" tIns="44593" rIns="89182" bIns="44593" anchor="ctr">
+              <a:spAutoFit/>
+            </a:bodyPr>
+            <a:lstStyle/>
+            <a:p>
+              <a:pPr eaLnBrk="0" hangingPunct="0">
+                <a:lnSpc>
+                  <a:spcPct val="75000"/>
+                </a:lnSpc>
+                <a:spcBef>
+                  <a:spcPct val="25000"/>
+                </a:spcBef>
+                <a:spcAft>
+                  <a:spcPct val="25000"/>
+                </a:spcAft>
+              </a:pPr>
+              <a:endParaRPr lang="en-US" dirty="0"/>
+            </a:p>
+          </p:txBody>
+        </p:sp>
+        <p:sp>
+          <p:nvSpPr>
+            <p:cNvPr id="117" name="Rectangle 1457">
+              <a:extLst>
+                <a:ext uri="{FF2B5EF4-FFF2-40B4-BE49-F238E27FC236}">
+                  <a16:creationId xmlns:a16="http://schemas.microsoft.com/office/drawing/2014/main" id="{003B6A93-12F1-4494-97EA-BBC8E8EF1F83}"/>
+                </a:ext>
+              </a:extLst>
+            </p:cNvPr>
+            <p:cNvSpPr>
+              <a:spLocks noChangeArrowheads="1"/>
+            </p:cNvSpPr>
+            <p:nvPr/>
+          </p:nvSpPr>
+          <p:spPr bwMode="auto">
+            <a:xfrm>
+              <a:off x="1739" y="21085"/>
+              <a:ext cx="7550" cy="230"/>
+            </a:xfrm>
+            <a:prstGeom prst="rect">
+              <a:avLst/>
+            </a:prstGeom>
+            <a:solidFill>
+              <a:srgbClr val="BECCD6"/>
+            </a:solidFill>
+            <a:ln>
+              <a:noFill/>
+            </a:ln>
+            <a:extLst>
+              <a:ext uri="{91240B29-F687-4F45-9708-019B960494DF}">
+                <a14:hiddenLine xmlns:a14="http://schemas.microsoft.com/office/drawing/2010/main" w="38100" algn="ctr">
+                  <a:solidFill>
+                    <a:srgbClr val="000000"/>
+                  </a:solidFill>
+                  <a:miter lim="800000"/>
+                  <a:headEnd/>
+                  <a:tailEnd/>
+                </a14:hiddenLine>
+              </a:ext>
+            </a:extLst>
+          </p:spPr>
+          <p:txBody>
+            <a:bodyPr lIns="89182" tIns="44593" rIns="89182" bIns="44593" anchor="ctr">
+              <a:spAutoFit/>
+            </a:bodyPr>
+            <a:lstStyle/>
+            <a:p>
+              <a:pPr defTabSz="987425" eaLnBrk="0" hangingPunct="0">
+                <a:lnSpc>
+                  <a:spcPct val="75000"/>
+                </a:lnSpc>
+                <a:spcBef>
+                  <a:spcPct val="25000"/>
+                </a:spcBef>
+                <a:spcAft>
+                  <a:spcPct val="25000"/>
+                </a:spcAft>
+              </a:pPr>
+              <a:r>
+                <a:rPr lang="en-ZA" sz="3000" b="1" dirty="0">
+                  <a:latin typeface="Times New Roman" pitchFamily="18" charset="0"/>
+                </a:rPr>
+                <a:t>4. Image Processing</a:t>
+              </a:r>
+              <a:endParaRPr lang="en-US" sz="3000" b="1" i="0" dirty="0">
+                <a:latin typeface="Arial" panose="020B0604020202020204" pitchFamily="34" charset="0"/>
+                <a:cs typeface="Arial" panose="020B0604020202020204" pitchFamily="34" charset="0"/>
+              </a:endParaRPr>
+            </a:p>
+          </p:txBody>
+        </p:sp>
+      </p:grpSp>
+      <p:grpSp>
+        <p:nvGrpSpPr>
+          <p:cNvPr id="121" name="Group 1455">
+            <a:extLst>
+              <a:ext uri="{FF2B5EF4-FFF2-40B4-BE49-F238E27FC236}">
+                <a16:creationId xmlns:a16="http://schemas.microsoft.com/office/drawing/2014/main" id="{0F6D557F-4622-450D-8B76-4048AD180289}"/>
+              </a:ext>
+            </a:extLst>
+          </p:cNvPr>
+          <p:cNvGrpSpPr>
+            <a:grpSpLocks/>
+          </p:cNvGrpSpPr>
+          <p:nvPr/>
+        </p:nvGrpSpPr>
+        <p:grpSpPr bwMode="auto">
+          <a:xfrm>
+            <a:off x="21282183" y="3399077"/>
+            <a:ext cx="7963814" cy="1001571"/>
+            <a:chOff x="1651" y="20930"/>
+            <a:chExt cx="8128" cy="524"/>
+          </a:xfrm>
+        </p:grpSpPr>
+        <p:sp>
+          <p:nvSpPr>
+            <p:cNvPr id="122" name="Rectangle 1456">
+              <a:extLst>
+                <a:ext uri="{FF2B5EF4-FFF2-40B4-BE49-F238E27FC236}">
+                  <a16:creationId xmlns:a16="http://schemas.microsoft.com/office/drawing/2014/main" id="{95B841BC-0906-4678-88A5-969CD0FC2D20}"/>
+                </a:ext>
+              </a:extLst>
+            </p:cNvPr>
+            <p:cNvSpPr>
+              <a:spLocks noChangeArrowheads="1"/>
+            </p:cNvSpPr>
+            <p:nvPr/>
+          </p:nvSpPr>
+          <p:spPr bwMode="auto">
+            <a:xfrm>
+              <a:off x="1651" y="20930"/>
+              <a:ext cx="8128" cy="524"/>
+            </a:xfrm>
+            <a:prstGeom prst="rect">
+              <a:avLst/>
+            </a:prstGeom>
+            <a:solidFill>
+              <a:srgbClr val="BECCD6"/>
+            </a:solidFill>
+            <a:ln>
+              <a:noFill/>
+            </a:ln>
+            <a:extLst>
+              <a:ext uri="{91240B29-F687-4F45-9708-019B960494DF}">
+                <a14:hiddenLine xmlns:a14="http://schemas.microsoft.com/office/drawing/2010/main" w="38100" algn="ctr">
+                  <a:solidFill>
+                    <a:srgbClr val="000000"/>
+                  </a:solidFill>
+                  <a:miter lim="800000"/>
+                  <a:headEnd/>
+                  <a:tailEnd/>
+                </a14:hiddenLine>
+              </a:ext>
+            </a:extLst>
+          </p:spPr>
+          <p:txBody>
+            <a:bodyPr lIns="89182" tIns="44593" rIns="89182" bIns="44593" anchor="ctr">
+              <a:spAutoFit/>
+            </a:bodyPr>
+            <a:lstStyle/>
+            <a:p>
+              <a:pPr eaLnBrk="0" hangingPunct="0">
+                <a:lnSpc>
+                  <a:spcPct val="75000"/>
+                </a:lnSpc>
+                <a:spcBef>
+                  <a:spcPct val="25000"/>
+                </a:spcBef>
+                <a:spcAft>
+                  <a:spcPct val="25000"/>
+                </a:spcAft>
+              </a:pPr>
+              <a:endParaRPr lang="en-US"/>
+            </a:p>
+          </p:txBody>
+        </p:sp>
+        <p:sp>
+          <p:nvSpPr>
+            <p:cNvPr id="123" name="Rectangle 1457">
+              <a:extLst>
+                <a:ext uri="{FF2B5EF4-FFF2-40B4-BE49-F238E27FC236}">
+                  <a16:creationId xmlns:a16="http://schemas.microsoft.com/office/drawing/2014/main" id="{9951FC1F-FE8E-47D1-83CC-CFB1BBF06702}"/>
+                </a:ext>
+              </a:extLst>
+            </p:cNvPr>
+            <p:cNvSpPr>
+              <a:spLocks noChangeArrowheads="1"/>
+            </p:cNvSpPr>
+            <p:nvPr/>
+          </p:nvSpPr>
+          <p:spPr bwMode="auto">
+            <a:xfrm>
+              <a:off x="1739" y="21085"/>
+              <a:ext cx="7550" cy="228"/>
+            </a:xfrm>
+            <a:prstGeom prst="rect">
+              <a:avLst/>
+            </a:prstGeom>
+            <a:solidFill>
+              <a:srgbClr val="BECCD6"/>
+            </a:solidFill>
+            <a:ln>
+              <a:noFill/>
+            </a:ln>
+            <a:extLst>
+              <a:ext uri="{91240B29-F687-4F45-9708-019B960494DF}">
+                <a14:hiddenLine xmlns:a14="http://schemas.microsoft.com/office/drawing/2010/main" w="38100" algn="ctr">
+                  <a:solidFill>
+                    <a:srgbClr val="000000"/>
+                  </a:solidFill>
+                  <a:miter lim="800000"/>
+                  <a:headEnd/>
+                  <a:tailEnd/>
+                </a14:hiddenLine>
+              </a:ext>
+            </a:extLst>
+          </p:spPr>
+          <p:txBody>
+            <a:bodyPr lIns="89182" tIns="44593" rIns="89182" bIns="44593" anchor="ctr">
+              <a:spAutoFit/>
+            </a:bodyPr>
+            <a:lstStyle/>
+            <a:p>
+              <a:pPr defTabSz="987425" eaLnBrk="0" hangingPunct="0">
+                <a:lnSpc>
+                  <a:spcPct val="75000"/>
+                </a:lnSpc>
+                <a:spcBef>
+                  <a:spcPct val="25000"/>
+                </a:spcBef>
+                <a:spcAft>
+                  <a:spcPct val="25000"/>
+                </a:spcAft>
+              </a:pPr>
+              <a:r>
+                <a:rPr lang="en-ZA" sz="3000" b="1" dirty="0">
+                  <a:latin typeface="Times New Roman" pitchFamily="18" charset="0"/>
+                </a:rPr>
+                <a:t>6</a:t>
+              </a:r>
+              <a:r>
+                <a:rPr lang="en-ZA" sz="3000" b="1" i="0" dirty="0">
+                  <a:latin typeface="Times New Roman" pitchFamily="18" charset="0"/>
+                </a:rPr>
+                <a:t>. </a:t>
+              </a:r>
+              <a:r>
+                <a:rPr lang="en-ZA" sz="3000" b="1" i="0" dirty="0">
+                  <a:latin typeface="Arial" panose="020B0604020202020204" pitchFamily="34" charset="0"/>
+                  <a:cs typeface="Arial" panose="020B0604020202020204" pitchFamily="34" charset="0"/>
+                </a:rPr>
+                <a:t>Probabilistic </a:t>
+              </a:r>
+              <a:r>
+                <a:rPr lang="en-ZA" sz="3000" b="1" dirty="0">
+                  <a:latin typeface="Arial" panose="020B0604020202020204" pitchFamily="34" charset="0"/>
+                  <a:cs typeface="Arial" panose="020B0604020202020204" pitchFamily="34" charset="0"/>
+                </a:rPr>
+                <a:t>Graphical Models</a:t>
+              </a:r>
+              <a:endParaRPr lang="en-US" sz="3000" b="1" i="0" dirty="0">
+                <a:latin typeface="Arial" panose="020B0604020202020204" pitchFamily="34" charset="0"/>
+                <a:cs typeface="Arial" panose="020B0604020202020204" pitchFamily="34" charset="0"/>
+              </a:endParaRPr>
+            </a:p>
+          </p:txBody>
+        </p:sp>
+      </p:grpSp>
+      <p:grpSp>
+        <p:nvGrpSpPr>
+          <p:cNvPr id="124" name="Group 1455">
+            <a:extLst>
+              <a:ext uri="{FF2B5EF4-FFF2-40B4-BE49-F238E27FC236}">
+                <a16:creationId xmlns:a16="http://schemas.microsoft.com/office/drawing/2014/main" id="{76624A49-28E9-4780-B738-5318E74C6AB7}"/>
+              </a:ext>
+            </a:extLst>
+          </p:cNvPr>
+          <p:cNvGrpSpPr>
+            <a:grpSpLocks/>
+          </p:cNvGrpSpPr>
+          <p:nvPr/>
+        </p:nvGrpSpPr>
+        <p:grpSpPr bwMode="auto">
+          <a:xfrm>
+            <a:off x="21279533" y="7772875"/>
+            <a:ext cx="7963814" cy="1001571"/>
+            <a:chOff x="1651" y="20930"/>
+            <a:chExt cx="8128" cy="524"/>
+          </a:xfrm>
+        </p:grpSpPr>
+        <p:sp>
+          <p:nvSpPr>
+            <p:cNvPr id="125" name="Rectangle 1456">
+              <a:extLst>
+                <a:ext uri="{FF2B5EF4-FFF2-40B4-BE49-F238E27FC236}">
+                  <a16:creationId xmlns:a16="http://schemas.microsoft.com/office/drawing/2014/main" id="{8DEF23C1-32B3-41E3-825F-5CC695242225}"/>
+                </a:ext>
+              </a:extLst>
+            </p:cNvPr>
+            <p:cNvSpPr>
+              <a:spLocks noChangeArrowheads="1"/>
+            </p:cNvSpPr>
+            <p:nvPr/>
+          </p:nvSpPr>
+          <p:spPr bwMode="auto">
+            <a:xfrm>
+              <a:off x="1651" y="20930"/>
+              <a:ext cx="8128" cy="524"/>
+            </a:xfrm>
+            <a:prstGeom prst="rect">
+              <a:avLst/>
+            </a:prstGeom>
+            <a:solidFill>
+              <a:srgbClr val="BECCD6"/>
+            </a:solidFill>
+            <a:ln>
+              <a:noFill/>
+            </a:ln>
+            <a:extLst>
+              <a:ext uri="{91240B29-F687-4F45-9708-019B960494DF}">
+                <a14:hiddenLine xmlns:a14="http://schemas.microsoft.com/office/drawing/2010/main" w="38100" algn="ctr">
+                  <a:solidFill>
+                    <a:srgbClr val="000000"/>
+                  </a:solidFill>
+                  <a:miter lim="800000"/>
+                  <a:headEnd/>
+                  <a:tailEnd/>
+                </a14:hiddenLine>
+              </a:ext>
+            </a:extLst>
+          </p:spPr>
+          <p:txBody>
+            <a:bodyPr lIns="89182" tIns="44593" rIns="89182" bIns="44593" anchor="ctr">
+              <a:spAutoFit/>
+            </a:bodyPr>
+            <a:lstStyle/>
+            <a:p>
+              <a:pPr eaLnBrk="0" hangingPunct="0">
+                <a:lnSpc>
+                  <a:spcPct val="75000"/>
+                </a:lnSpc>
+                <a:spcBef>
+                  <a:spcPct val="25000"/>
+                </a:spcBef>
+                <a:spcAft>
+                  <a:spcPct val="25000"/>
+                </a:spcAft>
+              </a:pPr>
+              <a:endParaRPr lang="en-US"/>
+            </a:p>
+          </p:txBody>
+        </p:sp>
+        <p:sp>
+          <p:nvSpPr>
+            <p:cNvPr id="126" name="Rectangle 1457">
+              <a:extLst>
+                <a:ext uri="{FF2B5EF4-FFF2-40B4-BE49-F238E27FC236}">
+                  <a16:creationId xmlns:a16="http://schemas.microsoft.com/office/drawing/2014/main" id="{0C5CA194-0124-4A0A-9D00-DCA71FA44563}"/>
+                </a:ext>
+              </a:extLst>
+            </p:cNvPr>
+            <p:cNvSpPr>
+              <a:spLocks noChangeArrowheads="1"/>
+            </p:cNvSpPr>
+            <p:nvPr/>
+          </p:nvSpPr>
+          <p:spPr bwMode="auto">
+            <a:xfrm>
+              <a:off x="1739" y="21085"/>
+              <a:ext cx="7550" cy="228"/>
+            </a:xfrm>
+            <a:prstGeom prst="rect">
+              <a:avLst/>
+            </a:prstGeom>
+            <a:solidFill>
+              <a:srgbClr val="BECCD6"/>
+            </a:solidFill>
+            <a:ln>
+              <a:noFill/>
+            </a:ln>
+            <a:extLst>
+              <a:ext uri="{91240B29-F687-4F45-9708-019B960494DF}">
+                <a14:hiddenLine xmlns:a14="http://schemas.microsoft.com/office/drawing/2010/main" w="38100" algn="ctr">
+                  <a:solidFill>
+                    <a:srgbClr val="000000"/>
+                  </a:solidFill>
+                  <a:miter lim="800000"/>
+                  <a:headEnd/>
+                  <a:tailEnd/>
+                </a14:hiddenLine>
+              </a:ext>
+            </a:extLst>
+          </p:spPr>
+          <p:txBody>
+            <a:bodyPr lIns="89182" tIns="44593" rIns="89182" bIns="44593" anchor="ctr">
+              <a:spAutoFit/>
+            </a:bodyPr>
+            <a:lstStyle/>
+            <a:p>
+              <a:pPr defTabSz="987425" eaLnBrk="0" hangingPunct="0">
+                <a:lnSpc>
+                  <a:spcPct val="75000"/>
+                </a:lnSpc>
+                <a:spcBef>
+                  <a:spcPct val="25000"/>
+                </a:spcBef>
+                <a:spcAft>
+                  <a:spcPct val="25000"/>
+                </a:spcAft>
+              </a:pPr>
+              <a:r>
+                <a:rPr lang="en-ZA" sz="3000" b="1" i="0" dirty="0">
+                  <a:latin typeface="Times New Roman" pitchFamily="18" charset="0"/>
+                </a:rPr>
+                <a:t>7. </a:t>
+              </a:r>
+              <a:r>
+                <a:rPr lang="en-ZA" sz="3000" b="1" i="0" dirty="0">
+                  <a:latin typeface="Arial" panose="020B0604020202020204" pitchFamily="34" charset="0"/>
+                  <a:cs typeface="Arial" panose="020B0604020202020204" pitchFamily="34" charset="0"/>
+                </a:rPr>
+                <a:t>Results</a:t>
+              </a:r>
+              <a:endParaRPr lang="en-US" sz="3000" b="1" i="0" dirty="0">
+                <a:latin typeface="Arial" panose="020B0604020202020204" pitchFamily="34" charset="0"/>
+                <a:cs typeface="Arial" panose="020B0604020202020204" pitchFamily="34" charset="0"/>
+              </a:endParaRPr>
+            </a:p>
+          </p:txBody>
+        </p:sp>
+      </p:grpSp>
+      <p:grpSp>
+        <p:nvGrpSpPr>
+          <p:cNvPr id="127" name="Group 1455">
+            <a:extLst>
+              <a:ext uri="{FF2B5EF4-FFF2-40B4-BE49-F238E27FC236}">
+                <a16:creationId xmlns:a16="http://schemas.microsoft.com/office/drawing/2014/main" id="{1E76E00B-6C36-4F4E-8EC2-BB7E47F86637}"/>
+              </a:ext>
+            </a:extLst>
+          </p:cNvPr>
+          <p:cNvGrpSpPr>
+            <a:grpSpLocks/>
+          </p:cNvGrpSpPr>
+          <p:nvPr/>
+        </p:nvGrpSpPr>
+        <p:grpSpPr bwMode="auto">
+          <a:xfrm>
+            <a:off x="21234993" y="12458628"/>
+            <a:ext cx="7963814" cy="1001571"/>
+            <a:chOff x="1651" y="20930"/>
+            <a:chExt cx="8128" cy="524"/>
+          </a:xfrm>
+        </p:grpSpPr>
+        <p:sp>
+          <p:nvSpPr>
+            <p:cNvPr id="128" name="Rectangle 1456">
+              <a:extLst>
+                <a:ext uri="{FF2B5EF4-FFF2-40B4-BE49-F238E27FC236}">
+                  <a16:creationId xmlns:a16="http://schemas.microsoft.com/office/drawing/2014/main" id="{0E46F1B5-9072-44A2-AF77-B57E808193E7}"/>
+                </a:ext>
+              </a:extLst>
+            </p:cNvPr>
+            <p:cNvSpPr>
+              <a:spLocks noChangeArrowheads="1"/>
+            </p:cNvSpPr>
+            <p:nvPr/>
+          </p:nvSpPr>
+          <p:spPr bwMode="auto">
+            <a:xfrm>
+              <a:off x="1651" y="20930"/>
+              <a:ext cx="8128" cy="524"/>
+            </a:xfrm>
+            <a:prstGeom prst="rect">
+              <a:avLst/>
+            </a:prstGeom>
+            <a:solidFill>
+              <a:srgbClr val="BECCD6"/>
+            </a:solidFill>
+            <a:ln>
+              <a:noFill/>
+            </a:ln>
+            <a:extLst>
+              <a:ext uri="{91240B29-F687-4F45-9708-019B960494DF}">
+                <a14:hiddenLine xmlns:a14="http://schemas.microsoft.com/office/drawing/2010/main" w="38100" algn="ctr">
+                  <a:solidFill>
+                    <a:srgbClr val="000000"/>
+                  </a:solidFill>
+                  <a:miter lim="800000"/>
+                  <a:headEnd/>
+                  <a:tailEnd/>
+                </a14:hiddenLine>
+              </a:ext>
+            </a:extLst>
+          </p:spPr>
+          <p:txBody>
+            <a:bodyPr lIns="89182" tIns="44593" rIns="89182" bIns="44593" anchor="ctr">
+              <a:spAutoFit/>
+            </a:bodyPr>
+            <a:lstStyle/>
+            <a:p>
+              <a:pPr eaLnBrk="0" hangingPunct="0">
+                <a:lnSpc>
+                  <a:spcPct val="75000"/>
+                </a:lnSpc>
+                <a:spcBef>
+                  <a:spcPct val="25000"/>
+                </a:spcBef>
+                <a:spcAft>
+                  <a:spcPct val="25000"/>
+                </a:spcAft>
+              </a:pPr>
+              <a:endParaRPr lang="en-US"/>
+            </a:p>
+          </p:txBody>
+        </p:sp>
+        <p:sp>
+          <p:nvSpPr>
+            <p:cNvPr id="129" name="Rectangle 1457">
+              <a:extLst>
+                <a:ext uri="{FF2B5EF4-FFF2-40B4-BE49-F238E27FC236}">
+                  <a16:creationId xmlns:a16="http://schemas.microsoft.com/office/drawing/2014/main" id="{E4F82D1E-2234-4CB3-B48F-9DE3D4F74A77}"/>
+                </a:ext>
+              </a:extLst>
+            </p:cNvPr>
+            <p:cNvSpPr>
+              <a:spLocks noChangeArrowheads="1"/>
+            </p:cNvSpPr>
+            <p:nvPr/>
+          </p:nvSpPr>
+          <p:spPr bwMode="auto">
+            <a:xfrm>
+              <a:off x="1739" y="21085"/>
+              <a:ext cx="7550" cy="228"/>
+            </a:xfrm>
+            <a:prstGeom prst="rect">
+              <a:avLst/>
+            </a:prstGeom>
+            <a:solidFill>
+              <a:srgbClr val="BECCD6"/>
+            </a:solidFill>
+            <a:ln>
+              <a:noFill/>
+            </a:ln>
+            <a:extLst>
+              <a:ext uri="{91240B29-F687-4F45-9708-019B960494DF}">
+                <a14:hiddenLine xmlns:a14="http://schemas.microsoft.com/office/drawing/2010/main" w="38100" algn="ctr">
+                  <a:solidFill>
+                    <a:srgbClr val="000000"/>
+                  </a:solidFill>
+                  <a:miter lim="800000"/>
+                  <a:headEnd/>
+                  <a:tailEnd/>
+                </a14:hiddenLine>
+              </a:ext>
+            </a:extLst>
+          </p:spPr>
+          <p:txBody>
+            <a:bodyPr lIns="89182" tIns="44593" rIns="89182" bIns="44593" anchor="ctr">
+              <a:spAutoFit/>
+            </a:bodyPr>
+            <a:lstStyle/>
+            <a:p>
+              <a:pPr defTabSz="987425" eaLnBrk="0" hangingPunct="0">
+                <a:lnSpc>
+                  <a:spcPct val="75000"/>
+                </a:lnSpc>
+                <a:spcBef>
+                  <a:spcPct val="25000"/>
+                </a:spcBef>
+                <a:spcAft>
+                  <a:spcPct val="25000"/>
+                </a:spcAft>
+              </a:pPr>
+              <a:r>
+                <a:rPr lang="en-ZA" sz="3000" b="1" dirty="0">
+                  <a:latin typeface="Times New Roman" pitchFamily="18" charset="0"/>
+                </a:rPr>
+                <a:t>8</a:t>
+              </a:r>
+              <a:r>
+                <a:rPr lang="en-ZA" sz="3000" b="1" i="0" dirty="0">
+                  <a:latin typeface="Times New Roman" pitchFamily="18" charset="0"/>
+                </a:rPr>
+                <a:t>. </a:t>
+              </a:r>
+              <a:r>
+                <a:rPr lang="en-ZA" sz="3000" b="1" i="0" dirty="0">
+                  <a:latin typeface="Arial" panose="020B0604020202020204" pitchFamily="34" charset="0"/>
+                  <a:cs typeface="Arial" panose="020B0604020202020204" pitchFamily="34" charset="0"/>
+                </a:rPr>
+                <a:t>Conclusion</a:t>
+              </a:r>
+              <a:endParaRPr lang="en-US" sz="3000" b="1" i="0" dirty="0">
+                <a:latin typeface="Arial" panose="020B0604020202020204" pitchFamily="34" charset="0"/>
+                <a:cs typeface="Arial" panose="020B0604020202020204" pitchFamily="34" charset="0"/>
+              </a:endParaRPr>
+            </a:p>
+          </p:txBody>
+        </p:sp>
+      </p:grpSp>
+      <p:grpSp>
+        <p:nvGrpSpPr>
+          <p:cNvPr id="130" name="Group 1455">
+            <a:extLst>
+              <a:ext uri="{FF2B5EF4-FFF2-40B4-BE49-F238E27FC236}">
+                <a16:creationId xmlns:a16="http://schemas.microsoft.com/office/drawing/2014/main" id="{F0C5F89B-F6E9-4493-AD89-AD2A7999FA81}"/>
+              </a:ext>
+            </a:extLst>
+          </p:cNvPr>
+          <p:cNvGrpSpPr>
+            <a:grpSpLocks/>
+          </p:cNvGrpSpPr>
+          <p:nvPr/>
+        </p:nvGrpSpPr>
+        <p:grpSpPr bwMode="auto">
+          <a:xfrm>
+            <a:off x="11150978" y="12475209"/>
+            <a:ext cx="7963814" cy="1001571"/>
+            <a:chOff x="1651" y="20930"/>
+            <a:chExt cx="8128" cy="524"/>
+          </a:xfrm>
+        </p:grpSpPr>
+        <p:sp>
+          <p:nvSpPr>
+            <p:cNvPr id="131" name="Rectangle 1456">
+              <a:extLst>
+                <a:ext uri="{FF2B5EF4-FFF2-40B4-BE49-F238E27FC236}">
+                  <a16:creationId xmlns:a16="http://schemas.microsoft.com/office/drawing/2014/main" id="{534C21EA-860D-4859-84FD-E14540DC36C2}"/>
+                </a:ext>
+              </a:extLst>
+            </p:cNvPr>
+            <p:cNvSpPr>
+              <a:spLocks noChangeArrowheads="1"/>
+            </p:cNvSpPr>
+            <p:nvPr/>
+          </p:nvSpPr>
+          <p:spPr bwMode="auto">
+            <a:xfrm>
+              <a:off x="1651" y="20930"/>
+              <a:ext cx="8128" cy="524"/>
+            </a:xfrm>
+            <a:prstGeom prst="rect">
+              <a:avLst/>
+            </a:prstGeom>
+            <a:solidFill>
+              <a:srgbClr val="BECCD6"/>
+            </a:solidFill>
+            <a:ln>
+              <a:noFill/>
+            </a:ln>
+            <a:extLst>
+              <a:ext uri="{91240B29-F687-4F45-9708-019B960494DF}">
+                <a14:hiddenLine xmlns:a14="http://schemas.microsoft.com/office/drawing/2010/main" w="38100" algn="ctr">
+                  <a:solidFill>
+                    <a:srgbClr val="000000"/>
+                  </a:solidFill>
+                  <a:miter lim="800000"/>
+                  <a:headEnd/>
+                  <a:tailEnd/>
+                </a14:hiddenLine>
+              </a:ext>
+            </a:extLst>
+          </p:spPr>
+          <p:txBody>
+            <a:bodyPr lIns="89182" tIns="44593" rIns="89182" bIns="44593" anchor="ctr">
+              <a:spAutoFit/>
+            </a:bodyPr>
+            <a:lstStyle/>
+            <a:p>
+              <a:pPr eaLnBrk="0" hangingPunct="0">
+                <a:lnSpc>
+                  <a:spcPct val="75000"/>
+                </a:lnSpc>
+                <a:spcBef>
+                  <a:spcPct val="25000"/>
+                </a:spcBef>
+                <a:spcAft>
+                  <a:spcPct val="25000"/>
+                </a:spcAft>
+              </a:pPr>
+              <a:endParaRPr lang="en-US"/>
+            </a:p>
+          </p:txBody>
+        </p:sp>
+        <p:sp>
+          <p:nvSpPr>
+            <p:cNvPr id="132" name="Rectangle 1457">
+              <a:extLst>
+                <a:ext uri="{FF2B5EF4-FFF2-40B4-BE49-F238E27FC236}">
+                  <a16:creationId xmlns:a16="http://schemas.microsoft.com/office/drawing/2014/main" id="{F0A1A1B2-3105-45EF-83F2-ADD644C841D4}"/>
+                </a:ext>
+              </a:extLst>
+            </p:cNvPr>
+            <p:cNvSpPr>
+              <a:spLocks noChangeArrowheads="1"/>
+            </p:cNvSpPr>
+            <p:nvPr/>
+          </p:nvSpPr>
+          <p:spPr bwMode="auto">
+            <a:xfrm>
+              <a:off x="1739" y="21085"/>
+              <a:ext cx="7550" cy="228"/>
+            </a:xfrm>
+            <a:prstGeom prst="rect">
+              <a:avLst/>
+            </a:prstGeom>
+            <a:solidFill>
+              <a:srgbClr val="BECCD6"/>
+            </a:solidFill>
+            <a:ln>
+              <a:noFill/>
+            </a:ln>
+            <a:extLst>
+              <a:ext uri="{91240B29-F687-4F45-9708-019B960494DF}">
+                <a14:hiddenLine xmlns:a14="http://schemas.microsoft.com/office/drawing/2010/main" w="38100" algn="ctr">
+                  <a:solidFill>
+                    <a:srgbClr val="000000"/>
+                  </a:solidFill>
+                  <a:miter lim="800000"/>
+                  <a:headEnd/>
+                  <a:tailEnd/>
+                </a14:hiddenLine>
+              </a:ext>
+            </a:extLst>
+          </p:spPr>
+          <p:txBody>
+            <a:bodyPr lIns="89182" tIns="44593" rIns="89182" bIns="44593" anchor="ctr">
+              <a:spAutoFit/>
+            </a:bodyPr>
+            <a:lstStyle/>
+            <a:p>
+              <a:pPr defTabSz="987425" eaLnBrk="0" hangingPunct="0">
+                <a:lnSpc>
+                  <a:spcPct val="75000"/>
+                </a:lnSpc>
+                <a:spcBef>
+                  <a:spcPct val="25000"/>
+                </a:spcBef>
+                <a:spcAft>
+                  <a:spcPct val="25000"/>
+                </a:spcAft>
+              </a:pPr>
+              <a:r>
+                <a:rPr lang="en-ZA" sz="3000" b="1" i="0" dirty="0">
+                  <a:latin typeface="Times New Roman" pitchFamily="18" charset="0"/>
+                </a:rPr>
+                <a:t>5. Character Recognition</a:t>
+              </a:r>
+              <a:endParaRPr lang="en-US" sz="3000" b="1" i="0" dirty="0">
+                <a:latin typeface="Arial" panose="020B0604020202020204" pitchFamily="34" charset="0"/>
+                <a:cs typeface="Arial" panose="020B0604020202020204" pitchFamily="34" charset="0"/>
+              </a:endParaRPr>
+            </a:p>
+          </p:txBody>
+        </p:sp>
+      </p:grpSp>
+      <p:sp>
+        <p:nvSpPr>
+          <p:cNvPr id="135" name="TextBox 134">
+            <a:extLst>
+              <a:ext uri="{FF2B5EF4-FFF2-40B4-BE49-F238E27FC236}">
+                <a16:creationId xmlns:a16="http://schemas.microsoft.com/office/drawing/2014/main" id="{2460F3CB-73E1-4DCA-82A1-1B48474A3892}"/>
+              </a:ext>
+            </a:extLst>
+          </p:cNvPr>
+          <p:cNvSpPr txBox="1"/>
+          <p:nvPr/>
+        </p:nvSpPr>
+        <p:spPr>
+          <a:xfrm>
+            <a:off x="11154731" y="4610416"/>
+            <a:ext cx="7960061" cy="369332"/>
+          </a:xfrm>
+          <a:prstGeom prst="rect">
+            <a:avLst/>
+          </a:prstGeom>
+          <a:noFill/>
+        </p:spPr>
+        <p:txBody>
+          <a:bodyPr wrap="square" rtlCol="0">
+            <a:spAutoFit/>
+          </a:bodyPr>
+          <a:lstStyle/>
+          <a:p>
+            <a:r>
+              <a:rPr lang="en-ZA" dirty="0" err="1"/>
+              <a:t>aadasdasdasd</a:t>
+            </a:r>
+            <a:endParaRPr lang="en-ZA" dirty="0"/>
+          </a:p>
+        </p:txBody>
+      </p:sp>
+      <p:sp>
+        <p:nvSpPr>
+          <p:cNvPr id="142" name="TextBox 141">
+            <a:extLst>
+              <a:ext uri="{FF2B5EF4-FFF2-40B4-BE49-F238E27FC236}">
+                <a16:creationId xmlns:a16="http://schemas.microsoft.com/office/drawing/2014/main" id="{CE6B1C82-E2CB-4A6F-AAC0-A2BA52C57AC7}"/>
+              </a:ext>
+            </a:extLst>
+          </p:cNvPr>
+          <p:cNvSpPr txBox="1"/>
+          <p:nvPr/>
+        </p:nvSpPr>
+        <p:spPr>
+          <a:xfrm>
+            <a:off x="21283286" y="4610416"/>
+            <a:ext cx="7960061" cy="369332"/>
+          </a:xfrm>
+          <a:prstGeom prst="rect">
+            <a:avLst/>
+          </a:prstGeom>
+          <a:noFill/>
+        </p:spPr>
+        <p:txBody>
+          <a:bodyPr wrap="square" rtlCol="0">
+            <a:spAutoFit/>
+          </a:bodyPr>
+          <a:lstStyle/>
+          <a:p>
+            <a:r>
+              <a:rPr lang="en-ZA" dirty="0" err="1"/>
+              <a:t>aadasdasdasd</a:t>
+            </a:r>
+            <a:endParaRPr lang="en-ZA" dirty="0"/>
+          </a:p>
+        </p:txBody>
+      </p:sp>
+      <p:sp>
+        <p:nvSpPr>
+          <p:cNvPr id="143" name="TextBox 142">
+            <a:extLst>
+              <a:ext uri="{FF2B5EF4-FFF2-40B4-BE49-F238E27FC236}">
+                <a16:creationId xmlns:a16="http://schemas.microsoft.com/office/drawing/2014/main" id="{F1C9CDA6-8EFD-49E9-836C-69AC7784F01C}"/>
+              </a:ext>
+            </a:extLst>
+          </p:cNvPr>
+          <p:cNvSpPr txBox="1"/>
+          <p:nvPr/>
+        </p:nvSpPr>
+        <p:spPr>
+          <a:xfrm>
+            <a:off x="21321215" y="8972300"/>
+            <a:ext cx="7960061" cy="369332"/>
+          </a:xfrm>
+          <a:prstGeom prst="rect">
+            <a:avLst/>
+          </a:prstGeom>
+          <a:noFill/>
+        </p:spPr>
+        <p:txBody>
+          <a:bodyPr wrap="square" rtlCol="0">
+            <a:spAutoFit/>
+          </a:bodyPr>
+          <a:lstStyle/>
+          <a:p>
+            <a:r>
+              <a:rPr lang="en-ZA" dirty="0" err="1"/>
+              <a:t>aadasdasdasd</a:t>
+            </a:r>
+            <a:endParaRPr lang="en-ZA" dirty="0"/>
+          </a:p>
+        </p:txBody>
+      </p:sp>
+      <p:sp>
+        <p:nvSpPr>
+          <p:cNvPr id="144" name="TextBox 143">
+            <a:extLst>
+              <a:ext uri="{FF2B5EF4-FFF2-40B4-BE49-F238E27FC236}">
+                <a16:creationId xmlns:a16="http://schemas.microsoft.com/office/drawing/2014/main" id="{B10AB543-0BF7-4F2D-A5EB-7A78279FE6A1}"/>
+              </a:ext>
+            </a:extLst>
+          </p:cNvPr>
+          <p:cNvSpPr txBox="1"/>
+          <p:nvPr/>
+        </p:nvSpPr>
+        <p:spPr>
+          <a:xfrm>
+            <a:off x="21234993" y="13692222"/>
+            <a:ext cx="7960061" cy="369332"/>
+          </a:xfrm>
+          <a:prstGeom prst="rect">
+            <a:avLst/>
+          </a:prstGeom>
+          <a:noFill/>
+        </p:spPr>
+        <p:txBody>
+          <a:bodyPr wrap="square" rtlCol="0">
+            <a:spAutoFit/>
+          </a:bodyPr>
+          <a:lstStyle/>
+          <a:p>
+            <a:r>
+              <a:rPr lang="en-ZA" dirty="0" err="1"/>
+              <a:t>aadasdasdasd</a:t>
+            </a:r>
+            <a:endParaRPr lang="en-ZA" dirty="0"/>
+          </a:p>
+        </p:txBody>
+      </p:sp>
+      <p:pic>
+        <p:nvPicPr>
+          <p:cNvPr id="34" name="Picture 33">
+            <a:extLst>
+              <a:ext uri="{FF2B5EF4-FFF2-40B4-BE49-F238E27FC236}">
+                <a16:creationId xmlns:a16="http://schemas.microsoft.com/office/drawing/2014/main" id="{B423BA03-350E-434C-95F5-57D5A86C5BC4}"/>
+              </a:ext>
+            </a:extLst>
+          </p:cNvPr>
+          <p:cNvPicPr>
+            <a:picLocks noChangeAspect="1"/>
+          </p:cNvPicPr>
+          <p:nvPr/>
+        </p:nvPicPr>
+        <p:blipFill>
+          <a:blip r:embed="rId13">
+            <a:extLst>
+              <a:ext uri="{28A0092B-C50C-407E-A947-70E740481C1C}">
+                <a14:useLocalDpi xmlns:a14="http://schemas.microsoft.com/office/drawing/2010/main" val="0"/>
+              </a:ext>
+            </a:extLst>
+          </a:blip>
+          <a:stretch>
+            <a:fillRect/>
+          </a:stretch>
+        </p:blipFill>
+        <p:spPr>
+          <a:xfrm>
+            <a:off x="5672922" y="8905899"/>
+            <a:ext cx="1737523" cy="2457754"/>
+          </a:xfrm>
+          <a:prstGeom prst="rect">
+            <a:avLst/>
+          </a:prstGeom>
+        </p:spPr>
+      </p:pic>
+      <p:pic>
+        <p:nvPicPr>
+          <p:cNvPr id="36" name="Picture 35">
+            <a:extLst>
+              <a:ext uri="{FF2B5EF4-FFF2-40B4-BE49-F238E27FC236}">
+                <a16:creationId xmlns:a16="http://schemas.microsoft.com/office/drawing/2014/main" id="{06308249-5383-4DAC-94AC-E687963647D5}"/>
+              </a:ext>
+            </a:extLst>
+          </p:cNvPr>
+          <p:cNvPicPr>
+            <a:picLocks noChangeAspect="1"/>
+          </p:cNvPicPr>
+          <p:nvPr/>
+        </p:nvPicPr>
+        <p:blipFill>
+          <a:blip r:embed="rId14">
+            <a:extLst>
+              <a:ext uri="{28A0092B-C50C-407E-A947-70E740481C1C}">
+                <a14:useLocalDpi xmlns:a14="http://schemas.microsoft.com/office/drawing/2010/main" val="0"/>
+              </a:ext>
+            </a:extLst>
+          </a:blip>
+          <a:stretch>
+            <a:fillRect/>
+          </a:stretch>
+        </p:blipFill>
+        <p:spPr>
+          <a:xfrm>
+            <a:off x="7452536" y="8913009"/>
+            <a:ext cx="1710514" cy="2419550"/>
           </a:xfrm>
           <a:prstGeom prst="rect">
             <a:avLst/>

</xml_diff>

<commit_message>
Image processing and character recognition is now completed.
</commit_message>
<xml_diff>
--- a/Poster/Poster.pptx
+++ b/Poster/Poster.pptx
@@ -3524,7 +3524,7 @@
         </p:nvSpPr>
         <p:spPr>
           <a:xfrm>
-            <a:off x="10518808" y="11924497"/>
+            <a:off x="10455637" y="11915557"/>
             <a:ext cx="9021230" cy="6922096"/>
           </a:xfrm>
           <a:prstGeom prst="roundRect">
@@ -3720,7 +3720,7 @@
         </p:nvSpPr>
         <p:spPr>
           <a:xfrm>
-            <a:off x="10590858" y="2745199"/>
+            <a:off x="10675624" y="2795188"/>
             <a:ext cx="9021230" cy="8804721"/>
           </a:xfrm>
           <a:prstGeom prst="roundRect">
@@ -3886,8 +3886,8 @@
         </p:nvGrpSpPr>
         <p:grpSpPr>
           <a:xfrm>
-            <a:off x="1600200" y="15848452"/>
-            <a:ext cx="6407670" cy="2811573"/>
+            <a:off x="1836062" y="15728817"/>
+            <a:ext cx="6384094" cy="2809501"/>
             <a:chOff x="15555487" y="3261832"/>
             <a:chExt cx="11365968" cy="4529251"/>
           </a:xfrm>
@@ -5534,7 +5534,7 @@
         <p:spPr>
           <a:xfrm>
             <a:off x="1057140" y="13830695"/>
-            <a:ext cx="7926447" cy="369332"/>
+            <a:ext cx="7926447" cy="2031325"/>
           </a:xfrm>
           <a:prstGeom prst="rect">
             <a:avLst/>
@@ -5548,10 +5548,9 @@
           <a:lstStyle/>
           <a:p>
             <a:r>
-              <a:rPr lang="en-ZA" dirty="0" err="1"/>
-              <a:t>aadasdasdasd</a:t>
-            </a:r>
-            <a:endParaRPr lang="en-ZA" dirty="0"/>
+              <a:rPr lang="en-ZA" dirty="0"/>
+              <a:t>Initially, image processing is done on the image and produces character and bubble evidence, as is shown in the image. The bubble evidence contains a classification for each bubble on the template. The bubble can be open, crossed-out, partially filled-in or completely filled-in. The character evidence, in the form of a 28 by 28 array is then process by a Convolutional Neural Network(CNN) to classify the digit in the image. Lastly two probabilistically graphical models are used to estimate the most likely answers written on the page.  </a:t>
+            </a:r>
           </a:p>
         </p:txBody>
       </p:sp>
@@ -6721,8 +6720,8 @@
         </p:nvSpPr>
         <p:spPr>
           <a:xfrm>
-            <a:off x="11154731" y="4610416"/>
-            <a:ext cx="7960061" cy="369332"/>
+            <a:off x="11154732" y="4610416"/>
+            <a:ext cx="5302820" cy="5632311"/>
           </a:xfrm>
           <a:prstGeom prst="rect">
             <a:avLst/>
@@ -6736,9 +6735,35 @@
           <a:lstStyle/>
           <a:p>
             <a:r>
-              <a:rPr lang="en-ZA" dirty="0" err="1"/>
-              <a:t>aadasdasdasd</a:t>
-            </a:r>
+              <a:rPr lang="en-ZA" dirty="0"/>
+              <a:t>To find the template inside the image the system first utilizes a Radon Transform to locate the two longest horizontal lines, as well as the two vertical lines of the comment box. These lines are then used to calculate four reference points on the page, indication where the template is. </a:t>
+            </a:r>
+          </a:p>
+          <a:p>
+            <a:endParaRPr lang="en-ZA" dirty="0"/>
+          </a:p>
+          <a:p>
+            <a:endParaRPr lang="en-ZA" dirty="0"/>
+          </a:p>
+          <a:p>
+            <a:endParaRPr lang="en-ZA" dirty="0"/>
+          </a:p>
+          <a:p>
+            <a:endParaRPr lang="en-ZA" dirty="0"/>
+          </a:p>
+          <a:p>
+            <a:endParaRPr lang="en-ZA" dirty="0"/>
+          </a:p>
+          <a:p>
+            <a:endParaRPr lang="en-ZA" dirty="0"/>
+          </a:p>
+          <a:p>
+            <a:r>
+              <a:rPr lang="en-ZA" dirty="0"/>
+              <a:t>Once the template is found contour analysis is done on the page. The reference template found in the image can then be used to estimate the locations of each bubble in the template. Bubble then is assigned a contour that has a centre closest to that estimated locations. In the figure below the red dots are the estimate bubble locations and the green dots the centres of the contours found.</a:t>
+            </a:r>
+          </a:p>
+          <a:p>
             <a:endParaRPr lang="en-ZA" dirty="0"/>
           </a:p>
         </p:txBody>
@@ -6879,7 +6904,7 @@
         </p:blipFill>
         <p:spPr>
           <a:xfrm>
-            <a:off x="5672922" y="8905899"/>
+            <a:off x="5672922" y="8829699"/>
             <a:ext cx="1737523" cy="2457754"/>
           </a:xfrm>
           <a:prstGeom prst="rect">
@@ -6915,7 +6940,7 @@
         </p:blipFill>
         <p:spPr>
           <a:xfrm>
-            <a:off x="7452536" y="8913009"/>
+            <a:off x="7452536" y="8836809"/>
             <a:ext cx="1710514" cy="2419550"/>
           </a:xfrm>
           <a:prstGeom prst="rect">
@@ -6923,6 +6948,972 @@
           </a:prstGeom>
         </p:spPr>
       </p:pic>
+      <p:pic>
+        <p:nvPicPr>
+          <p:cNvPr id="72" name="Picture 71">
+            <a:extLst>
+              <a:ext uri="{FF2B5EF4-FFF2-40B4-BE49-F238E27FC236}">
+                <a16:creationId xmlns:a16="http://schemas.microsoft.com/office/drawing/2014/main" id="{FAD8165D-210F-403B-85F3-D2F7D0AB2F92}"/>
+              </a:ext>
+            </a:extLst>
+          </p:cNvPr>
+          <p:cNvPicPr>
+            <a:picLocks noChangeAspect="1"/>
+          </p:cNvPicPr>
+          <p:nvPr/>
+        </p:nvPicPr>
+        <p:blipFill rotWithShape="1">
+          <a:blip r:embed="rId15">
+            <a:extLst>
+              <a:ext uri="{28A0092B-C50C-407E-A947-70E740481C1C}">
+                <a14:useLocalDpi xmlns:a14="http://schemas.microsoft.com/office/drawing/2010/main" val="0"/>
+              </a:ext>
+            </a:extLst>
+          </a:blip>
+          <a:srcRect l="5516" t="3740" r="5341" b="1698"/>
+          <a:stretch/>
+        </p:blipFill>
+        <p:spPr>
+          <a:xfrm>
+            <a:off x="16457552" y="4601885"/>
+            <a:ext cx="1760967" cy="2389211"/>
+          </a:xfrm>
+          <a:prstGeom prst="rect">
+            <a:avLst/>
+          </a:prstGeom>
+        </p:spPr>
+      </p:pic>
+      <p:pic>
+        <p:nvPicPr>
+          <p:cNvPr id="74" name="Picture 4" descr="https://www.mindef.gov.sg/content/imindef/publications/pointer/journals/2008/v34n1/tech_edge/_jcr_content/imindefPars/0012/image.img.png">
+            <a:extLst>
+              <a:ext uri="{FF2B5EF4-FFF2-40B4-BE49-F238E27FC236}">
+                <a16:creationId xmlns:a16="http://schemas.microsoft.com/office/drawing/2014/main" id="{1CC53C45-6C58-4B0A-AE45-93C2676C0DB5}"/>
+              </a:ext>
+            </a:extLst>
+          </p:cNvPr>
+          <p:cNvPicPr>
+            <a:picLocks noChangeAspect="1" noChangeArrowheads="1"/>
+          </p:cNvPicPr>
+          <p:nvPr/>
+        </p:nvPicPr>
+        <p:blipFill>
+          <a:blip r:embed="rId16">
+            <a:extLst>
+              <a:ext uri="{28A0092B-C50C-407E-A947-70E740481C1C}">
+                <a14:useLocalDpi xmlns:a14="http://schemas.microsoft.com/office/drawing/2010/main" val="0"/>
+              </a:ext>
+            </a:extLst>
+          </a:blip>
+          <a:srcRect/>
+          <a:stretch>
+            <a:fillRect/>
+          </a:stretch>
+        </p:blipFill>
+        <p:spPr bwMode="auto">
+          <a:xfrm>
+            <a:off x="13733063" y="6083548"/>
+            <a:ext cx="1982533" cy="1432088"/>
+          </a:xfrm>
+          <a:prstGeom prst="rect">
+            <a:avLst/>
+          </a:prstGeom>
+          <a:noFill/>
+          <a:extLst>
+            <a:ext uri="{909E8E84-426E-40DD-AFC4-6F175D3DCCD1}">
+              <a14:hiddenFill xmlns:a14="http://schemas.microsoft.com/office/drawing/2010/main">
+                <a:solidFill>
+                  <a:srgbClr val="FFFFFF"/>
+                </a:solidFill>
+              </a14:hiddenFill>
+            </a:ext>
+          </a:extLst>
+        </p:spPr>
+      </p:pic>
+      <p:pic>
+        <p:nvPicPr>
+          <p:cNvPr id="75" name="Picture 74">
+            <a:extLst>
+              <a:ext uri="{FF2B5EF4-FFF2-40B4-BE49-F238E27FC236}">
+                <a16:creationId xmlns:a16="http://schemas.microsoft.com/office/drawing/2014/main" id="{6D393A46-ACD6-41A9-A8FF-4E2BA14DD011}"/>
+              </a:ext>
+            </a:extLst>
+          </p:cNvPr>
+          <p:cNvPicPr>
+            <a:picLocks noChangeAspect="1"/>
+          </p:cNvPicPr>
+          <p:nvPr/>
+        </p:nvPicPr>
+        <p:blipFill>
+          <a:blip r:embed="rId8">
+            <a:extLst>
+              <a:ext uri="{28A0092B-C50C-407E-A947-70E740481C1C}">
+                <a14:useLocalDpi xmlns:a14="http://schemas.microsoft.com/office/drawing/2010/main" val="0"/>
+              </a:ext>
+            </a:extLst>
+          </a:blip>
+          <a:stretch>
+            <a:fillRect/>
+          </a:stretch>
+        </p:blipFill>
+        <p:spPr>
+          <a:xfrm>
+            <a:off x="16543774" y="7955931"/>
+            <a:ext cx="1760967" cy="2402069"/>
+          </a:xfrm>
+          <a:prstGeom prst="rect">
+            <a:avLst/>
+          </a:prstGeom>
+        </p:spPr>
+      </p:pic>
+      <p:pic>
+        <p:nvPicPr>
+          <p:cNvPr id="80" name="Picture 79">
+            <a:extLst>
+              <a:ext uri="{FF2B5EF4-FFF2-40B4-BE49-F238E27FC236}">
+                <a16:creationId xmlns:a16="http://schemas.microsoft.com/office/drawing/2014/main" id="{E8EB972F-C578-4C39-8B14-8E51E517C2E4}"/>
+              </a:ext>
+            </a:extLst>
+          </p:cNvPr>
+          <p:cNvPicPr>
+            <a:picLocks noChangeAspect="1"/>
+          </p:cNvPicPr>
+          <p:nvPr/>
+        </p:nvPicPr>
+        <p:blipFill rotWithShape="1">
+          <a:blip r:embed="rId17" cstate="print">
+            <a:extLst>
+              <a:ext uri="{28A0092B-C50C-407E-A947-70E740481C1C}">
+                <a14:useLocalDpi xmlns:a14="http://schemas.microsoft.com/office/drawing/2010/main" val="0"/>
+              </a:ext>
+            </a:extLst>
+          </a:blip>
+          <a:srcRect l="12396" t="13102" r="8591" b="10603"/>
+          <a:stretch/>
+        </p:blipFill>
+        <p:spPr>
+          <a:xfrm rot="5400000" flipH="1">
+            <a:off x="17557693" y="5522518"/>
+            <a:ext cx="2139060" cy="752871"/>
+          </a:xfrm>
+          <a:prstGeom prst="rect">
+            <a:avLst/>
+          </a:prstGeom>
+        </p:spPr>
+      </p:pic>
+      <p:pic>
+        <p:nvPicPr>
+          <p:cNvPr id="86" name="Content Placeholder 4">
+            <a:extLst>
+              <a:ext uri="{FF2B5EF4-FFF2-40B4-BE49-F238E27FC236}">
+                <a16:creationId xmlns:a16="http://schemas.microsoft.com/office/drawing/2014/main" id="{61928B2C-98B1-417A-9706-D9C365720335}"/>
+              </a:ext>
+            </a:extLst>
+          </p:cNvPr>
+          <p:cNvPicPr>
+            <a:picLocks noChangeAspect="1"/>
+          </p:cNvPicPr>
+          <p:nvPr/>
+        </p:nvPicPr>
+        <p:blipFill rotWithShape="1">
+          <a:blip r:embed="rId18">
+            <a:extLst>
+              <a:ext uri="{28A0092B-C50C-407E-A947-70E740481C1C}">
+                <a14:useLocalDpi xmlns:a14="http://schemas.microsoft.com/office/drawing/2010/main" val="0"/>
+              </a:ext>
+            </a:extLst>
+          </a:blip>
+          <a:srcRect l="79282" t="7597" r="4243" b="66960"/>
+          <a:stretch/>
+        </p:blipFill>
+        <p:spPr bwMode="auto">
+          <a:xfrm>
+            <a:off x="14100702" y="9869372"/>
+            <a:ext cx="1411613" cy="1434040"/>
+          </a:xfrm>
+          <a:prstGeom prst="rect">
+            <a:avLst/>
+          </a:prstGeom>
+          <a:noFill/>
+          <a:ln>
+            <a:noFill/>
+          </a:ln>
+          <a:extLst>
+            <a:ext uri="{909E8E84-426E-40DD-AFC4-6F175D3DCCD1}">
+              <a14:hiddenFill xmlns:a14="http://schemas.microsoft.com/office/drawing/2010/main">
+                <a:solidFill>
+                  <a:srgbClr val="FFFFFF"/>
+                </a:solidFill>
+              </a14:hiddenFill>
+            </a:ext>
+            <a:ext uri="{91240B29-F687-4F45-9708-019B960494DF}">
+              <a14:hiddenLine xmlns:a14="http://schemas.microsoft.com/office/drawing/2010/main" w="9525">
+                <a:solidFill>
+                  <a:srgbClr val="000000"/>
+                </a:solidFill>
+                <a:miter lim="800000"/>
+                <a:headEnd/>
+                <a:tailEnd/>
+              </a14:hiddenLine>
+            </a:ext>
+          </a:extLst>
+        </p:spPr>
+      </p:pic>
+      <p:sp>
+        <p:nvSpPr>
+          <p:cNvPr id="88" name="TextBox 87">
+            <a:extLst>
+              <a:ext uri="{FF2B5EF4-FFF2-40B4-BE49-F238E27FC236}">
+                <a16:creationId xmlns:a16="http://schemas.microsoft.com/office/drawing/2014/main" id="{09492004-7B6B-4072-888F-14E448866746}"/>
+              </a:ext>
+            </a:extLst>
+          </p:cNvPr>
+          <p:cNvSpPr txBox="1"/>
+          <p:nvPr/>
+        </p:nvSpPr>
+        <p:spPr>
+          <a:xfrm>
+            <a:off x="6772095" y="11151801"/>
+            <a:ext cx="1563784" cy="369332"/>
+          </a:xfrm>
+          <a:prstGeom prst="rect">
+            <a:avLst/>
+          </a:prstGeom>
+          <a:noFill/>
+        </p:spPr>
+        <p:txBody>
+          <a:bodyPr wrap="square" rtlCol="0">
+            <a:spAutoFit/>
+          </a:bodyPr>
+          <a:lstStyle/>
+          <a:p>
+            <a:r>
+              <a:rPr lang="en-ZA" dirty="0"/>
+              <a:t>Example tests</a:t>
+            </a:r>
+          </a:p>
+        </p:txBody>
+      </p:sp>
+      <p:sp>
+        <p:nvSpPr>
+          <p:cNvPr id="89" name="TextBox 88">
+            <a:extLst>
+              <a:ext uri="{FF2B5EF4-FFF2-40B4-BE49-F238E27FC236}">
+                <a16:creationId xmlns:a16="http://schemas.microsoft.com/office/drawing/2014/main" id="{A7C35CE1-EE8C-4FFB-B7FA-5ECBC57B09B0}"/>
+              </a:ext>
+            </a:extLst>
+          </p:cNvPr>
+          <p:cNvSpPr txBox="1"/>
+          <p:nvPr/>
+        </p:nvSpPr>
+        <p:spPr>
+          <a:xfrm>
+            <a:off x="3944951" y="18509191"/>
+            <a:ext cx="1993698" cy="369332"/>
+          </a:xfrm>
+          <a:prstGeom prst="rect">
+            <a:avLst/>
+          </a:prstGeom>
+          <a:noFill/>
+        </p:spPr>
+        <p:txBody>
+          <a:bodyPr wrap="square" rtlCol="0">
+            <a:spAutoFit/>
+          </a:bodyPr>
+          <a:lstStyle/>
+          <a:p>
+            <a:r>
+              <a:rPr lang="en-ZA" dirty="0"/>
+              <a:t>Graphical overview</a:t>
+            </a:r>
+          </a:p>
+        </p:txBody>
+      </p:sp>
+      <p:sp>
+        <p:nvSpPr>
+          <p:cNvPr id="90" name="TextBox 89">
+            <a:extLst>
+              <a:ext uri="{FF2B5EF4-FFF2-40B4-BE49-F238E27FC236}">
+                <a16:creationId xmlns:a16="http://schemas.microsoft.com/office/drawing/2014/main" id="{B86896FC-8A1D-490C-A230-05EDCDFFB66F}"/>
+              </a:ext>
+            </a:extLst>
+          </p:cNvPr>
+          <p:cNvSpPr txBox="1"/>
+          <p:nvPr/>
+        </p:nvSpPr>
+        <p:spPr>
+          <a:xfrm>
+            <a:off x="16487944" y="6961749"/>
+            <a:ext cx="2812432" cy="646331"/>
+          </a:xfrm>
+          <a:prstGeom prst="rect">
+            <a:avLst/>
+          </a:prstGeom>
+          <a:noFill/>
+        </p:spPr>
+        <p:txBody>
+          <a:bodyPr wrap="square" rtlCol="0">
+            <a:spAutoFit/>
+          </a:bodyPr>
+          <a:lstStyle/>
+          <a:p>
+            <a:r>
+              <a:rPr lang="en-ZA" dirty="0"/>
+              <a:t>Reference points with Radon transform applied</a:t>
+            </a:r>
+          </a:p>
+        </p:txBody>
+      </p:sp>
+      <p:sp>
+        <p:nvSpPr>
+          <p:cNvPr id="91" name="TextBox 90">
+            <a:extLst>
+              <a:ext uri="{FF2B5EF4-FFF2-40B4-BE49-F238E27FC236}">
+                <a16:creationId xmlns:a16="http://schemas.microsoft.com/office/drawing/2014/main" id="{527F3B1D-350C-4CF0-827A-C2A4F21EBAEE}"/>
+              </a:ext>
+            </a:extLst>
+          </p:cNvPr>
+          <p:cNvSpPr txBox="1"/>
+          <p:nvPr/>
+        </p:nvSpPr>
+        <p:spPr>
+          <a:xfrm>
+            <a:off x="13894431" y="7330970"/>
+            <a:ext cx="1769328" cy="369332"/>
+          </a:xfrm>
+          <a:prstGeom prst="rect">
+            <a:avLst/>
+          </a:prstGeom>
+          <a:noFill/>
+        </p:spPr>
+        <p:txBody>
+          <a:bodyPr wrap="square" rtlCol="0">
+            <a:spAutoFit/>
+          </a:bodyPr>
+          <a:lstStyle/>
+          <a:p>
+            <a:r>
+              <a:rPr lang="en-ZA" dirty="0"/>
+              <a:t>Radon transform</a:t>
+            </a:r>
+          </a:p>
+        </p:txBody>
+      </p:sp>
+      <p:sp>
+        <p:nvSpPr>
+          <p:cNvPr id="92" name="TextBox 91">
+            <a:extLst>
+              <a:ext uri="{FF2B5EF4-FFF2-40B4-BE49-F238E27FC236}">
+                <a16:creationId xmlns:a16="http://schemas.microsoft.com/office/drawing/2014/main" id="{D57A464F-7B12-4859-A5FD-FCE6C22F07E4}"/>
+              </a:ext>
+            </a:extLst>
+          </p:cNvPr>
+          <p:cNvSpPr txBox="1"/>
+          <p:nvPr/>
+        </p:nvSpPr>
+        <p:spPr>
+          <a:xfrm>
+            <a:off x="16543773" y="10383814"/>
+            <a:ext cx="2459885" cy="646331"/>
+          </a:xfrm>
+          <a:prstGeom prst="rect">
+            <a:avLst/>
+          </a:prstGeom>
+          <a:noFill/>
+        </p:spPr>
+        <p:txBody>
+          <a:bodyPr wrap="square" rtlCol="0">
+            <a:spAutoFit/>
+          </a:bodyPr>
+          <a:lstStyle/>
+          <a:p>
+            <a:r>
+              <a:rPr lang="en-ZA" dirty="0"/>
+              <a:t>Contours found using contour analysis</a:t>
+            </a:r>
+          </a:p>
+        </p:txBody>
+      </p:sp>
+      <p:sp>
+        <p:nvSpPr>
+          <p:cNvPr id="93" name="TextBox 92">
+            <a:extLst>
+              <a:ext uri="{FF2B5EF4-FFF2-40B4-BE49-F238E27FC236}">
+                <a16:creationId xmlns:a16="http://schemas.microsoft.com/office/drawing/2014/main" id="{FFA0B7E0-2DD3-4541-8772-8910066929CE}"/>
+              </a:ext>
+            </a:extLst>
+          </p:cNvPr>
+          <p:cNvSpPr txBox="1"/>
+          <p:nvPr/>
+        </p:nvSpPr>
+        <p:spPr>
+          <a:xfrm>
+            <a:off x="12227031" y="11215089"/>
+            <a:ext cx="5181600" cy="369332"/>
+          </a:xfrm>
+          <a:prstGeom prst="rect">
+            <a:avLst/>
+          </a:prstGeom>
+          <a:noFill/>
+        </p:spPr>
+        <p:txBody>
+          <a:bodyPr wrap="square" rtlCol="0">
+            <a:spAutoFit/>
+          </a:bodyPr>
+          <a:lstStyle/>
+          <a:p>
+            <a:r>
+              <a:rPr lang="en-ZA" dirty="0"/>
+              <a:t>Green: Bubble reference points. Red: Contour centres</a:t>
+            </a:r>
+          </a:p>
+        </p:txBody>
+      </p:sp>
+      <p:grpSp>
+        <p:nvGrpSpPr>
+          <p:cNvPr id="100" name="Group 99">
+            <a:extLst>
+              <a:ext uri="{FF2B5EF4-FFF2-40B4-BE49-F238E27FC236}">
+                <a16:creationId xmlns:a16="http://schemas.microsoft.com/office/drawing/2014/main" id="{866EFC9F-6BEE-4CD7-9FF9-4ACE949BEB8B}"/>
+              </a:ext>
+            </a:extLst>
+          </p:cNvPr>
+          <p:cNvGrpSpPr/>
+          <p:nvPr/>
+        </p:nvGrpSpPr>
+        <p:grpSpPr>
+          <a:xfrm>
+            <a:off x="11852374" y="14649315"/>
+            <a:ext cx="3664599" cy="768062"/>
+            <a:chOff x="6391274" y="1603194"/>
+            <a:chExt cx="4990401" cy="1108354"/>
+          </a:xfrm>
+        </p:grpSpPr>
+        <p:pic>
+          <p:nvPicPr>
+            <p:cNvPr id="101" name="Picture 100">
+              <a:extLst>
+                <a:ext uri="{FF2B5EF4-FFF2-40B4-BE49-F238E27FC236}">
+                  <a16:creationId xmlns:a16="http://schemas.microsoft.com/office/drawing/2014/main" id="{719D44F7-B17F-4C40-AF17-09418D0F8732}"/>
+                </a:ext>
+              </a:extLst>
+            </p:cNvPr>
+            <p:cNvPicPr>
+              <a:picLocks noChangeAspect="1"/>
+            </p:cNvPicPr>
+            <p:nvPr/>
+          </p:nvPicPr>
+          <p:blipFill>
+            <a:blip r:embed="rId19" cstate="print">
+              <a:extLst>
+                <a:ext uri="{28A0092B-C50C-407E-A947-70E740481C1C}">
+                  <a14:useLocalDpi xmlns:a14="http://schemas.microsoft.com/office/drawing/2010/main" val="0"/>
+                </a:ext>
+              </a:extLst>
+            </a:blip>
+            <a:stretch>
+              <a:fillRect/>
+            </a:stretch>
+          </p:blipFill>
+          <p:spPr>
+            <a:xfrm>
+              <a:off x="8941253" y="1603194"/>
+              <a:ext cx="1099393" cy="1108354"/>
+            </a:xfrm>
+            <a:prstGeom prst="rect">
+              <a:avLst/>
+            </a:prstGeom>
+          </p:spPr>
+        </p:pic>
+        <p:pic>
+          <p:nvPicPr>
+            <p:cNvPr id="102" name="Picture 101">
+              <a:extLst>
+                <a:ext uri="{FF2B5EF4-FFF2-40B4-BE49-F238E27FC236}">
+                  <a16:creationId xmlns:a16="http://schemas.microsoft.com/office/drawing/2014/main" id="{91E17DE5-DC0D-40EA-9CC3-1DC94F4B2D39}"/>
+                </a:ext>
+              </a:extLst>
+            </p:cNvPr>
+            <p:cNvPicPr>
+              <a:picLocks noChangeAspect="1"/>
+            </p:cNvPicPr>
+            <p:nvPr/>
+          </p:nvPicPr>
+          <p:blipFill>
+            <a:blip r:embed="rId20" cstate="print">
+              <a:extLst>
+                <a:ext uri="{28A0092B-C50C-407E-A947-70E740481C1C}">
+                  <a14:useLocalDpi xmlns:a14="http://schemas.microsoft.com/office/drawing/2010/main" val="0"/>
+                </a:ext>
+              </a:extLst>
+            </a:blip>
+            <a:stretch>
+              <a:fillRect/>
+            </a:stretch>
+          </p:blipFill>
+          <p:spPr>
+            <a:xfrm>
+              <a:off x="7634900" y="1603194"/>
+              <a:ext cx="1104250" cy="1108354"/>
+            </a:xfrm>
+            <a:prstGeom prst="rect">
+              <a:avLst/>
+            </a:prstGeom>
+          </p:spPr>
+        </p:pic>
+        <p:pic>
+          <p:nvPicPr>
+            <p:cNvPr id="103" name="Picture 102">
+              <a:extLst>
+                <a:ext uri="{FF2B5EF4-FFF2-40B4-BE49-F238E27FC236}">
+                  <a16:creationId xmlns:a16="http://schemas.microsoft.com/office/drawing/2014/main" id="{9EEC8D0E-7B74-40E2-A1E8-013CFB3F0003}"/>
+                </a:ext>
+              </a:extLst>
+            </p:cNvPr>
+            <p:cNvPicPr>
+              <a:picLocks noChangeAspect="1"/>
+            </p:cNvPicPr>
+            <p:nvPr/>
+          </p:nvPicPr>
+          <p:blipFill rotWithShape="1">
+            <a:blip r:embed="rId21">
+              <a:extLst>
+                <a:ext uri="{28A0092B-C50C-407E-A947-70E740481C1C}">
+                  <a14:useLocalDpi xmlns:a14="http://schemas.microsoft.com/office/drawing/2010/main" val="0"/>
+                </a:ext>
+              </a:extLst>
+            </a:blip>
+            <a:srcRect l="66266" t="10452" r="1471" b="5413"/>
+            <a:stretch/>
+          </p:blipFill>
+          <p:spPr>
+            <a:xfrm>
+              <a:off x="6391274" y="1603194"/>
+              <a:ext cx="1041523" cy="1108354"/>
+            </a:xfrm>
+            <a:prstGeom prst="rect">
+              <a:avLst/>
+            </a:prstGeom>
+          </p:spPr>
+        </p:pic>
+        <p:pic>
+          <p:nvPicPr>
+            <p:cNvPr id="104" name="Picture 103">
+              <a:extLst>
+                <a:ext uri="{FF2B5EF4-FFF2-40B4-BE49-F238E27FC236}">
+                  <a16:creationId xmlns:a16="http://schemas.microsoft.com/office/drawing/2014/main" id="{8BD7B740-CD1D-47A3-9687-84C7CD3640D1}"/>
+                </a:ext>
+              </a:extLst>
+            </p:cNvPr>
+            <p:cNvPicPr>
+              <a:picLocks noChangeAspect="1"/>
+            </p:cNvPicPr>
+            <p:nvPr/>
+          </p:nvPicPr>
+          <p:blipFill>
+            <a:blip r:embed="rId22" cstate="print">
+              <a:extLst>
+                <a:ext uri="{28A0092B-C50C-407E-A947-70E740481C1C}">
+                  <a14:useLocalDpi xmlns:a14="http://schemas.microsoft.com/office/drawing/2010/main" val="0"/>
+                </a:ext>
+              </a:extLst>
+            </a:blip>
+            <a:stretch>
+              <a:fillRect/>
+            </a:stretch>
+          </p:blipFill>
+          <p:spPr>
+            <a:xfrm>
+              <a:off x="10242749" y="1603194"/>
+              <a:ext cx="1138926" cy="1108354"/>
+            </a:xfrm>
+            <a:prstGeom prst="rect">
+              <a:avLst/>
+            </a:prstGeom>
+          </p:spPr>
+        </p:pic>
+        <p:cxnSp>
+          <p:nvCxnSpPr>
+            <p:cNvPr id="105" name="Straight Arrow Connector 104">
+              <a:extLst>
+                <a:ext uri="{FF2B5EF4-FFF2-40B4-BE49-F238E27FC236}">
+                  <a16:creationId xmlns:a16="http://schemas.microsoft.com/office/drawing/2014/main" id="{D98B34C2-A8A6-47FC-8986-94077C2FD8ED}"/>
+                </a:ext>
+              </a:extLst>
+            </p:cNvPr>
+            <p:cNvCxnSpPr>
+              <a:cxnSpLocks/>
+              <a:stCxn id="103" idx="3"/>
+              <a:endCxn id="102" idx="1"/>
+            </p:cNvCxnSpPr>
+            <p:nvPr/>
+          </p:nvCxnSpPr>
+          <p:spPr bwMode="auto">
+            <a:xfrm>
+              <a:off x="7432797" y="2157371"/>
+              <a:ext cx="202103" cy="0"/>
+            </a:xfrm>
+            <a:prstGeom prst="straightConnector1">
+              <a:avLst/>
+            </a:prstGeom>
+            <a:solidFill>
+              <a:schemeClr val="accent1"/>
+            </a:solidFill>
+            <a:ln w="12700" cap="sq" cmpd="sng" algn="ctr">
+              <a:solidFill>
+                <a:schemeClr val="tx1"/>
+              </a:solidFill>
+              <a:prstDash val="solid"/>
+              <a:round/>
+              <a:headEnd type="none" w="sm" len="sm"/>
+              <a:tailEnd type="triangle"/>
+            </a:ln>
+            <a:effectLst/>
+          </p:spPr>
+        </p:cxnSp>
+        <p:cxnSp>
+          <p:nvCxnSpPr>
+            <p:cNvPr id="106" name="Straight Arrow Connector 105">
+              <a:extLst>
+                <a:ext uri="{FF2B5EF4-FFF2-40B4-BE49-F238E27FC236}">
+                  <a16:creationId xmlns:a16="http://schemas.microsoft.com/office/drawing/2014/main" id="{264B9B17-38A8-4951-9D48-528566893CF3}"/>
+                </a:ext>
+              </a:extLst>
+            </p:cNvPr>
+            <p:cNvCxnSpPr>
+              <a:cxnSpLocks/>
+              <a:stCxn id="102" idx="3"/>
+              <a:endCxn id="101" idx="1"/>
+            </p:cNvCxnSpPr>
+            <p:nvPr/>
+          </p:nvCxnSpPr>
+          <p:spPr bwMode="auto">
+            <a:xfrm>
+              <a:off x="8739150" y="2157371"/>
+              <a:ext cx="202103" cy="0"/>
+            </a:xfrm>
+            <a:prstGeom prst="straightConnector1">
+              <a:avLst/>
+            </a:prstGeom>
+            <a:solidFill>
+              <a:schemeClr val="accent1"/>
+            </a:solidFill>
+            <a:ln w="12700" cap="sq" cmpd="sng" algn="ctr">
+              <a:solidFill>
+                <a:schemeClr val="tx1"/>
+              </a:solidFill>
+              <a:prstDash val="solid"/>
+              <a:round/>
+              <a:headEnd type="none" w="sm" len="sm"/>
+              <a:tailEnd type="triangle"/>
+            </a:ln>
+            <a:effectLst/>
+          </p:spPr>
+        </p:cxnSp>
+        <p:cxnSp>
+          <p:nvCxnSpPr>
+            <p:cNvPr id="107" name="Straight Arrow Connector 106">
+              <a:extLst>
+                <a:ext uri="{FF2B5EF4-FFF2-40B4-BE49-F238E27FC236}">
+                  <a16:creationId xmlns:a16="http://schemas.microsoft.com/office/drawing/2014/main" id="{EF2911C4-971F-4929-B586-F58F0BE15814}"/>
+                </a:ext>
+              </a:extLst>
+            </p:cNvPr>
+            <p:cNvCxnSpPr>
+              <a:cxnSpLocks/>
+              <a:stCxn id="101" idx="3"/>
+              <a:endCxn id="104" idx="1"/>
+            </p:cNvCxnSpPr>
+            <p:nvPr/>
+          </p:nvCxnSpPr>
+          <p:spPr bwMode="auto">
+            <a:xfrm>
+              <a:off x="10040646" y="2157371"/>
+              <a:ext cx="202103" cy="0"/>
+            </a:xfrm>
+            <a:prstGeom prst="straightConnector1">
+              <a:avLst/>
+            </a:prstGeom>
+            <a:solidFill>
+              <a:schemeClr val="accent1"/>
+            </a:solidFill>
+            <a:ln w="12700" cap="sq" cmpd="sng" algn="ctr">
+              <a:solidFill>
+                <a:schemeClr val="tx1"/>
+              </a:solidFill>
+              <a:prstDash val="solid"/>
+              <a:round/>
+              <a:headEnd type="none" w="sm" len="sm"/>
+              <a:tailEnd type="triangle"/>
+            </a:ln>
+            <a:effectLst/>
+          </p:spPr>
+        </p:cxnSp>
+      </p:grpSp>
+      <p:sp>
+        <p:nvSpPr>
+          <p:cNvPr id="118" name="TextBox 117">
+            <a:extLst>
+              <a:ext uri="{FF2B5EF4-FFF2-40B4-BE49-F238E27FC236}">
+                <a16:creationId xmlns:a16="http://schemas.microsoft.com/office/drawing/2014/main" id="{C43BF9E5-8BE4-40D9-8129-F4426D40232D}"/>
+              </a:ext>
+            </a:extLst>
+          </p:cNvPr>
+          <p:cNvSpPr txBox="1"/>
+          <p:nvPr/>
+        </p:nvSpPr>
+        <p:spPr>
+          <a:xfrm>
+            <a:off x="11842088" y="15441758"/>
+            <a:ext cx="3616939" cy="369332"/>
+          </a:xfrm>
+          <a:prstGeom prst="rect">
+            <a:avLst/>
+          </a:prstGeom>
+          <a:noFill/>
+        </p:spPr>
+        <p:txBody>
+          <a:bodyPr wrap="square" rtlCol="0">
+            <a:spAutoFit/>
+          </a:bodyPr>
+          <a:lstStyle/>
+          <a:p>
+            <a:r>
+              <a:rPr lang="en-ZA" dirty="0"/>
+              <a:t>Normalization and cantering of digit</a:t>
+            </a:r>
+          </a:p>
+        </p:txBody>
+      </p:sp>
+      <p:sp>
+        <p:nvSpPr>
+          <p:cNvPr id="119" name="TextBox 118">
+            <a:extLst>
+              <a:ext uri="{FF2B5EF4-FFF2-40B4-BE49-F238E27FC236}">
+                <a16:creationId xmlns:a16="http://schemas.microsoft.com/office/drawing/2014/main" id="{DB769A84-F432-4FC1-851D-7DDA8A6E4803}"/>
+              </a:ext>
+            </a:extLst>
+          </p:cNvPr>
+          <p:cNvSpPr txBox="1"/>
+          <p:nvPr/>
+        </p:nvSpPr>
+        <p:spPr>
+          <a:xfrm>
+            <a:off x="16317643" y="18358078"/>
+            <a:ext cx="2313897" cy="369332"/>
+          </a:xfrm>
+          <a:prstGeom prst="rect">
+            <a:avLst/>
+          </a:prstGeom>
+          <a:noFill/>
+        </p:spPr>
+        <p:txBody>
+          <a:bodyPr wrap="square" rtlCol="0">
+            <a:spAutoFit/>
+          </a:bodyPr>
+          <a:lstStyle/>
+          <a:p>
+            <a:r>
+              <a:rPr lang="en-ZA" dirty="0"/>
+              <a:t>CNN </a:t>
+            </a:r>
+            <a:r>
+              <a:rPr lang="en-ZA" dirty="0" err="1"/>
+              <a:t>TensorFlow</a:t>
+            </a:r>
+            <a:r>
+              <a:rPr lang="en-ZA" dirty="0"/>
+              <a:t> setup</a:t>
+            </a:r>
+          </a:p>
+        </p:txBody>
+      </p:sp>
+      <p:pic>
+        <p:nvPicPr>
+          <p:cNvPr id="27" name="Picture 26">
+            <a:extLst>
+              <a:ext uri="{FF2B5EF4-FFF2-40B4-BE49-F238E27FC236}">
+                <a16:creationId xmlns:a16="http://schemas.microsoft.com/office/drawing/2014/main" id="{1C60C12E-097E-44F8-97DF-221C1C23705E}"/>
+              </a:ext>
+            </a:extLst>
+          </p:cNvPr>
+          <p:cNvPicPr>
+            <a:picLocks noChangeAspect="1"/>
+          </p:cNvPicPr>
+          <p:nvPr/>
+        </p:nvPicPr>
+        <p:blipFill>
+          <a:blip r:embed="rId23">
+            <a:extLst>
+              <a:ext uri="{28A0092B-C50C-407E-A947-70E740481C1C}">
+                <a14:useLocalDpi xmlns:a14="http://schemas.microsoft.com/office/drawing/2010/main" val="0"/>
+              </a:ext>
+            </a:extLst>
+          </a:blip>
+          <a:stretch>
+            <a:fillRect/>
+          </a:stretch>
+        </p:blipFill>
+        <p:spPr>
+          <a:xfrm>
+            <a:off x="16543773" y="13558945"/>
+            <a:ext cx="2133923" cy="4836569"/>
+          </a:xfrm>
+          <a:prstGeom prst="rect">
+            <a:avLst/>
+          </a:prstGeom>
+        </p:spPr>
+      </p:pic>
+      <p:sp>
+        <p:nvSpPr>
+          <p:cNvPr id="134" name="TextBox 133">
+            <a:extLst>
+              <a:ext uri="{FF2B5EF4-FFF2-40B4-BE49-F238E27FC236}">
+                <a16:creationId xmlns:a16="http://schemas.microsoft.com/office/drawing/2014/main" id="{932C80AB-3FC1-4144-B0E3-88BE4318DD55}"/>
+              </a:ext>
+            </a:extLst>
+          </p:cNvPr>
+          <p:cNvSpPr txBox="1"/>
+          <p:nvPr/>
+        </p:nvSpPr>
+        <p:spPr>
+          <a:xfrm>
+            <a:off x="11150978" y="13695265"/>
+            <a:ext cx="5302820" cy="923330"/>
+          </a:xfrm>
+          <a:prstGeom prst="rect">
+            <a:avLst/>
+          </a:prstGeom>
+          <a:noFill/>
+        </p:spPr>
+        <p:txBody>
+          <a:bodyPr wrap="square" rtlCol="0">
+            <a:spAutoFit/>
+          </a:bodyPr>
+          <a:lstStyle/>
+          <a:p>
+            <a:r>
+              <a:rPr lang="en-ZA" dirty="0"/>
+              <a:t>To allow for a neural network to classify the digit a custom segmentation algorithm is first used to normalize and centre the digit.</a:t>
+            </a:r>
+          </a:p>
+        </p:txBody>
+      </p:sp>
+      <p:pic>
+        <p:nvPicPr>
+          <p:cNvPr id="145" name="Picture 2" descr="http://parse.ele.tue.nl/cluster/2/CNNArchitecture.jpg">
+            <a:extLst>
+              <a:ext uri="{FF2B5EF4-FFF2-40B4-BE49-F238E27FC236}">
+                <a16:creationId xmlns:a16="http://schemas.microsoft.com/office/drawing/2014/main" id="{D5ECA42D-920A-4F1E-8A44-FE1F6F0B74B9}"/>
+              </a:ext>
+            </a:extLst>
+          </p:cNvPr>
+          <p:cNvPicPr>
+            <a:picLocks noChangeAspect="1" noChangeArrowheads="1"/>
+          </p:cNvPicPr>
+          <p:nvPr/>
+        </p:nvPicPr>
+        <p:blipFill rotWithShape="1">
+          <a:blip r:embed="rId24">
+            <a:extLst>
+              <a:ext uri="{28A0092B-C50C-407E-A947-70E740481C1C}">
+                <a14:useLocalDpi xmlns:a14="http://schemas.microsoft.com/office/drawing/2010/main" val="0"/>
+              </a:ext>
+            </a:extLst>
+          </a:blip>
+          <a:srcRect t="25243"/>
+          <a:stretch/>
+        </p:blipFill>
+        <p:spPr bwMode="auto">
+          <a:xfrm>
+            <a:off x="11725976" y="17279493"/>
+            <a:ext cx="3760687" cy="1087846"/>
+          </a:xfrm>
+          <a:prstGeom prst="rect">
+            <a:avLst/>
+          </a:prstGeom>
+          <a:noFill/>
+          <a:extLst>
+            <a:ext uri="{909E8E84-426E-40DD-AFC4-6F175D3DCCD1}">
+              <a14:hiddenFill xmlns:a14="http://schemas.microsoft.com/office/drawing/2010/main">
+                <a:solidFill>
+                  <a:srgbClr val="FFFFFF"/>
+                </a:solidFill>
+              </a14:hiddenFill>
+            </a:ext>
+          </a:extLst>
+        </p:spPr>
+      </p:pic>
+      <p:sp>
+        <p:nvSpPr>
+          <p:cNvPr id="146" name="TextBox 145">
+            <a:extLst>
+              <a:ext uri="{FF2B5EF4-FFF2-40B4-BE49-F238E27FC236}">
+                <a16:creationId xmlns:a16="http://schemas.microsoft.com/office/drawing/2014/main" id="{80B03DF9-95D0-49B5-AF0D-591EA8268EB6}"/>
+              </a:ext>
+            </a:extLst>
+          </p:cNvPr>
+          <p:cNvSpPr txBox="1"/>
+          <p:nvPr/>
+        </p:nvSpPr>
+        <p:spPr>
+          <a:xfrm>
+            <a:off x="11014823" y="16210463"/>
+            <a:ext cx="5302820" cy="923330"/>
+          </a:xfrm>
+          <a:prstGeom prst="rect">
+            <a:avLst/>
+          </a:prstGeom>
+          <a:noFill/>
+        </p:spPr>
+        <p:txBody>
+          <a:bodyPr wrap="square" rtlCol="0">
+            <a:spAutoFit/>
+          </a:bodyPr>
+          <a:lstStyle/>
+          <a:p>
+            <a:r>
+              <a:rPr lang="en-ZA" dirty="0"/>
+              <a:t>A Convolution Neural Network(CNN) is then used to process this clean input to estimate the probability of each digit being present in the image.</a:t>
+            </a:r>
+          </a:p>
+        </p:txBody>
+      </p:sp>
+      <p:sp>
+        <p:nvSpPr>
+          <p:cNvPr id="147" name="TextBox 146">
+            <a:extLst>
+              <a:ext uri="{FF2B5EF4-FFF2-40B4-BE49-F238E27FC236}">
+                <a16:creationId xmlns:a16="http://schemas.microsoft.com/office/drawing/2014/main" id="{EF0C8D08-E678-4929-8D93-F83ECA939623}"/>
+              </a:ext>
+            </a:extLst>
+          </p:cNvPr>
+          <p:cNvSpPr txBox="1"/>
+          <p:nvPr/>
+        </p:nvSpPr>
+        <p:spPr>
+          <a:xfrm>
+            <a:off x="12697732" y="18313655"/>
+            <a:ext cx="1840816" cy="369332"/>
+          </a:xfrm>
+          <a:prstGeom prst="rect">
+            <a:avLst/>
+          </a:prstGeom>
+          <a:noFill/>
+        </p:spPr>
+        <p:txBody>
+          <a:bodyPr wrap="square" rtlCol="0">
+            <a:spAutoFit/>
+          </a:bodyPr>
+          <a:lstStyle/>
+          <a:p>
+            <a:r>
+              <a:rPr lang="en-ZA" dirty="0"/>
+              <a:t>CNN visual setup</a:t>
+            </a:r>
+          </a:p>
+        </p:txBody>
+      </p:sp>
     </p:spTree>
     <p:extLst>
       <p:ext uri="{BB962C8B-B14F-4D97-AF65-F5344CB8AC3E}">
@@ -6933,6 +7924,288 @@
   <p:clrMapOvr>
     <a:masterClrMapping/>
   </p:clrMapOvr>
+  <p:timing>
+    <p:tnLst>
+      <p:par>
+        <p:cTn id="1" dur="indefinite" restart="never" nodeType="tmRoot">
+          <p:childTnLst>
+            <p:seq concurrent="1" nextAc="seek">
+              <p:cTn id="2" dur="indefinite" nodeType="mainSeq">
+                <p:childTnLst>
+                  <p:par>
+                    <p:cTn id="3" fill="hold">
+                      <p:stCondLst>
+                        <p:cond delay="indefinite"/>
+                      </p:stCondLst>
+                      <p:childTnLst>
+                        <p:par>
+                          <p:cTn id="4" fill="hold">
+                            <p:stCondLst>
+                              <p:cond delay="0"/>
+                            </p:stCondLst>
+                            <p:childTnLst>
+                              <p:par>
+                                <p:cTn id="5" presetID="1" presetClass="entr" presetSubtype="0" fill="hold" nodeType="clickEffect">
+                                  <p:stCondLst>
+                                    <p:cond delay="0"/>
+                                  </p:stCondLst>
+                                  <p:childTnLst>
+                                    <p:set>
+                                      <p:cBhvr>
+                                        <p:cTn id="6" dur="1" fill="hold">
+                                          <p:stCondLst>
+                                            <p:cond delay="0"/>
+                                          </p:stCondLst>
+                                        </p:cTn>
+                                        <p:tgtEl>
+                                          <p:spTgt spid="72"/>
+                                        </p:tgtEl>
+                                        <p:attrNameLst>
+                                          <p:attrName>style.visibility</p:attrName>
+                                        </p:attrNameLst>
+                                      </p:cBhvr>
+                                      <p:to>
+                                        <p:strVal val="visible"/>
+                                      </p:to>
+                                    </p:set>
+                                  </p:childTnLst>
+                                </p:cTn>
+                              </p:par>
+                            </p:childTnLst>
+                          </p:cTn>
+                        </p:par>
+                      </p:childTnLst>
+                    </p:cTn>
+                  </p:par>
+                  <p:par>
+                    <p:cTn id="7" fill="hold">
+                      <p:stCondLst>
+                        <p:cond delay="indefinite"/>
+                      </p:stCondLst>
+                      <p:childTnLst>
+                        <p:par>
+                          <p:cTn id="8" fill="hold">
+                            <p:stCondLst>
+                              <p:cond delay="0"/>
+                            </p:stCondLst>
+                            <p:childTnLst>
+                              <p:par>
+                                <p:cTn id="9" presetID="1" presetClass="entr" presetSubtype="0" fill="hold" nodeType="clickEffect">
+                                  <p:stCondLst>
+                                    <p:cond delay="0"/>
+                                  </p:stCondLst>
+                                  <p:childTnLst>
+                                    <p:set>
+                                      <p:cBhvr>
+                                        <p:cTn id="10" dur="1" fill="hold">
+                                          <p:stCondLst>
+                                            <p:cond delay="0"/>
+                                          </p:stCondLst>
+                                        </p:cTn>
+                                        <p:tgtEl>
+                                          <p:spTgt spid="74"/>
+                                        </p:tgtEl>
+                                        <p:attrNameLst>
+                                          <p:attrName>style.visibility</p:attrName>
+                                        </p:attrNameLst>
+                                      </p:cBhvr>
+                                      <p:to>
+                                        <p:strVal val="visible"/>
+                                      </p:to>
+                                    </p:set>
+                                  </p:childTnLst>
+                                </p:cTn>
+                              </p:par>
+                            </p:childTnLst>
+                          </p:cTn>
+                        </p:par>
+                      </p:childTnLst>
+                    </p:cTn>
+                  </p:par>
+                  <p:par>
+                    <p:cTn id="11" fill="hold">
+                      <p:stCondLst>
+                        <p:cond delay="indefinite"/>
+                      </p:stCondLst>
+                      <p:childTnLst>
+                        <p:par>
+                          <p:cTn id="12" fill="hold">
+                            <p:stCondLst>
+                              <p:cond delay="0"/>
+                            </p:stCondLst>
+                            <p:childTnLst>
+                              <p:par>
+                                <p:cTn id="13" presetID="1" presetClass="entr" presetSubtype="0" fill="hold" nodeType="clickEffect">
+                                  <p:stCondLst>
+                                    <p:cond delay="0"/>
+                                  </p:stCondLst>
+                                  <p:childTnLst>
+                                    <p:set>
+                                      <p:cBhvr>
+                                        <p:cTn id="14" dur="1" fill="hold">
+                                          <p:stCondLst>
+                                            <p:cond delay="0"/>
+                                          </p:stCondLst>
+                                        </p:cTn>
+                                        <p:tgtEl>
+                                          <p:spTgt spid="75"/>
+                                        </p:tgtEl>
+                                        <p:attrNameLst>
+                                          <p:attrName>style.visibility</p:attrName>
+                                        </p:attrNameLst>
+                                      </p:cBhvr>
+                                      <p:to>
+                                        <p:strVal val="visible"/>
+                                      </p:to>
+                                    </p:set>
+                                  </p:childTnLst>
+                                </p:cTn>
+                              </p:par>
+                            </p:childTnLst>
+                          </p:cTn>
+                        </p:par>
+                      </p:childTnLst>
+                    </p:cTn>
+                  </p:par>
+                  <p:par>
+                    <p:cTn id="15" fill="hold">
+                      <p:stCondLst>
+                        <p:cond delay="indefinite"/>
+                      </p:stCondLst>
+                      <p:childTnLst>
+                        <p:par>
+                          <p:cTn id="16" fill="hold">
+                            <p:stCondLst>
+                              <p:cond delay="0"/>
+                            </p:stCondLst>
+                            <p:childTnLst>
+                              <p:par>
+                                <p:cTn id="17" presetID="1" presetClass="entr" presetSubtype="0" fill="hold" nodeType="clickEffect">
+                                  <p:stCondLst>
+                                    <p:cond delay="0"/>
+                                  </p:stCondLst>
+                                  <p:childTnLst>
+                                    <p:set>
+                                      <p:cBhvr>
+                                        <p:cTn id="18" dur="1" fill="hold">
+                                          <p:stCondLst>
+                                            <p:cond delay="0"/>
+                                          </p:stCondLst>
+                                        </p:cTn>
+                                        <p:tgtEl>
+                                          <p:spTgt spid="80"/>
+                                        </p:tgtEl>
+                                        <p:attrNameLst>
+                                          <p:attrName>style.visibility</p:attrName>
+                                        </p:attrNameLst>
+                                      </p:cBhvr>
+                                      <p:to>
+                                        <p:strVal val="visible"/>
+                                      </p:to>
+                                    </p:set>
+                                  </p:childTnLst>
+                                </p:cTn>
+                              </p:par>
+                            </p:childTnLst>
+                          </p:cTn>
+                        </p:par>
+                      </p:childTnLst>
+                    </p:cTn>
+                  </p:par>
+                  <p:par>
+                    <p:cTn id="19" fill="hold">
+                      <p:stCondLst>
+                        <p:cond delay="indefinite"/>
+                      </p:stCondLst>
+                      <p:childTnLst>
+                        <p:par>
+                          <p:cTn id="20" fill="hold">
+                            <p:stCondLst>
+                              <p:cond delay="0"/>
+                            </p:stCondLst>
+                            <p:childTnLst>
+                              <p:par>
+                                <p:cTn id="21" presetID="1" presetClass="entr" presetSubtype="0" fill="hold" nodeType="clickEffect">
+                                  <p:stCondLst>
+                                    <p:cond delay="0"/>
+                                  </p:stCondLst>
+                                  <p:childTnLst>
+                                    <p:set>
+                                      <p:cBhvr>
+                                        <p:cTn id="22" dur="1" fill="hold">
+                                          <p:stCondLst>
+                                            <p:cond delay="0"/>
+                                          </p:stCondLst>
+                                        </p:cTn>
+                                        <p:tgtEl>
+                                          <p:spTgt spid="86"/>
+                                        </p:tgtEl>
+                                        <p:attrNameLst>
+                                          <p:attrName>style.visibility</p:attrName>
+                                        </p:attrNameLst>
+                                      </p:cBhvr>
+                                      <p:to>
+                                        <p:strVal val="visible"/>
+                                      </p:to>
+                                    </p:set>
+                                  </p:childTnLst>
+                                </p:cTn>
+                              </p:par>
+                              <p:par>
+                                <p:cTn id="23" presetID="1" presetClass="entr" presetSubtype="0" fill="hold" nodeType="withEffect">
+                                  <p:stCondLst>
+                                    <p:cond delay="0"/>
+                                  </p:stCondLst>
+                                  <p:childTnLst>
+                                    <p:set>
+                                      <p:cBhvr>
+                                        <p:cTn id="24" dur="1" fill="hold">
+                                          <p:stCondLst>
+                                            <p:cond delay="0"/>
+                                          </p:stCondLst>
+                                        </p:cTn>
+                                        <p:tgtEl>
+                                          <p:spTgt spid="145"/>
+                                        </p:tgtEl>
+                                        <p:attrNameLst>
+                                          <p:attrName>style.visibility</p:attrName>
+                                        </p:attrNameLst>
+                                      </p:cBhvr>
+                                      <p:to>
+                                        <p:strVal val="visible"/>
+                                      </p:to>
+                                    </p:set>
+                                  </p:childTnLst>
+                                </p:cTn>
+                              </p:par>
+                            </p:childTnLst>
+                          </p:cTn>
+                        </p:par>
+                      </p:childTnLst>
+                    </p:cTn>
+                  </p:par>
+                </p:childTnLst>
+              </p:cTn>
+              <p:prevCondLst>
+                <p:cond evt="onPrev" delay="0">
+                  <p:tgtEl>
+                    <p:sldTgt/>
+                  </p:tgtEl>
+                </p:cond>
+              </p:prevCondLst>
+              <p:nextCondLst>
+                <p:cond evt="onNext" delay="0">
+                  <p:tgtEl>
+                    <p:sldTgt/>
+                  </p:tgtEl>
+                </p:cond>
+              </p:nextCondLst>
+            </p:seq>
+          </p:childTnLst>
+        </p:cTn>
+      </p:par>
+    </p:tnLst>
+  </p:timing>
 </p:sld>
 </file>
 

</xml_diff>

<commit_message>
Hopefully final version up.
</commit_message>
<xml_diff>
--- a/Poster/Poster.pptx
+++ b/Poster/Poster.pptx
@@ -110,12 +110,12 @@
   <p:extLst>
     <p:ext uri="{EFAFB233-063F-42B5-8137-9DF3F51BA10A}">
       <p15:sldGuideLst xmlns:p15="http://schemas.microsoft.com/office/powerpoint/2012/main">
-        <p15:guide id="1" orient="horz" pos="8345" userDrawn="1">
+        <p15:guide id="1" orient="horz" pos="11271" userDrawn="1">
           <p15:clr>
             <a:srgbClr val="A4A3A4"/>
           </p15:clr>
         </p15:guide>
-        <p15:guide id="2" pos="18607" userDrawn="1">
+        <p15:guide id="2" pos="18698" userDrawn="1">
           <p15:clr>
             <a:srgbClr val="A4A3A4"/>
           </p15:clr>
@@ -212,7 +212,7 @@
           <a:p>
             <a:fld id="{B86BC033-6438-4B0A-82FC-802490CCF637}" type="datetimeFigureOut">
               <a:rPr lang="en-ZA" smtClean="0"/>
-              <a:t>2017-11-11</a:t>
+              <a:t>2017-11-12</a:t>
             </a:fld>
             <a:endParaRPr lang="en-ZA"/>
           </a:p>
@@ -695,7 +695,7 @@
           <a:p>
             <a:fld id="{51832D96-9D06-475B-8F7A-8034629CEECD}" type="datetimeFigureOut">
               <a:rPr lang="en-ZA" smtClean="0"/>
-              <a:t>2017-11-11</a:t>
+              <a:t>2017-11-12</a:t>
             </a:fld>
             <a:endParaRPr lang="en-ZA"/>
           </a:p>
@@ -865,7 +865,7 @@
           <a:p>
             <a:fld id="{51832D96-9D06-475B-8F7A-8034629CEECD}" type="datetimeFigureOut">
               <a:rPr lang="en-ZA" smtClean="0"/>
-              <a:t>2017-11-11</a:t>
+              <a:t>2017-11-12</a:t>
             </a:fld>
             <a:endParaRPr lang="en-ZA"/>
           </a:p>
@@ -1045,7 +1045,7 @@
           <a:p>
             <a:fld id="{51832D96-9D06-475B-8F7A-8034629CEECD}" type="datetimeFigureOut">
               <a:rPr lang="en-ZA" smtClean="0"/>
-              <a:t>2017-11-11</a:t>
+              <a:t>2017-11-12</a:t>
             </a:fld>
             <a:endParaRPr lang="en-ZA"/>
           </a:p>
@@ -1215,7 +1215,7 @@
           <a:p>
             <a:fld id="{51832D96-9D06-475B-8F7A-8034629CEECD}" type="datetimeFigureOut">
               <a:rPr lang="en-ZA" smtClean="0"/>
-              <a:t>2017-11-11</a:t>
+              <a:t>2017-11-12</a:t>
             </a:fld>
             <a:endParaRPr lang="en-ZA"/>
           </a:p>
@@ -1459,7 +1459,7 @@
           <a:p>
             <a:fld id="{51832D96-9D06-475B-8F7A-8034629CEECD}" type="datetimeFigureOut">
               <a:rPr lang="en-ZA" smtClean="0"/>
-              <a:t>2017-11-11</a:t>
+              <a:t>2017-11-12</a:t>
             </a:fld>
             <a:endParaRPr lang="en-ZA"/>
           </a:p>
@@ -1691,7 +1691,7 @@
           <a:p>
             <a:fld id="{51832D96-9D06-475B-8F7A-8034629CEECD}" type="datetimeFigureOut">
               <a:rPr lang="en-ZA" smtClean="0"/>
-              <a:t>2017-11-11</a:t>
+              <a:t>2017-11-12</a:t>
             </a:fld>
             <a:endParaRPr lang="en-ZA"/>
           </a:p>
@@ -2058,7 +2058,7 @@
           <a:p>
             <a:fld id="{51832D96-9D06-475B-8F7A-8034629CEECD}" type="datetimeFigureOut">
               <a:rPr lang="en-ZA" smtClean="0"/>
-              <a:t>2017-11-11</a:t>
+              <a:t>2017-11-12</a:t>
             </a:fld>
             <a:endParaRPr lang="en-ZA"/>
           </a:p>
@@ -2176,7 +2176,7 @@
           <a:p>
             <a:fld id="{51832D96-9D06-475B-8F7A-8034629CEECD}" type="datetimeFigureOut">
               <a:rPr lang="en-ZA" smtClean="0"/>
-              <a:t>2017-11-11</a:t>
+              <a:t>2017-11-12</a:t>
             </a:fld>
             <a:endParaRPr lang="en-ZA"/>
           </a:p>
@@ -2271,7 +2271,7 @@
           <a:p>
             <a:fld id="{51832D96-9D06-475B-8F7A-8034629CEECD}" type="datetimeFigureOut">
               <a:rPr lang="en-ZA" smtClean="0"/>
-              <a:t>2017-11-11</a:t>
+              <a:t>2017-11-12</a:t>
             </a:fld>
             <a:endParaRPr lang="en-ZA"/>
           </a:p>
@@ -2548,7 +2548,7 @@
           <a:p>
             <a:fld id="{51832D96-9D06-475B-8F7A-8034629CEECD}" type="datetimeFigureOut">
               <a:rPr lang="en-ZA" smtClean="0"/>
-              <a:t>2017-11-11</a:t>
+              <a:t>2017-11-12</a:t>
             </a:fld>
             <a:endParaRPr lang="en-ZA"/>
           </a:p>
@@ -2805,7 +2805,7 @@
           <a:p>
             <a:fld id="{51832D96-9D06-475B-8F7A-8034629CEECD}" type="datetimeFigureOut">
               <a:rPr lang="en-ZA" smtClean="0"/>
-              <a:t>2017-11-11</a:t>
+              <a:t>2017-11-12</a:t>
             </a:fld>
             <a:endParaRPr lang="en-ZA"/>
           </a:p>
@@ -3018,7 +3018,7 @@
           <a:p>
             <a:fld id="{51832D96-9D06-475B-8F7A-8034629CEECD}" type="datetimeFigureOut">
               <a:rPr lang="en-ZA" smtClean="0"/>
-              <a:t>2017-11-11</a:t>
+              <a:t>2017-11-12</a:t>
             </a:fld>
             <a:endParaRPr lang="en-ZA"/>
           </a:p>
@@ -3437,8 +3437,8 @@
         </p:nvSpPr>
         <p:spPr>
           <a:xfrm>
-            <a:off x="607194" y="7365401"/>
-            <a:ext cx="8688982" cy="4373672"/>
+            <a:off x="607194" y="7365400"/>
+            <a:ext cx="8688982" cy="5434034"/>
           </a:xfrm>
           <a:prstGeom prst="roundRect">
             <a:avLst/>
@@ -3489,8 +3489,8 @@
         </p:nvSpPr>
         <p:spPr>
           <a:xfrm>
-            <a:off x="607193" y="11997239"/>
-            <a:ext cx="8688982" cy="6925554"/>
+            <a:off x="607193" y="13086321"/>
+            <a:ext cx="8688982" cy="7792478"/>
           </a:xfrm>
           <a:prstGeom prst="roundRect">
             <a:avLst/>
@@ -3541,8 +3541,8 @@
         </p:nvSpPr>
         <p:spPr>
           <a:xfrm>
-            <a:off x="10504174" y="12000471"/>
-            <a:ext cx="9021230" cy="6922096"/>
+            <a:off x="10591259" y="13086321"/>
+            <a:ext cx="9021230" cy="7792478"/>
           </a:xfrm>
           <a:prstGeom prst="roundRect">
             <a:avLst/>
@@ -3593,7 +3593,7 @@
         </p:nvSpPr>
         <p:spPr>
           <a:xfrm>
-            <a:off x="20880174" y="12917379"/>
+            <a:off x="21010803" y="14834664"/>
             <a:ext cx="8672726" cy="6043288"/>
           </a:xfrm>
           <a:prstGeom prst="roundRect">
@@ -3645,7 +3645,7 @@
         </p:nvSpPr>
         <p:spPr>
           <a:xfrm>
-            <a:off x="20850079" y="8331730"/>
+            <a:off x="20980708" y="10234501"/>
             <a:ext cx="8688534" cy="4321089"/>
           </a:xfrm>
           <a:prstGeom prst="roundRect">
@@ -3694,8 +3694,8 @@
         </p:nvSpPr>
         <p:spPr>
           <a:xfrm>
-            <a:off x="20853291" y="2835821"/>
-            <a:ext cx="8688982" cy="5230443"/>
+            <a:off x="20983920" y="2835822"/>
+            <a:ext cx="8688982" cy="7114655"/>
           </a:xfrm>
           <a:prstGeom prst="roundRect">
             <a:avLst/>
@@ -3743,8 +3743,8 @@
         </p:nvSpPr>
         <p:spPr>
           <a:xfrm>
-            <a:off x="10547717" y="2851432"/>
-            <a:ext cx="9021230" cy="8884271"/>
+            <a:off x="10591260" y="2851432"/>
+            <a:ext cx="9021230" cy="9950865"/>
           </a:xfrm>
           <a:prstGeom prst="roundRect">
             <a:avLst/>
@@ -3775,72 +3775,6 @@
           <a:p>
             <a:pPr algn="ctr"/>
             <a:endParaRPr lang="en-ZA" dirty="0"/>
-          </a:p>
-        </p:txBody>
-      </p:sp>
-      <p:sp>
-        <p:nvSpPr>
-          <p:cNvPr id="82" name="Rectangle 1252">
-            <a:extLst>
-              <a:ext uri="{FF2B5EF4-FFF2-40B4-BE49-F238E27FC236}">
-                <a16:creationId xmlns:a16="http://schemas.microsoft.com/office/drawing/2014/main" id="{6B767C4F-373C-4762-A861-258A712383AB}"/>
-              </a:ext>
-            </a:extLst>
-          </p:cNvPr>
-          <p:cNvSpPr>
-            <a:spLocks noChangeArrowheads="1"/>
-          </p:cNvSpPr>
-          <p:nvPr/>
-        </p:nvSpPr>
-        <p:spPr bwMode="auto">
-          <a:xfrm>
-            <a:off x="-1" y="19313954"/>
-            <a:ext cx="30275213" cy="2152799"/>
-          </a:xfrm>
-          <a:prstGeom prst="rect">
-            <a:avLst/>
-          </a:prstGeom>
-          <a:gradFill rotWithShape="1">
-            <a:gsLst>
-              <a:gs pos="0">
-                <a:srgbClr val="9AB1C0"/>
-              </a:gs>
-              <a:gs pos="50000">
-                <a:schemeClr val="bg1"/>
-              </a:gs>
-              <a:gs pos="100000">
-                <a:srgbClr val="9AB1C0"/>
-              </a:gs>
-            </a:gsLst>
-            <a:lin ang="5400000" scaled="1"/>
-          </a:gradFill>
-          <a:ln w="38100" algn="ctr">
-            <a:noFill/>
-            <a:miter lim="800000"/>
-            <a:headEnd/>
-            <a:tailEnd/>
-          </a:ln>
-          <a:effectLst/>
-        </p:spPr>
-        <p:txBody>
-          <a:bodyPr wrap="square" lIns="89182" tIns="44593" rIns="89182" bIns="44593" anchor="ctr">
-            <a:spAutoFit/>
-          </a:bodyPr>
-          <a:lstStyle/>
-          <a:p>
-            <a:pPr eaLnBrk="0" hangingPunct="0">
-              <a:lnSpc>
-                <a:spcPct val="75000"/>
-              </a:lnSpc>
-              <a:spcBef>
-                <a:spcPct val="25000"/>
-              </a:spcBef>
-              <a:spcAft>
-                <a:spcPct val="25000"/>
-              </a:spcAft>
-              <a:defRPr/>
-            </a:pPr>
-            <a:endParaRPr lang="en-US" dirty="0"/>
           </a:p>
         </p:txBody>
       </p:sp>
@@ -3910,8 +3844,8 @@
         </p:nvGrpSpPr>
         <p:grpSpPr>
           <a:xfrm>
-            <a:off x="1795655" y="15848559"/>
-            <a:ext cx="6424501" cy="2809501"/>
+            <a:off x="711200" y="16847634"/>
+            <a:ext cx="8650514" cy="3628354"/>
             <a:chOff x="15483548" y="3261832"/>
             <a:chExt cx="11437906" cy="4529251"/>
           </a:xfrm>
@@ -4691,7 +4625,7 @@
             <p:nvPr/>
           </p:nvPicPr>
           <p:blipFill rotWithShape="1">
-            <a:blip r:embed="rId4" cstate="print">
+            <a:blip r:embed="rId4" cstate="hqprint">
               <a:extLst>
                 <a:ext uri="{28A0092B-C50C-407E-A947-70E740481C1C}">
                   <a14:useLocalDpi xmlns:a14="http://schemas.microsoft.com/office/drawing/2010/main" val="0"/>
@@ -5310,7 +5244,7 @@
                 <a:latin typeface="Arial" panose="020B0604020202020204" pitchFamily="34" charset="0"/>
                 <a:cs typeface="Arial" panose="020B0604020202020204" pitchFamily="34" charset="0"/>
               </a:rPr>
-              <a:t>In recent years the Applied Mathematics department of Stellenbosch notice a drop in teaching assistant’s accuracy in grading tutorial tests. The department thus decided to automate the process of grading these tests. There is a need for Optical Marker Recognition (OMR) software to grade tests written on a special template automatically. This reduces the time to mark tutorial tests, while still allowing for a high accuracy in grading tests.</a:t>
+              <a:t>In recent years the Applied Mathematics department of Stellenbosch noticed a drop in teaching assistant’s accuracy in grading tutorial tests. The department thus decided to automate the process of grading these tests. There is a need for Optical Marker Recognition (OMR) software to grade tests written on a special template automatically. This reduces the time to mark tutorial tests, while still allowing for a high accuracy in grading tests.</a:t>
             </a:r>
           </a:p>
           <a:p>
@@ -5337,7 +5271,7 @@
         </p:nvGrpSpPr>
         <p:grpSpPr bwMode="auto">
           <a:xfrm>
-            <a:off x="1019773" y="12657009"/>
+            <a:off x="1019773" y="13651239"/>
             <a:ext cx="7963814" cy="1001570"/>
             <a:chOff x="1651" y="20930"/>
             <a:chExt cx="8128" cy="524"/>
@@ -5507,7 +5441,7 @@
         <p:spPr>
           <a:xfrm>
             <a:off x="989686" y="9105481"/>
-            <a:ext cx="4772115" cy="2092881"/>
+            <a:ext cx="3415528" cy="2831544"/>
           </a:xfrm>
           <a:prstGeom prst="rect">
             <a:avLst/>
@@ -5551,7 +5485,7 @@
         </p:nvSpPr>
         <p:spPr>
           <a:xfrm>
-            <a:off x="1057140" y="13906895"/>
+            <a:off x="1057140" y="14973695"/>
             <a:ext cx="7926447" cy="1815882"/>
           </a:xfrm>
           <a:prstGeom prst="rect">
@@ -5570,7 +5504,7 @@
                 <a:latin typeface="Arial" panose="020B0604020202020204" pitchFamily="34" charset="0"/>
                 <a:cs typeface="Arial" panose="020B0604020202020204" pitchFamily="34" charset="0"/>
               </a:rPr>
-              <a:t>Initially, image processing is done on the image and produces character and bubble evidence, as is shown in the image below. The bubble evidence contains a classification for each bubble on the template. The bubble can be open, crossed-out, partially filled-in or completely filled-in. The character evidence, in the form of a 28 by 28 array is then process by a Convolutional Neural Network (CNN) to classify the digit in the image. Lastly, two probabilistically graphical models are used to estimate the most likely answers written on the page.  </a:t>
+              <a:t>Initially, image processing is done on the image and produces character and bubble evidence, as is shown in the image below. The bubble evidence contains a classification for each bubble on the template. The bubble can be open, crossed-out, partially filled-in or completely filled-in. The character evidence, in the form of a 28 by 28 array is then processed by a Convolutional Neural Network (CNN) to classify the digit in the image. Lastly, two probabilistically graphical models are used to estimate the most likely answers written on the page.  </a:t>
             </a:r>
           </a:p>
         </p:txBody>
@@ -5919,7 +5853,7 @@
         </p:nvGrpSpPr>
         <p:grpSpPr bwMode="auto">
           <a:xfrm>
-            <a:off x="11081407" y="3469356"/>
+            <a:off x="11124950" y="3469356"/>
             <a:ext cx="7963814" cy="1001572"/>
             <a:chOff x="1592" y="20977"/>
             <a:chExt cx="8128" cy="524"/>
@@ -6076,7 +6010,7 @@
         </p:nvGrpSpPr>
         <p:grpSpPr bwMode="auto">
           <a:xfrm>
-            <a:off x="21282183" y="3484349"/>
+            <a:off x="21412812" y="3474824"/>
             <a:ext cx="7963814" cy="1001571"/>
             <a:chOff x="1651" y="20930"/>
             <a:chExt cx="8128" cy="524"/>
@@ -6247,7 +6181,7 @@
         </p:nvGrpSpPr>
         <p:grpSpPr bwMode="auto">
           <a:xfrm>
-            <a:off x="21279533" y="8771095"/>
+            <a:off x="21410162" y="10673866"/>
             <a:ext cx="7963814" cy="1001571"/>
             <a:chOff x="1651" y="20930"/>
             <a:chExt cx="8128" cy="524"/>
@@ -6404,7 +6338,7 @@
         </p:nvGrpSpPr>
         <p:grpSpPr bwMode="auto">
           <a:xfrm>
-            <a:off x="21264021" y="13457831"/>
+            <a:off x="21394650" y="15375116"/>
             <a:ext cx="7963814" cy="1001571"/>
             <a:chOff x="1651" y="20930"/>
             <a:chExt cx="8128" cy="524"/>
@@ -6568,7 +6502,7 @@
         </p:nvGrpSpPr>
         <p:grpSpPr bwMode="auto">
           <a:xfrm>
-            <a:off x="11080221" y="12551409"/>
+            <a:off x="11123764" y="13637259"/>
             <a:ext cx="7963814" cy="1001571"/>
             <a:chOff x="1651" y="20930"/>
             <a:chExt cx="8128" cy="524"/>
@@ -6723,8 +6657,8 @@
         </p:nvSpPr>
         <p:spPr>
           <a:xfrm>
-            <a:off x="11083975" y="4724716"/>
-            <a:ext cx="5302820" cy="5016758"/>
+            <a:off x="11127518" y="4724716"/>
+            <a:ext cx="5028755" cy="5755422"/>
           </a:xfrm>
           <a:prstGeom prst="rect">
             <a:avLst/>
@@ -6742,8 +6676,20 @@
                 <a:latin typeface="Arial" panose="020B0604020202020204" pitchFamily="34" charset="0"/>
                 <a:cs typeface="Arial" panose="020B0604020202020204" pitchFamily="34" charset="0"/>
               </a:rPr>
-              <a:t>To find the template inside the image, the system first uses a Radon Transform to locate the two longest horizontal lines, as well as the two vertical lines of the comment box. These lines are then used to calculate four reference points on the page, indicating where the template is. </a:t>
+              <a:t>To find the template inside the image, the system first uses a Radon transform to locate the two longest horizontal lines, as well as the two vertical lines of the comment box. These lines are then used to calculate four reference points on the page, indicating the position of the template. </a:t>
             </a:r>
+          </a:p>
+          <a:p>
+            <a:endParaRPr lang="en-ZA" sz="1600" dirty="0">
+              <a:latin typeface="Arial" panose="020B0604020202020204" pitchFamily="34" charset="0"/>
+              <a:cs typeface="Arial" panose="020B0604020202020204" pitchFamily="34" charset="0"/>
+            </a:endParaRPr>
+          </a:p>
+          <a:p>
+            <a:endParaRPr lang="en-ZA" sz="1600" dirty="0">
+              <a:latin typeface="Arial" panose="020B0604020202020204" pitchFamily="34" charset="0"/>
+              <a:cs typeface="Arial" panose="020B0604020202020204" pitchFamily="34" charset="0"/>
+            </a:endParaRPr>
           </a:p>
           <a:p>
             <a:endParaRPr lang="en-ZA" sz="1600" dirty="0">
@@ -6812,8 +6758,8 @@
         </p:nvSpPr>
         <p:spPr>
           <a:xfrm>
-            <a:off x="21283286" y="4724716"/>
-            <a:ext cx="7960061" cy="830997"/>
+            <a:off x="21413915" y="4724716"/>
+            <a:ext cx="7960061" cy="1815882"/>
           </a:xfrm>
           <a:prstGeom prst="rect">
             <a:avLst/>
@@ -6831,7 +6777,22 @@
                 <a:latin typeface="Arial" panose="020B0604020202020204" pitchFamily="34" charset="0"/>
                 <a:cs typeface="Arial" panose="020B0604020202020204" pitchFamily="34" charset="0"/>
               </a:rPr>
-              <a:t>Two probabilistic graphical models are used to predict the final values the student wrote. The first model predicts digits while the second model predicts the indented student number. Interesting results from these models are show below.</a:t>
+              <a:t>Two probabilistic graphical models (PGMs) are used to predict the final values the student wrote down. The first model predicts the digits written for each answer. The second model  is used to predict the indented student number. Interesting results from these models are shown below. </a:t>
+            </a:r>
+          </a:p>
+          <a:p>
+            <a:endParaRPr lang="en-ZA" sz="1600" dirty="0">
+              <a:latin typeface="Arial" panose="020B0604020202020204" pitchFamily="34" charset="0"/>
+              <a:cs typeface="Arial" panose="020B0604020202020204" pitchFamily="34" charset="0"/>
+            </a:endParaRPr>
+          </a:p>
+          <a:p>
+            <a:r>
+              <a:rPr lang="en-ZA" sz="1600" dirty="0">
+                <a:latin typeface="Arial" panose="020B0604020202020204" pitchFamily="34" charset="0"/>
+                <a:cs typeface="Arial" panose="020B0604020202020204" pitchFamily="34" charset="0"/>
+              </a:rPr>
+              <a:t>The models then cross reference the character and bubble evidence with the prior probabilities to predict the most probably answers the student intended to write down. </a:t>
             </a:r>
           </a:p>
         </p:txBody>
@@ -6850,7 +6811,7 @@
         </p:nvSpPr>
         <p:spPr>
           <a:xfrm>
-            <a:off x="21321215" y="9894320"/>
+            <a:off x="21451844" y="11797091"/>
             <a:ext cx="7960061" cy="2339102"/>
           </a:xfrm>
           <a:prstGeom prst="rect">
@@ -6984,7 +6945,7 @@
         </p:nvSpPr>
         <p:spPr>
           <a:xfrm>
-            <a:off x="21234993" y="14691425"/>
+            <a:off x="21365622" y="16608710"/>
             <a:ext cx="7960061" cy="3046988"/>
           </a:xfrm>
           <a:prstGeom prst="rect">
@@ -7052,22 +7013,21 @@
           </p:cNvPicPr>
           <p:nvPr/>
         </p:nvPicPr>
-        <p:blipFill>
-          <a:blip r:embed="rId12">
+        <p:blipFill rotWithShape="1">
+          <a:blip r:embed="rId12" cstate="hqprint">
             <a:extLst>
               <a:ext uri="{28A0092B-C50C-407E-A947-70E740481C1C}">
                 <a14:useLocalDpi xmlns:a14="http://schemas.microsoft.com/office/drawing/2010/main" val="0"/>
               </a:ext>
             </a:extLst>
           </a:blip>
-          <a:stretch>
-            <a:fillRect/>
-          </a:stretch>
+          <a:srcRect l="12254"/>
+          <a:stretch/>
         </p:blipFill>
         <p:spPr>
           <a:xfrm>
-            <a:off x="5672922" y="8943999"/>
-            <a:ext cx="1737523" cy="2457754"/>
+            <a:off x="4231824" y="8931070"/>
+            <a:ext cx="2481077" cy="3720124"/>
           </a:xfrm>
           <a:prstGeom prst="rect">
             <a:avLst/>
@@ -7088,22 +7048,21 @@
           </p:cNvPicPr>
           <p:nvPr/>
         </p:nvPicPr>
-        <p:blipFill>
-          <a:blip r:embed="rId13">
+        <p:blipFill rotWithShape="1">
+          <a:blip r:embed="rId13" cstate="hqprint">
             <a:extLst>
               <a:ext uri="{28A0092B-C50C-407E-A947-70E740481C1C}">
                 <a14:useLocalDpi xmlns:a14="http://schemas.microsoft.com/office/drawing/2010/main" val="0"/>
               </a:ext>
             </a:extLst>
           </a:blip>
-          <a:stretch>
-            <a:fillRect/>
-          </a:stretch>
+          <a:srcRect l="7475" t="2877" r="6339" b="3842"/>
+          <a:stretch/>
         </p:blipFill>
         <p:spPr>
           <a:xfrm>
-            <a:off x="7452536" y="8951109"/>
-            <a:ext cx="1710514" cy="2419550"/>
+            <a:off x="6695541" y="9023020"/>
+            <a:ext cx="2288046" cy="3461130"/>
           </a:xfrm>
           <a:prstGeom prst="rect">
             <a:avLst/>
@@ -7132,13 +7091,13 @@
               </a:ext>
             </a:extLst>
           </a:blip>
-          <a:srcRect b="7622"/>
+          <a:srcRect l="4189" t="5155" r="6627" b="8828"/>
           <a:stretch/>
         </p:blipFill>
         <p:spPr bwMode="auto">
           <a:xfrm>
-            <a:off x="12719379" y="6060391"/>
-            <a:ext cx="1982533" cy="1322936"/>
+            <a:off x="12424456" y="6217920"/>
+            <a:ext cx="2597698" cy="1809838"/>
           </a:xfrm>
           <a:prstGeom prst="rect">
             <a:avLst/>
@@ -7183,43 +7142,8 @@
         </p:blipFill>
         <p:spPr>
           <a:xfrm>
-            <a:off x="16909626" y="7841144"/>
-            <a:ext cx="1760967" cy="2402069"/>
-          </a:xfrm>
-          <a:prstGeom prst="rect">
-            <a:avLst/>
-          </a:prstGeom>
-        </p:spPr>
-      </p:pic>
-      <p:pic>
-        <p:nvPicPr>
-          <p:cNvPr id="80" name="Picture 79">
-            <a:extLst>
-              <a:ext uri="{FF2B5EF4-FFF2-40B4-BE49-F238E27FC236}">
-                <a16:creationId xmlns:a16="http://schemas.microsoft.com/office/drawing/2014/main" id="{E8EB972F-C578-4C39-8B14-8E51E517C2E4}"/>
-              </a:ext>
-            </a:extLst>
-          </p:cNvPr>
-          <p:cNvPicPr>
-            <a:picLocks noChangeAspect="1"/>
-          </p:cNvPicPr>
-          <p:nvPr/>
-        </p:nvPicPr>
-        <p:blipFill rotWithShape="1">
-          <a:blip r:embed="rId15" cstate="print">
-            <a:extLst>
-              <a:ext uri="{28A0092B-C50C-407E-A947-70E740481C1C}">
-                <a14:useLocalDpi xmlns:a14="http://schemas.microsoft.com/office/drawing/2010/main" val="0"/>
-              </a:ext>
-            </a:extLst>
-          </a:blip>
-          <a:srcRect l="12396" t="13102" r="8591" b="10603"/>
-          <a:stretch/>
-        </p:blipFill>
-        <p:spPr>
-          <a:xfrm rot="5400000" flipH="1">
-            <a:off x="17486936" y="5629198"/>
-            <a:ext cx="2139060" cy="752871"/>
+            <a:off x="16324721" y="8415000"/>
+            <a:ext cx="2800620" cy="3820220"/>
           </a:xfrm>
           <a:prstGeom prst="rect">
             <a:avLst/>
@@ -7241,7 +7165,7 @@
           <p:nvPr/>
         </p:nvPicPr>
         <p:blipFill rotWithShape="1">
-          <a:blip r:embed="rId16">
+          <a:blip r:embed="rId15">
             <a:extLst>
               <a:ext uri="{28A0092B-C50C-407E-A947-70E740481C1C}">
                 <a14:useLocalDpi xmlns:a14="http://schemas.microsoft.com/office/drawing/2010/main" val="0"/>
@@ -7253,8 +7177,8 @@
         </p:blipFill>
         <p:spPr bwMode="auto">
           <a:xfrm>
-            <a:off x="13028459" y="9707906"/>
-            <a:ext cx="1411613" cy="1434040"/>
+            <a:off x="12694292" y="10151768"/>
+            <a:ext cx="2085727" cy="2118864"/>
           </a:xfrm>
           <a:prstGeom prst="rect">
             <a:avLst/>
@@ -7298,8 +7222,8 @@
         </p:nvSpPr>
         <p:spPr>
           <a:xfrm>
-            <a:off x="5938649" y="11266101"/>
-            <a:ext cx="3044937" cy="338554"/>
+            <a:off x="4231823" y="12425251"/>
+            <a:ext cx="4751764" cy="338554"/>
           </a:xfrm>
           <a:prstGeom prst="rect">
             <a:avLst/>
@@ -7337,8 +7261,8 @@
         </p:nvSpPr>
         <p:spPr>
           <a:xfrm>
-            <a:off x="3944951" y="18585391"/>
-            <a:ext cx="1993698" cy="369332"/>
+            <a:off x="711200" y="20461816"/>
+            <a:ext cx="8272387" cy="369332"/>
           </a:xfrm>
           <a:prstGeom prst="rect">
             <a:avLst/>
@@ -7355,45 +7279,6 @@
             <a:r>
               <a:rPr lang="en-ZA" dirty="0"/>
               <a:t>Graphical overview</a:t>
-            </a:r>
-          </a:p>
-        </p:txBody>
-      </p:sp>
-      <p:sp>
-        <p:nvSpPr>
-          <p:cNvPr id="90" name="TextBox 89">
-            <a:extLst>
-              <a:ext uri="{FF2B5EF4-FFF2-40B4-BE49-F238E27FC236}">
-                <a16:creationId xmlns:a16="http://schemas.microsoft.com/office/drawing/2014/main" id="{B86896FC-8A1D-490C-A230-05EDCDFFB66F}"/>
-              </a:ext>
-            </a:extLst>
-          </p:cNvPr>
-          <p:cNvSpPr txBox="1"/>
-          <p:nvPr/>
-        </p:nvSpPr>
-        <p:spPr>
-          <a:xfrm>
-            <a:off x="16246887" y="7068465"/>
-            <a:ext cx="2793542" cy="584775"/>
-          </a:xfrm>
-          <a:prstGeom prst="rect">
-            <a:avLst/>
-          </a:prstGeom>
-          <a:noFill/>
-        </p:spPr>
-        <p:txBody>
-          <a:bodyPr wrap="square" rtlCol="0">
-            <a:spAutoFit/>
-          </a:bodyPr>
-          <a:lstStyle/>
-          <a:p>
-            <a:pPr algn="ctr"/>
-            <a:r>
-              <a:rPr lang="en-ZA" sz="1600" dirty="0">
-                <a:latin typeface="Arial" panose="020B0604020202020204" pitchFamily="34" charset="0"/>
-                <a:cs typeface="Arial" panose="020B0604020202020204" pitchFamily="34" charset="0"/>
-              </a:rPr>
-              <a:t>Reference points after Radon transform is applied</a:t>
             </a:r>
           </a:p>
         </p:txBody>
@@ -7412,8 +7297,8 @@
         </p:nvSpPr>
         <p:spPr>
           <a:xfrm>
-            <a:off x="12880747" y="7298288"/>
-            <a:ext cx="1769328" cy="338554"/>
+            <a:off x="12420796" y="7980396"/>
+            <a:ext cx="2601358" cy="338554"/>
           </a:xfrm>
           <a:prstGeom prst="rect">
             <a:avLst/>
@@ -7426,6 +7311,7 @@
           </a:bodyPr>
           <a:lstStyle/>
           <a:p>
+            <a:pPr algn="ctr"/>
             <a:r>
               <a:rPr lang="en-ZA" sz="1600" dirty="0">
                 <a:latin typeface="Arial" panose="020B0604020202020204" pitchFamily="34" charset="0"/>
@@ -7450,8 +7336,8 @@
         </p:nvSpPr>
         <p:spPr>
           <a:xfrm>
-            <a:off x="16595353" y="10334411"/>
-            <a:ext cx="2297344" cy="584775"/>
+            <a:off x="16395435" y="12177855"/>
+            <a:ext cx="2729905" cy="584775"/>
           </a:xfrm>
           <a:prstGeom prst="rect">
             <a:avLst/>
@@ -7489,7 +7375,7 @@
         </p:nvSpPr>
         <p:spPr>
           <a:xfrm>
-            <a:off x="11818084" y="11052704"/>
+            <a:off x="11861627" y="12168488"/>
             <a:ext cx="3701143" cy="584775"/>
           </a:xfrm>
           <a:prstGeom prst="rect">
@@ -7538,8 +7424,8 @@
         </p:nvGrpSpPr>
         <p:grpSpPr>
           <a:xfrm>
-            <a:off x="11709047" y="14725515"/>
-            <a:ext cx="3664599" cy="768062"/>
+            <a:off x="11186534" y="15869420"/>
+            <a:ext cx="4750152" cy="1149620"/>
             <a:chOff x="6391274" y="1603194"/>
             <a:chExt cx="4990401" cy="1108354"/>
           </a:xfrm>
@@ -7559,7 +7445,7 @@
             <p:nvPr/>
           </p:nvPicPr>
           <p:blipFill>
-            <a:blip r:embed="rId17" cstate="print">
+            <a:blip r:embed="rId16" cstate="print">
               <a:extLst>
                 <a:ext uri="{28A0092B-C50C-407E-A947-70E740481C1C}">
                   <a14:useLocalDpi xmlns:a14="http://schemas.microsoft.com/office/drawing/2010/main" val="0"/>
@@ -7595,7 +7481,7 @@
             <p:nvPr/>
           </p:nvPicPr>
           <p:blipFill>
-            <a:blip r:embed="rId18" cstate="print">
+            <a:blip r:embed="rId17" cstate="print">
               <a:extLst>
                 <a:ext uri="{28A0092B-C50C-407E-A947-70E740481C1C}">
                   <a14:useLocalDpi xmlns:a14="http://schemas.microsoft.com/office/drawing/2010/main" val="0"/>
@@ -7631,7 +7517,7 @@
             <p:nvPr/>
           </p:nvPicPr>
           <p:blipFill rotWithShape="1">
-            <a:blip r:embed="rId19">
+            <a:blip r:embed="rId18">
               <a:extLst>
                 <a:ext uri="{28A0092B-C50C-407E-A947-70E740481C1C}">
                   <a14:useLocalDpi xmlns:a14="http://schemas.microsoft.com/office/drawing/2010/main" val="0"/>
@@ -7666,7 +7552,7 @@
             <p:nvPr/>
           </p:nvPicPr>
           <p:blipFill>
-            <a:blip r:embed="rId20" cstate="print">
+            <a:blip r:embed="rId19" cstate="print">
               <a:extLst>
                 <a:ext uri="{28A0092B-C50C-407E-A947-70E740481C1C}">
                   <a14:useLocalDpi xmlns:a14="http://schemas.microsoft.com/office/drawing/2010/main" val="0"/>
@@ -7819,8 +7705,8 @@
         </p:nvSpPr>
         <p:spPr>
           <a:xfrm>
-            <a:off x="11698761" y="15517958"/>
-            <a:ext cx="3616939" cy="338554"/>
+            <a:off x="11186534" y="17015552"/>
+            <a:ext cx="4750151" cy="338554"/>
           </a:xfrm>
           <a:prstGeom prst="rect">
             <a:avLst/>
@@ -7833,6 +7719,7 @@
           </a:bodyPr>
           <a:lstStyle/>
           <a:p>
+            <a:pPr algn="ctr"/>
             <a:r>
               <a:rPr lang="en-ZA" sz="1600" dirty="0">
                 <a:latin typeface="Arial" panose="020B0604020202020204" pitchFamily="34" charset="0"/>
@@ -7871,7 +7758,7 @@
         </p:nvSpPr>
         <p:spPr>
           <a:xfrm>
-            <a:off x="16397583" y="18434278"/>
+            <a:off x="16437788" y="20434823"/>
             <a:ext cx="2538657" cy="338554"/>
           </a:xfrm>
           <a:prstGeom prst="rect">
@@ -7925,7 +7812,7 @@
           <p:nvPr/>
         </p:nvPicPr>
         <p:blipFill>
-          <a:blip r:embed="rId21">
+          <a:blip r:embed="rId20">
             <a:extLst>
               <a:ext uri="{28A0092B-C50C-407E-A947-70E740481C1C}">
                 <a14:useLocalDpi xmlns:a14="http://schemas.microsoft.com/office/drawing/2010/main" val="0"/>
@@ -7938,8 +7825,8 @@
         </p:blipFill>
         <p:spPr>
           <a:xfrm>
-            <a:off x="16473016" y="13635145"/>
-            <a:ext cx="2133923" cy="4836569"/>
+            <a:off x="16516560" y="14720995"/>
+            <a:ext cx="2554364" cy="5789506"/>
           </a:xfrm>
           <a:prstGeom prst="rect">
             <a:avLst/>
@@ -7960,7 +7847,7 @@
         </p:nvSpPr>
         <p:spPr>
           <a:xfrm>
-            <a:off x="11080221" y="13771465"/>
+            <a:off x="11123764" y="14857315"/>
             <a:ext cx="5302820" cy="830997"/>
           </a:xfrm>
           <a:prstGeom prst="rect">
@@ -8013,20 +7900,20 @@
           <p:nvPr/>
         </p:nvPicPr>
         <p:blipFill rotWithShape="1">
-          <a:blip r:embed="rId22">
+          <a:blip r:embed="rId21">
             <a:extLst>
               <a:ext uri="{28A0092B-C50C-407E-A947-70E740481C1C}">
                 <a14:useLocalDpi xmlns:a14="http://schemas.microsoft.com/office/drawing/2010/main" val="0"/>
               </a:ext>
             </a:extLst>
           </a:blip>
-          <a:srcRect t="25243"/>
+          <a:srcRect l="4485" t="25242" b="5032"/>
           <a:stretch/>
         </p:blipFill>
         <p:spPr bwMode="auto">
           <a:xfrm>
-            <a:off x="11373545" y="17296034"/>
-            <a:ext cx="4264372" cy="1233546"/>
+            <a:off x="10821430" y="18673095"/>
+            <a:ext cx="5635178" cy="1591776"/>
           </a:xfrm>
           <a:prstGeom prst="rect">
             <a:avLst/>
@@ -8057,7 +7944,7 @@
         </p:nvSpPr>
         <p:spPr>
           <a:xfrm>
-            <a:off x="10944066" y="16286663"/>
+            <a:off x="11127391" y="17722012"/>
             <a:ext cx="5302820" cy="830997"/>
           </a:xfrm>
           <a:prstGeom prst="rect">
@@ -8095,8 +7982,8 @@
         </p:nvSpPr>
         <p:spPr>
           <a:xfrm>
-            <a:off x="11417088" y="18389854"/>
-            <a:ext cx="4264371" cy="338554"/>
+            <a:off x="10821431" y="20361071"/>
+            <a:ext cx="5469000" cy="338554"/>
           </a:xfrm>
           <a:prstGeom prst="rect">
             <a:avLst/>
@@ -8134,8 +8021,8 @@
         </p:nvGrpSpPr>
         <p:grpSpPr>
           <a:xfrm>
-            <a:off x="16354040" y="4666595"/>
-            <a:ext cx="1869130" cy="2481963"/>
+            <a:off x="16175280" y="4720738"/>
+            <a:ext cx="2692151" cy="3162456"/>
             <a:chOff x="2889249" y="1892445"/>
             <a:chExt cx="3432030" cy="4752191"/>
           </a:xfrm>
@@ -8155,7 +8042,7 @@
             <p:nvPr/>
           </p:nvPicPr>
           <p:blipFill rotWithShape="1">
-            <a:blip r:embed="rId23" cstate="print">
+            <a:blip r:embed="rId22" cstate="print">
               <a:extLst>
                 <a:ext uri="{28A0092B-C50C-407E-A947-70E740481C1C}">
                   <a14:useLocalDpi xmlns:a14="http://schemas.microsoft.com/office/drawing/2010/main" val="0"/>
@@ -8191,8 +8078,8 @@
           </p:nvCxnSpPr>
           <p:spPr bwMode="auto">
             <a:xfrm>
-              <a:off x="2889250" y="3378829"/>
-              <a:ext cx="3333325" cy="24767"/>
+              <a:off x="2889250" y="3378830"/>
+              <a:ext cx="3088383" cy="22858"/>
             </a:xfrm>
             <a:prstGeom prst="line">
               <a:avLst/>
@@ -8445,7 +8332,7 @@
           <p:spPr bwMode="auto">
             <a:xfrm>
               <a:off x="2889249" y="6379261"/>
-              <a:ext cx="3286126" cy="12384"/>
+              <a:ext cx="3084286" cy="26514"/>
             </a:xfrm>
             <a:prstGeom prst="line">
               <a:avLst/>
@@ -8622,8 +8509,8 @@
         </p:nvGrpSpPr>
         <p:grpSpPr>
           <a:xfrm>
-            <a:off x="21459825" y="5962243"/>
-            <a:ext cx="2958040" cy="1480147"/>
+            <a:off x="21410162" y="7311736"/>
+            <a:ext cx="3170952" cy="1764703"/>
             <a:chOff x="912213" y="2629981"/>
             <a:chExt cx="3946884" cy="2493211"/>
           </a:xfrm>
@@ -8643,7 +8530,7 @@
             <p:nvPr/>
           </p:nvPicPr>
           <p:blipFill rotWithShape="1">
-            <a:blip r:embed="rId24">
+            <a:blip r:embed="rId23">
               <a:extLst>
                 <a:ext uri="{28A0092B-C50C-407E-A947-70E740481C1C}">
                   <a14:useLocalDpi xmlns:a14="http://schemas.microsoft.com/office/drawing/2010/main" val="0"/>
@@ -9055,7 +8942,7 @@
             <p:nvPr/>
           </p:nvPicPr>
           <p:blipFill rotWithShape="1">
-            <a:blip r:embed="rId25">
+            <a:blip r:embed="rId24">
               <a:extLst>
                 <a:ext uri="{28A0092B-C50C-407E-A947-70E740481C1C}">
                   <a14:useLocalDpi xmlns:a14="http://schemas.microsoft.com/office/drawing/2010/main" val="0"/>
@@ -9090,7 +8977,7 @@
             <p:nvPr/>
           </p:nvPicPr>
           <p:blipFill rotWithShape="1">
-            <a:blip r:embed="rId25">
+            <a:blip r:embed="rId24">
               <a:extLst>
                 <a:ext uri="{28A0092B-C50C-407E-A947-70E740481C1C}">
                   <a14:useLocalDpi xmlns:a14="http://schemas.microsoft.com/office/drawing/2010/main" val="0"/>
@@ -9125,8 +9012,8 @@
         </p:nvGrpSpPr>
         <p:grpSpPr>
           <a:xfrm>
-            <a:off x="24932252" y="5938657"/>
-            <a:ext cx="4636904" cy="1646521"/>
+            <a:off x="24808556" y="7436838"/>
+            <a:ext cx="4860686" cy="1780975"/>
             <a:chOff x="5455177" y="2656127"/>
             <a:chExt cx="6736823" cy="2592936"/>
           </a:xfrm>
@@ -9473,7 +9360,7 @@
             <p:nvPr/>
           </p:nvPicPr>
           <p:blipFill rotWithShape="1">
-            <a:blip r:embed="rId26" cstate="print">
+            <a:blip r:embed="rId25" cstate="print">
               <a:extLst>
                 <a:ext uri="{28A0092B-C50C-407E-A947-70E740481C1C}">
                   <a14:useLocalDpi xmlns:a14="http://schemas.microsoft.com/office/drawing/2010/main" val="0"/>
@@ -9508,8 +9395,8 @@
         </p:nvSpPr>
         <p:spPr>
           <a:xfrm>
-            <a:off x="21436476" y="7544640"/>
-            <a:ext cx="2812432" cy="338554"/>
+            <a:off x="21543761" y="9126492"/>
+            <a:ext cx="2943606" cy="352034"/>
           </a:xfrm>
           <a:prstGeom prst="rect">
             <a:avLst/>
@@ -9547,8 +9434,8 @@
         </p:nvSpPr>
         <p:spPr>
           <a:xfrm>
-            <a:off x="25147776" y="7509288"/>
-            <a:ext cx="3603459" cy="338554"/>
+            <a:off x="24808556" y="9120372"/>
+            <a:ext cx="4565419" cy="338554"/>
           </a:xfrm>
           <a:prstGeom prst="rect">
             <a:avLst/>
@@ -9568,6 +9455,80 @@
                 <a:cs typeface="Arial" panose="020B0604020202020204" pitchFamily="34" charset="0"/>
               </a:rPr>
               <a:t>Student number PGM prediction</a:t>
+            </a:r>
+          </a:p>
+        </p:txBody>
+      </p:sp>
+      <p:pic>
+        <p:nvPicPr>
+          <p:cNvPr id="80" name="Picture 79">
+            <a:extLst>
+              <a:ext uri="{FF2B5EF4-FFF2-40B4-BE49-F238E27FC236}">
+                <a16:creationId xmlns:a16="http://schemas.microsoft.com/office/drawing/2014/main" id="{E8EB972F-C578-4C39-8B14-8E51E517C2E4}"/>
+              </a:ext>
+            </a:extLst>
+          </p:cNvPr>
+          <p:cNvPicPr>
+            <a:picLocks noChangeAspect="1"/>
+          </p:cNvPicPr>
+          <p:nvPr/>
+        </p:nvPicPr>
+        <p:blipFill rotWithShape="1">
+          <a:blip r:embed="rId26" cstate="hqprint">
+            <a:extLst>
+              <a:ext uri="{28A0092B-C50C-407E-A947-70E740481C1C}">
+                <a14:useLocalDpi xmlns:a14="http://schemas.microsoft.com/office/drawing/2010/main" val="0"/>
+              </a:ext>
+            </a:extLst>
+          </a:blip>
+          <a:srcRect l="12396" t="13102" r="8591" b="10603"/>
+          <a:stretch/>
+        </p:blipFill>
+        <p:spPr>
+          <a:xfrm rot="5400000" flipH="1">
+            <a:off x="17577010" y="6117717"/>
+            <a:ext cx="2701457" cy="606378"/>
+          </a:xfrm>
+          <a:prstGeom prst="rect">
+            <a:avLst/>
+          </a:prstGeom>
+        </p:spPr>
+      </p:pic>
+      <p:sp>
+        <p:nvSpPr>
+          <p:cNvPr id="90" name="TextBox 89">
+            <a:extLst>
+              <a:ext uri="{FF2B5EF4-FFF2-40B4-BE49-F238E27FC236}">
+                <a16:creationId xmlns:a16="http://schemas.microsoft.com/office/drawing/2014/main" id="{B86896FC-8A1D-490C-A230-05EDCDFFB66F}"/>
+              </a:ext>
+            </a:extLst>
+          </p:cNvPr>
+          <p:cNvSpPr txBox="1"/>
+          <p:nvPr/>
+        </p:nvSpPr>
+        <p:spPr>
+          <a:xfrm>
+            <a:off x="16156274" y="7722003"/>
+            <a:ext cx="3074654" cy="584775"/>
+          </a:xfrm>
+          <a:prstGeom prst="rect">
+            <a:avLst/>
+          </a:prstGeom>
+          <a:noFill/>
+        </p:spPr>
+        <p:txBody>
+          <a:bodyPr wrap="square" rtlCol="0">
+            <a:spAutoFit/>
+          </a:bodyPr>
+          <a:lstStyle/>
+          <a:p>
+            <a:pPr algn="ctr"/>
+            <a:r>
+              <a:rPr lang="en-ZA" sz="1600" dirty="0">
+                <a:latin typeface="Arial" panose="020B0604020202020204" pitchFamily="34" charset="0"/>
+                <a:cs typeface="Arial" panose="020B0604020202020204" pitchFamily="34" charset="0"/>
+              </a:rPr>
+              <a:t>Reference points after Radon transform is applied</a:t>
             </a:r>
           </a:p>
         </p:txBody>

</xml_diff>

<commit_message>
Corrected some spelling and format mistakes.
</commit_message>
<xml_diff>
--- a/Poster/Poster.pptx
+++ b/Poster/Poster.pptx
@@ -212,7 +212,7 @@
           <a:p>
             <a:fld id="{B86BC033-6438-4B0A-82FC-802490CCF637}" type="datetimeFigureOut">
               <a:rPr lang="en-ZA" smtClean="0"/>
-              <a:t>2017-11-12</a:t>
+              <a:t>2017-11-13</a:t>
             </a:fld>
             <a:endParaRPr lang="en-ZA"/>
           </a:p>
@@ -695,7 +695,7 @@
           <a:p>
             <a:fld id="{51832D96-9D06-475B-8F7A-8034629CEECD}" type="datetimeFigureOut">
               <a:rPr lang="en-ZA" smtClean="0"/>
-              <a:t>2017-11-12</a:t>
+              <a:t>2017-11-13</a:t>
             </a:fld>
             <a:endParaRPr lang="en-ZA"/>
           </a:p>
@@ -865,7 +865,7 @@
           <a:p>
             <a:fld id="{51832D96-9D06-475B-8F7A-8034629CEECD}" type="datetimeFigureOut">
               <a:rPr lang="en-ZA" smtClean="0"/>
-              <a:t>2017-11-12</a:t>
+              <a:t>2017-11-13</a:t>
             </a:fld>
             <a:endParaRPr lang="en-ZA"/>
           </a:p>
@@ -1045,7 +1045,7 @@
           <a:p>
             <a:fld id="{51832D96-9D06-475B-8F7A-8034629CEECD}" type="datetimeFigureOut">
               <a:rPr lang="en-ZA" smtClean="0"/>
-              <a:t>2017-11-12</a:t>
+              <a:t>2017-11-13</a:t>
             </a:fld>
             <a:endParaRPr lang="en-ZA"/>
           </a:p>
@@ -1215,7 +1215,7 @@
           <a:p>
             <a:fld id="{51832D96-9D06-475B-8F7A-8034629CEECD}" type="datetimeFigureOut">
               <a:rPr lang="en-ZA" smtClean="0"/>
-              <a:t>2017-11-12</a:t>
+              <a:t>2017-11-13</a:t>
             </a:fld>
             <a:endParaRPr lang="en-ZA"/>
           </a:p>
@@ -1459,7 +1459,7 @@
           <a:p>
             <a:fld id="{51832D96-9D06-475B-8F7A-8034629CEECD}" type="datetimeFigureOut">
               <a:rPr lang="en-ZA" smtClean="0"/>
-              <a:t>2017-11-12</a:t>
+              <a:t>2017-11-13</a:t>
             </a:fld>
             <a:endParaRPr lang="en-ZA"/>
           </a:p>
@@ -1691,7 +1691,7 @@
           <a:p>
             <a:fld id="{51832D96-9D06-475B-8F7A-8034629CEECD}" type="datetimeFigureOut">
               <a:rPr lang="en-ZA" smtClean="0"/>
-              <a:t>2017-11-12</a:t>
+              <a:t>2017-11-13</a:t>
             </a:fld>
             <a:endParaRPr lang="en-ZA"/>
           </a:p>
@@ -2058,7 +2058,7 @@
           <a:p>
             <a:fld id="{51832D96-9D06-475B-8F7A-8034629CEECD}" type="datetimeFigureOut">
               <a:rPr lang="en-ZA" smtClean="0"/>
-              <a:t>2017-11-12</a:t>
+              <a:t>2017-11-13</a:t>
             </a:fld>
             <a:endParaRPr lang="en-ZA"/>
           </a:p>
@@ -2176,7 +2176,7 @@
           <a:p>
             <a:fld id="{51832D96-9D06-475B-8F7A-8034629CEECD}" type="datetimeFigureOut">
               <a:rPr lang="en-ZA" smtClean="0"/>
-              <a:t>2017-11-12</a:t>
+              <a:t>2017-11-13</a:t>
             </a:fld>
             <a:endParaRPr lang="en-ZA"/>
           </a:p>
@@ -2271,7 +2271,7 @@
           <a:p>
             <a:fld id="{51832D96-9D06-475B-8F7A-8034629CEECD}" type="datetimeFigureOut">
               <a:rPr lang="en-ZA" smtClean="0"/>
-              <a:t>2017-11-12</a:t>
+              <a:t>2017-11-13</a:t>
             </a:fld>
             <a:endParaRPr lang="en-ZA"/>
           </a:p>
@@ -2548,7 +2548,7 @@
           <a:p>
             <a:fld id="{51832D96-9D06-475B-8F7A-8034629CEECD}" type="datetimeFigureOut">
               <a:rPr lang="en-ZA" smtClean="0"/>
-              <a:t>2017-11-12</a:t>
+              <a:t>2017-11-13</a:t>
             </a:fld>
             <a:endParaRPr lang="en-ZA"/>
           </a:p>
@@ -2805,7 +2805,7 @@
           <a:p>
             <a:fld id="{51832D96-9D06-475B-8F7A-8034629CEECD}" type="datetimeFigureOut">
               <a:rPr lang="en-ZA" smtClean="0"/>
-              <a:t>2017-11-12</a:t>
+              <a:t>2017-11-13</a:t>
             </a:fld>
             <a:endParaRPr lang="en-ZA"/>
           </a:p>
@@ -3018,7 +3018,7 @@
           <a:p>
             <a:fld id="{51832D96-9D06-475B-8F7A-8034629CEECD}" type="datetimeFigureOut">
               <a:rPr lang="en-ZA" smtClean="0"/>
-              <a:t>2017-11-12</a:t>
+              <a:t>2017-11-13</a:t>
             </a:fld>
             <a:endParaRPr lang="en-ZA"/>
           </a:p>
@@ -3844,10 +3844,10 @@
         </p:nvGrpSpPr>
         <p:grpSpPr>
           <a:xfrm>
-            <a:off x="711200" y="16847634"/>
-            <a:ext cx="8650514" cy="3628354"/>
+            <a:off x="711199" y="16847634"/>
+            <a:ext cx="8481747" cy="3628354"/>
             <a:chOff x="15483548" y="3261832"/>
-            <a:chExt cx="11437906" cy="4529251"/>
+            <a:chExt cx="11214759" cy="4529251"/>
           </a:xfrm>
         </p:grpSpPr>
         <p:cxnSp>
@@ -3971,7 +3971,7 @@
             </a:bodyPr>
             <a:lstStyle/>
             <a:p>
-              <a:pPr marL="0" marR="0" indent="0" algn="l" defTabSz="914400" rtl="0" eaLnBrk="1" fontAlgn="base" latinLnBrk="0" hangingPunct="1">
+              <a:pPr marL="0" marR="0" indent="0" algn="ctr" defTabSz="914400" rtl="0" eaLnBrk="1" fontAlgn="base" latinLnBrk="0" hangingPunct="1">
                 <a:lnSpc>
                   <a:spcPct val="100000"/>
                 </a:lnSpc>
@@ -3988,7 +3988,7 @@
                 <a:tabLst/>
               </a:pPr>
               <a:r>
-                <a:rPr kumimoji="0" lang="en-ZA" sz="1100" b="0" i="0" u="none" strike="noStrike" cap="none" normalizeH="0" baseline="0" dirty="0">
+                <a:rPr kumimoji="0" lang="en-ZA" sz="1400" b="0" i="0" u="none" strike="noStrike" cap="none" normalizeH="0" baseline="0" dirty="0">
                   <a:ln>
                     <a:noFill/>
                   </a:ln>
@@ -3999,21 +3999,7 @@
                   <a:latin typeface="Arial" panose="020B0604020202020204" pitchFamily="34" charset="0"/>
                   <a:cs typeface="Arial" panose="020B0604020202020204" pitchFamily="34" charset="0"/>
                 </a:rPr>
-                <a:t>Image</a:t>
-              </a:r>
-              <a:r>
-                <a:rPr kumimoji="0" lang="en-ZA" sz="1050" b="0" i="0" u="none" strike="noStrike" cap="none" normalizeH="0" baseline="0" dirty="0">
-                  <a:ln>
-                    <a:noFill/>
-                  </a:ln>
-                  <a:solidFill>
-                    <a:schemeClr val="tx1"/>
-                  </a:solidFill>
-                  <a:effectLst/>
-                  <a:latin typeface="Arial" panose="020B0604020202020204" pitchFamily="34" charset="0"/>
-                  <a:cs typeface="Arial" panose="020B0604020202020204" pitchFamily="34" charset="0"/>
-                </a:rPr>
-                <a:t> Processing</a:t>
+                <a:t>Image Processing</a:t>
               </a:r>
             </a:p>
           </p:txBody>
@@ -4065,7 +4051,7 @@
             </a:bodyPr>
             <a:lstStyle/>
             <a:p>
-              <a:pPr marL="0" marR="0" indent="0" algn="l" defTabSz="914400" rtl="0" eaLnBrk="1" fontAlgn="base" latinLnBrk="0" hangingPunct="1">
+              <a:pPr marL="0" marR="0" indent="0" algn="ctr" defTabSz="914400" rtl="0" eaLnBrk="1" fontAlgn="base" latinLnBrk="0" hangingPunct="1">
                 <a:lnSpc>
                   <a:spcPct val="100000"/>
                 </a:lnSpc>
@@ -4082,7 +4068,7 @@
                 <a:tabLst/>
               </a:pPr>
               <a:r>
-                <a:rPr kumimoji="0" lang="en-ZA" sz="1100" b="0" i="0" u="none" strike="noStrike" cap="none" normalizeH="0" baseline="0" dirty="0">
+                <a:rPr kumimoji="0" lang="en-ZA" sz="1400" b="0" i="0" u="none" strike="noStrike" cap="none" normalizeH="0" baseline="0" dirty="0">
                   <a:ln>
                     <a:noFill/>
                   </a:ln>
@@ -4145,7 +4131,7 @@
             </a:bodyPr>
             <a:lstStyle/>
             <a:p>
-              <a:pPr marL="0" marR="0" indent="0" algn="l" defTabSz="914400" rtl="0" eaLnBrk="1" fontAlgn="base" latinLnBrk="0" hangingPunct="1">
+              <a:pPr marL="0" marR="0" indent="0" algn="ctr" defTabSz="914400" rtl="0" eaLnBrk="1" fontAlgn="base" latinLnBrk="0" hangingPunct="1">
                 <a:lnSpc>
                   <a:spcPct val="100000"/>
                 </a:lnSpc>
@@ -4162,7 +4148,7 @@
                 <a:tabLst/>
               </a:pPr>
               <a:r>
-                <a:rPr kumimoji="0" lang="en-ZA" sz="1100" b="0" i="0" u="none" strike="noStrike" cap="none" normalizeH="0" baseline="0" dirty="0">
+                <a:rPr kumimoji="0" lang="en-ZA" sz="1400" b="0" i="0" u="none" strike="noStrike" cap="none" normalizeH="0" baseline="0" dirty="0">
                   <a:ln>
                     <a:noFill/>
                   </a:ln>
@@ -4225,7 +4211,7 @@
             </a:bodyPr>
             <a:lstStyle/>
             <a:p>
-              <a:pPr marL="0" marR="0" indent="0" algn="l" defTabSz="914400" rtl="0" eaLnBrk="1" fontAlgn="base" latinLnBrk="0" hangingPunct="1">
+              <a:pPr marL="0" marR="0" indent="0" algn="ctr" defTabSz="914400" rtl="0" eaLnBrk="1" fontAlgn="base" latinLnBrk="0" hangingPunct="1">
                 <a:lnSpc>
                   <a:spcPct val="100000"/>
                 </a:lnSpc>
@@ -4242,7 +4228,7 @@
                 <a:tabLst/>
               </a:pPr>
               <a:r>
-                <a:rPr kumimoji="0" lang="en-ZA" sz="1100" b="0" i="0" u="none" strike="noStrike" cap="none" normalizeH="0" baseline="0" dirty="0">
+                <a:rPr kumimoji="0" lang="en-ZA" sz="1400" b="0" i="0" u="none" strike="noStrike" cap="none" normalizeH="0" baseline="0" dirty="0">
                   <a:ln>
                     <a:noFill/>
                   </a:ln>
@@ -4305,7 +4291,7 @@
             </a:bodyPr>
             <a:lstStyle/>
             <a:p>
-              <a:pPr marL="0" marR="0" indent="0" algn="l" defTabSz="914400" rtl="0" eaLnBrk="1" fontAlgn="base" latinLnBrk="0" hangingPunct="1">
+              <a:pPr marL="0" marR="0" indent="0" algn="ctr" defTabSz="914400" rtl="0" eaLnBrk="1" fontAlgn="base" latinLnBrk="0" hangingPunct="1">
                 <a:lnSpc>
                   <a:spcPct val="100000"/>
                 </a:lnSpc>
@@ -4322,7 +4308,7 @@
                 <a:tabLst/>
               </a:pPr>
               <a:r>
-                <a:rPr kumimoji="0" lang="en-ZA" sz="1100" b="0" i="0" u="none" strike="noStrike" cap="none" normalizeH="0" baseline="0" dirty="0">
+                <a:rPr kumimoji="0" lang="en-ZA" sz="1400" b="0" i="0" u="none" strike="noStrike" cap="none" normalizeH="0" baseline="0" dirty="0">
                   <a:ln>
                     <a:noFill/>
                   </a:ln>
@@ -4333,7 +4319,31 @@
                   <a:latin typeface="Arial" panose="020B0604020202020204" pitchFamily="34" charset="0"/>
                   <a:cs typeface="Arial" panose="020B0604020202020204" pitchFamily="34" charset="0"/>
                 </a:rPr>
-                <a:t>Probabilistic graphical models</a:t>
+                <a:t>Probabilistic Graphical </a:t>
+              </a:r>
+              <a:r>
+                <a:rPr lang="en-ZA" sz="1400" dirty="0">
+                  <a:solidFill>
+                    <a:schemeClr val="tx1"/>
+                  </a:solidFill>
+                  <a:latin typeface="Arial" panose="020B0604020202020204" pitchFamily="34" charset="0"/>
+                  <a:cs typeface="Arial" panose="020B0604020202020204" pitchFamily="34" charset="0"/>
+                </a:rPr>
+                <a:t>M</a:t>
+              </a:r>
+              <a:r>
+                <a:rPr kumimoji="0" lang="en-ZA" sz="1400" b="0" i="0" u="none" strike="noStrike" cap="none" normalizeH="0" baseline="0" dirty="0">
+                  <a:ln>
+                    <a:noFill/>
+                  </a:ln>
+                  <a:solidFill>
+                    <a:schemeClr val="tx1"/>
+                  </a:solidFill>
+                  <a:effectLst/>
+                  <a:latin typeface="Arial" panose="020B0604020202020204" pitchFamily="34" charset="0"/>
+                  <a:cs typeface="Arial" panose="020B0604020202020204" pitchFamily="34" charset="0"/>
+                </a:rPr>
+                <a:t>odels</a:t>
               </a:r>
             </a:p>
           </p:txBody>
@@ -4352,8 +4362,8 @@
           </p:nvSpPr>
           <p:spPr>
             <a:xfrm>
-              <a:off x="25521919" y="6006348"/>
-              <a:ext cx="1399535" cy="446227"/>
+              <a:off x="25521920" y="6060702"/>
+              <a:ext cx="1176387" cy="384196"/>
             </a:xfrm>
             <a:prstGeom prst="rect">
               <a:avLst/>
@@ -4366,8 +4376,9 @@
             </a:bodyPr>
             <a:lstStyle/>
             <a:p>
+              <a:pPr algn="ctr"/>
               <a:r>
-                <a:rPr lang="en-ZA" sz="1200" dirty="0">
+                <a:rPr lang="en-ZA" sz="1400" dirty="0">
                   <a:effectLst/>
                   <a:latin typeface="Arial" panose="020B0604020202020204" pitchFamily="34" charset="0"/>
                   <a:cs typeface="Arial" panose="020B0604020202020204" pitchFamily="34" charset="0"/>
@@ -4510,9 +4521,9 @@
             <p:nvPr/>
           </p:nvCxnSpPr>
           <p:spPr bwMode="auto">
-            <a:xfrm flipV="1">
-              <a:off x="25328099" y="6229461"/>
-              <a:ext cx="193820" cy="7720"/>
+            <a:xfrm>
+              <a:off x="25328098" y="6237181"/>
+              <a:ext cx="193822" cy="15620"/>
             </a:xfrm>
             <a:prstGeom prst="straightConnector1">
               <a:avLst/>
@@ -6658,7 +6669,7 @@
         <p:spPr>
           <a:xfrm>
             <a:off x="11127518" y="4724716"/>
-            <a:ext cx="5028755" cy="5755422"/>
+            <a:ext cx="5028755" cy="5509200"/>
           </a:xfrm>
           <a:prstGeom prst="rect">
             <a:avLst/>
@@ -6739,7 +6750,7 @@
                 <a:latin typeface="Arial" panose="020B0604020202020204" pitchFamily="34" charset="0"/>
                 <a:cs typeface="Arial" panose="020B0604020202020204" pitchFamily="34" charset="0"/>
               </a:rPr>
-              <a:t>Once the template is found, contour analysis is done on the page. The reference template found in the image is then used to estimate the locations of each bubble in the template. Each bubble is then assigned a contour that has a centre closest to that estimated locations. Using the contour area and average pixel intensity, inside the contour, the each bubble is classified.</a:t>
+              <a:t>Once the template is found, contour analysis is done on the page. The reference template found in the image is then used to estimate the locations of each bubble in the template. Each bubble is then assigned a contour that has a centre closest to that estimated locations. Using the contour area and average pixel intensity, inside the contour, each bubble is classified.</a:t>
             </a:r>
           </a:p>
         </p:txBody>
@@ -6777,7 +6788,7 @@
                 <a:latin typeface="Arial" panose="020B0604020202020204" pitchFamily="34" charset="0"/>
                 <a:cs typeface="Arial" panose="020B0604020202020204" pitchFamily="34" charset="0"/>
               </a:rPr>
-              <a:t>Two probabilistic graphical models (PGMs) are used to predict the final values the student wrote down. The first model predicts the digits written for each answer. The second model  is used to predict the indented student number. Interesting results from these models are shown below. </a:t>
+              <a:t>Two probabilistic graphical models (PGMs) are used to predict the final values the student wrote down. The first model predicts the digits written for each answer. The second model  is used to predict the intended student number. Interesting results from these models are shown below. </a:t>
             </a:r>
           </a:p>
           <a:p>

</xml_diff>